<commit_message>
Update slides (including break to sections)
</commit_message>
<xml_diff>
--- a/Slides/Not Only SQL - Picking A Database for DotNET.pptx
+++ b/Slides/Not Only SQL - Picking A Database for DotNET.pptx
@@ -5,7 +5,7 @@
     <p:sldMasterId id="2147483648" r:id="rId1"/>
   </p:sldMasterIdLst>
   <p:notesMasterIdLst>
-    <p:notesMasterId r:id="rId66"/>
+    <p:notesMasterId r:id="rId65"/>
   </p:notesMasterIdLst>
   <p:sldIdLst>
     <p:sldId id="256" r:id="rId2"/>
@@ -55,23 +55,22 @@
     <p:sldId id="336" r:id="rId46"/>
     <p:sldId id="326" r:id="rId47"/>
     <p:sldId id="329" r:id="rId48"/>
-    <p:sldId id="302" r:id="rId49"/>
-    <p:sldId id="312" r:id="rId50"/>
-    <p:sldId id="341" r:id="rId51"/>
-    <p:sldId id="340" r:id="rId52"/>
-    <p:sldId id="309" r:id="rId53"/>
-    <p:sldId id="332" r:id="rId54"/>
-    <p:sldId id="311" r:id="rId55"/>
-    <p:sldId id="267" r:id="rId56"/>
-    <p:sldId id="268" r:id="rId57"/>
-    <p:sldId id="273" r:id="rId58"/>
-    <p:sldId id="272" r:id="rId59"/>
-    <p:sldId id="271" r:id="rId60"/>
-    <p:sldId id="305" r:id="rId61"/>
-    <p:sldId id="306" r:id="rId62"/>
-    <p:sldId id="307" r:id="rId63"/>
-    <p:sldId id="308" r:id="rId64"/>
-    <p:sldId id="313" r:id="rId65"/>
+    <p:sldId id="341" r:id="rId49"/>
+    <p:sldId id="340" r:id="rId50"/>
+    <p:sldId id="309" r:id="rId51"/>
+    <p:sldId id="302" r:id="rId52"/>
+    <p:sldId id="332" r:id="rId53"/>
+    <p:sldId id="311" r:id="rId54"/>
+    <p:sldId id="267" r:id="rId55"/>
+    <p:sldId id="268" r:id="rId56"/>
+    <p:sldId id="273" r:id="rId57"/>
+    <p:sldId id="272" r:id="rId58"/>
+    <p:sldId id="271" r:id="rId59"/>
+    <p:sldId id="305" r:id="rId60"/>
+    <p:sldId id="306" r:id="rId61"/>
+    <p:sldId id="307" r:id="rId62"/>
+    <p:sldId id="308" r:id="rId63"/>
+    <p:sldId id="313" r:id="rId64"/>
   </p:sldIdLst>
   <p:sldSz cx="9144000" cy="6858000" type="screen4x3"/>
   <p:notesSz cx="6858000" cy="9144000"/>
@@ -170,6 +169,127 @@
       </a:defRPr>
     </a:lvl9pPr>
   </p:defaultTextStyle>
+  <p:extLst>
+    <p:ext uri="{521415D9-36F7-43E2-AB2F-B90AF26B5E84}">
+      <p14:sectionLst xmlns:p14="http://schemas.microsoft.com/office/powerpoint/2010/main">
+        <p14:section name="Intoduction" id="{04188E7F-5034-4F10-9EF1-6C01687BBA24}">
+          <p14:sldIdLst>
+            <p14:sldId id="256"/>
+            <p14:sldId id="257"/>
+            <p14:sldId id="258"/>
+          </p14:sldIdLst>
+        </p14:section>
+        <p14:section name="Background and Context" id="{759BFAAB-39A0-4148-8838-5648D049BBEC}">
+          <p14:sldIdLst>
+            <p14:sldId id="259"/>
+            <p14:sldId id="315"/>
+            <p14:sldId id="317"/>
+            <p14:sldId id="316"/>
+            <p14:sldId id="318"/>
+            <p14:sldId id="319"/>
+            <p14:sldId id="320"/>
+            <p14:sldId id="321"/>
+            <p14:sldId id="322"/>
+          </p14:sldIdLst>
+        </p14:section>
+        <p14:section name="Improving Relational? MS SQL &amp; Postgres" id="{F65E2DF1-E0AD-42D2-8BA4-F0C7101E4368}">
+          <p14:sldIdLst>
+            <p14:sldId id="323"/>
+            <p14:sldId id="264"/>
+            <p14:sldId id="265"/>
+          </p14:sldIdLst>
+        </p14:section>
+        <p14:section name="Scalability (Relational)" id="{B2F08BAC-3FB6-4021-8595-21CEAC80FD9A}">
+          <p14:sldIdLst>
+            <p14:sldId id="274"/>
+            <p14:sldId id="276"/>
+            <p14:sldId id="324"/>
+            <p14:sldId id="277"/>
+            <p14:sldId id="325"/>
+            <p14:sldId id="280"/>
+            <p14:sldId id="281"/>
+          </p14:sldIdLst>
+        </p14:section>
+        <p14:section name="NoSQL &amp; CAP Theorem" id="{2E6C02D4-0032-4DA3-9CD1-3D8498C4A07E}">
+          <p14:sldIdLst>
+            <p14:sldId id="283"/>
+            <p14:sldId id="284"/>
+            <p14:sldId id="285"/>
+            <p14:sldId id="286"/>
+            <p14:sldId id="287"/>
+            <p14:sldId id="288"/>
+            <p14:sldId id="289"/>
+            <p14:sldId id="327"/>
+          </p14:sldIdLst>
+        </p14:section>
+        <p14:section name="Document Databases/ MongoDB" id="{1F6EB145-E808-4F5D-B4C3-BFA82607383A}">
+          <p14:sldIdLst>
+            <p14:sldId id="290"/>
+            <p14:sldId id="334"/>
+          </p14:sldIdLst>
+        </p14:section>
+        <p14:section name="AP - Riak &amp; Cassandra" id="{BD5FAAEB-85ED-43B1-9F71-45F33E59E497}">
+          <p14:sldIdLst>
+            <p14:sldId id="295"/>
+            <p14:sldId id="296"/>
+            <p14:sldId id="297"/>
+            <p14:sldId id="314"/>
+          </p14:sldIdLst>
+        </p14:section>
+        <p14:section name="Riak" id="{FEC1A9D6-5CA8-4E0D-A207-A95678A39932}">
+          <p14:sldIdLst>
+            <p14:sldId id="333"/>
+            <p14:sldId id="328"/>
+          </p14:sldIdLst>
+        </p14:section>
+        <p14:section name="Cassandra" id="{00EA9F98-D9E3-4383-AD4C-0983685A93C8}">
+          <p14:sldIdLst>
+            <p14:sldId id="331"/>
+            <p14:sldId id="330"/>
+            <p14:sldId id="337"/>
+            <p14:sldId id="338"/>
+            <p14:sldId id="339"/>
+          </p14:sldIdLst>
+        </p14:section>
+        <p14:section name="Cloud Hosting, DocumentDB" id="{7EF5B686-4036-46D1-A2CE-8ED4330CE460}">
+          <p14:sldIdLst>
+            <p14:sldId id="335"/>
+            <p14:sldId id="336"/>
+            <p14:sldId id="326"/>
+            <p14:sldId id="329"/>
+          </p14:sldIdLst>
+        </p14:section>
+        <p14:section name="Hadoop/ MapReduce" id="{207844E5-265B-4741-9015-15490DD38719}">
+          <p14:sldIdLst>
+            <p14:sldId id="341"/>
+            <p14:sldId id="340"/>
+            <p14:sldId id="309"/>
+            <p14:sldId id="302"/>
+            <p14:sldId id="332"/>
+            <p14:sldId id="311"/>
+          </p14:sldIdLst>
+        </p14:section>
+        <p14:section name="Graph DBs - Neo4j" id="{C6E735CF-19D2-4EAD-B7DE-DA03EA3AD71F}">
+          <p14:sldIdLst>
+            <p14:sldId id="267"/>
+            <p14:sldId id="268"/>
+            <p14:sldId id="273"/>
+            <p14:sldId id="272"/>
+            <p14:sldId id="271"/>
+          </p14:sldIdLst>
+        </p14:section>
+        <p14:section name="Patterns &amp; Architectures" id="{D5E4F245-62F7-4542-A0E3-51984C389616}">
+          <p14:sldIdLst>
+            <p14:sldId id="305"/>
+            <p14:sldId id="306"/>
+            <p14:sldId id="307"/>
+            <p14:sldId id="308"/>
+            <p14:sldId id="313"/>
+          </p14:sldIdLst>
+        </p14:section>
+      </p14:sectionLst>
+    </p:ext>
+  </p:extLst>
 </p:presentation>
 </file>
 
@@ -659,24 +779,6 @@
           <a:bodyPr/>
           <a:lstStyle/>
           <a:p>
-            <a:r>
-              <a:rPr lang="en-GB" baseline="0" dirty="0" smtClean="0"/>
-              <a:t>Even using what is basically still relational database software, there are some things we can do to work a bit more easily with application code.</a:t>
-            </a:r>
-          </a:p>
-          <a:p>
-            <a:r>
-              <a:rPr lang="en-GB" baseline="0" dirty="0" smtClean="0"/>
-              <a:t>SQL Server gives us some options (e.g. XML, binary storage) but I’d like to quickly show you some cool features in a database I’ve been learning about in 2014 - </a:t>
-            </a:r>
-            <a:r>
-              <a:rPr lang="en-GB" baseline="0" dirty="0" err="1" smtClean="0"/>
-              <a:t>PostgreSQL</a:t>
-            </a:r>
-            <a:r>
-              <a:rPr lang="en-GB" baseline="0" dirty="0" smtClean="0"/>
-              <a:t>.</a:t>
-            </a:r>
             <a:endParaRPr lang="en-GB" dirty="0"/>
           </a:p>
         </p:txBody>
@@ -2868,7 +2970,7 @@
           <a:p>
             <a:fld id="{B88E1A96-A68C-4ED7-8535-7FE27C72D2F0}" type="slidenum">
               <a:rPr lang="en-GB" smtClean="0"/>
-              <a:t>48</a:t>
+              <a:t>49</a:t>
             </a:fld>
             <a:endParaRPr lang="en-GB"/>
           </a:p>
@@ -2877,7 +2979,7 @@
     </p:spTree>
     <p:extLst>
       <p:ext uri="{BB962C8B-B14F-4D97-AF65-F5344CB8AC3E}">
-        <p14:creationId xmlns:p14="http://schemas.microsoft.com/office/powerpoint/2010/main" val="2245795352"/>
+        <p14:creationId xmlns:p14="http://schemas.microsoft.com/office/powerpoint/2010/main" val="1960653282"/>
       </p:ext>
     </p:extLst>
   </p:cSld>
@@ -3036,7 +3138,7 @@
           <a:p>
             <a:fld id="{B88E1A96-A68C-4ED7-8535-7FE27C72D2F0}" type="slidenum">
               <a:rPr lang="en-GB" smtClean="0"/>
-              <a:t>51</a:t>
+              <a:t>50</a:t>
             </a:fld>
             <a:endParaRPr lang="en-GB"/>
           </a:p>
@@ -3045,7 +3147,7 @@
     </p:spTree>
     <p:extLst>
       <p:ext uri="{BB962C8B-B14F-4D97-AF65-F5344CB8AC3E}">
-        <p14:creationId xmlns:p14="http://schemas.microsoft.com/office/powerpoint/2010/main" val="1960653282"/>
+        <p14:creationId xmlns:p14="http://schemas.microsoft.com/office/powerpoint/2010/main" val="2539703771"/>
       </p:ext>
     </p:extLst>
   </p:cSld>
@@ -3120,7 +3222,7 @@
           <a:p>
             <a:fld id="{B88E1A96-A68C-4ED7-8535-7FE27C72D2F0}" type="slidenum">
               <a:rPr lang="en-GB" smtClean="0"/>
-              <a:t>52</a:t>
+              <a:t>51</a:t>
             </a:fld>
             <a:endParaRPr lang="en-GB"/>
           </a:p>
@@ -3129,7 +3231,7 @@
     </p:spTree>
     <p:extLst>
       <p:ext uri="{BB962C8B-B14F-4D97-AF65-F5344CB8AC3E}">
-        <p14:creationId xmlns:p14="http://schemas.microsoft.com/office/powerpoint/2010/main" val="2539703771"/>
+        <p14:creationId xmlns:p14="http://schemas.microsoft.com/office/powerpoint/2010/main" val="2245795352"/>
       </p:ext>
     </p:extLst>
   </p:cSld>
@@ -3242,7 +3344,7 @@
           <a:p>
             <a:fld id="{B88E1A96-A68C-4ED7-8535-7FE27C72D2F0}" type="slidenum">
               <a:rPr lang="en-GB" smtClean="0"/>
-              <a:t>55</a:t>
+              <a:t>54</a:t>
             </a:fld>
             <a:endParaRPr lang="en-GB"/>
           </a:p>
@@ -3338,7 +3440,7 @@
           <a:p>
             <a:fld id="{B88E1A96-A68C-4ED7-8535-7FE27C72D2F0}" type="slidenum">
               <a:rPr lang="en-GB" smtClean="0"/>
-              <a:t>56</a:t>
+              <a:t>55</a:t>
             </a:fld>
             <a:endParaRPr lang="en-GB"/>
           </a:p>
@@ -3434,7 +3536,7 @@
           <a:p>
             <a:fld id="{B88E1A96-A68C-4ED7-8535-7FE27C72D2F0}" type="slidenum">
               <a:rPr lang="en-GB" smtClean="0"/>
-              <a:t>57</a:t>
+              <a:t>56</a:t>
             </a:fld>
             <a:endParaRPr lang="en-GB"/>
           </a:p>
@@ -3518,7 +3620,7 @@
           <a:p>
             <a:fld id="{B88E1A96-A68C-4ED7-8535-7FE27C72D2F0}" type="slidenum">
               <a:rPr lang="en-GB" smtClean="0"/>
-              <a:t>58</a:t>
+              <a:t>57</a:t>
             </a:fld>
             <a:endParaRPr lang="en-GB"/>
           </a:p>
@@ -3602,7 +3704,7 @@
           <a:p>
             <a:fld id="{B88E1A96-A68C-4ED7-8535-7FE27C72D2F0}" type="slidenum">
               <a:rPr lang="en-GB" smtClean="0"/>
-              <a:t>59</a:t>
+              <a:t>58</a:t>
             </a:fld>
             <a:endParaRPr lang="en-GB"/>
           </a:p>
@@ -3686,7 +3788,7 @@
           <a:p>
             <a:fld id="{B88E1A96-A68C-4ED7-8535-7FE27C72D2F0}" type="slidenum">
               <a:rPr lang="en-GB" smtClean="0"/>
-              <a:t>61</a:t>
+              <a:t>60</a:t>
             </a:fld>
             <a:endParaRPr lang="en-GB"/>
           </a:p>
@@ -3806,7 +3908,7 @@
           <a:p>
             <a:fld id="{B88E1A96-A68C-4ED7-8535-7FE27C72D2F0}" type="slidenum">
               <a:rPr lang="en-GB" smtClean="0"/>
-              <a:t>63</a:t>
+              <a:t>62</a:t>
             </a:fld>
             <a:endParaRPr lang="en-GB"/>
           </a:p>
@@ -8363,6 +8465,179 @@
                                     <p:set>
                                       <p:cBhvr>
                                         <p:cTn id="6" dur="1" fill="hold">
+                                          <p:stCondLst>
+                                            <p:cond delay="0"/>
+                                          </p:stCondLst>
+                                        </p:cTn>
+                                        <p:tgtEl>
+                                          <p:spTgt spid="3">
+                                            <p:txEl>
+                                              <p:pRg st="0" end="0"/>
+                                            </p:txEl>
+                                          </p:spTgt>
+                                        </p:tgtEl>
+                                        <p:attrNameLst>
+                                          <p:attrName>style.visibility</p:attrName>
+                                        </p:attrNameLst>
+                                      </p:cBhvr>
+                                      <p:to>
+                                        <p:strVal val="visible"/>
+                                      </p:to>
+                                    </p:set>
+                                  </p:childTnLst>
+                                </p:cTn>
+                              </p:par>
+                              <p:par>
+                                <p:cTn id="7" presetID="1" presetClass="entr" presetSubtype="0" fill="hold" nodeType="withEffect">
+                                  <p:stCondLst>
+                                    <p:cond delay="0"/>
+                                  </p:stCondLst>
+                                  <p:childTnLst>
+                                    <p:set>
+                                      <p:cBhvr>
+                                        <p:cTn id="8" dur="1" fill="hold">
+                                          <p:stCondLst>
+                                            <p:cond delay="0"/>
+                                          </p:stCondLst>
+                                        </p:cTn>
+                                        <p:tgtEl>
+                                          <p:spTgt spid="3">
+                                            <p:txEl>
+                                              <p:pRg st="1" end="1"/>
+                                            </p:txEl>
+                                          </p:spTgt>
+                                        </p:tgtEl>
+                                        <p:attrNameLst>
+                                          <p:attrName>style.visibility</p:attrName>
+                                        </p:attrNameLst>
+                                      </p:cBhvr>
+                                      <p:to>
+                                        <p:strVal val="visible"/>
+                                      </p:to>
+                                    </p:set>
+                                  </p:childTnLst>
+                                </p:cTn>
+                              </p:par>
+                              <p:par>
+                                <p:cTn id="9" presetID="1" presetClass="entr" presetSubtype="0" fill="hold" nodeType="withEffect">
+                                  <p:stCondLst>
+                                    <p:cond delay="0"/>
+                                  </p:stCondLst>
+                                  <p:childTnLst>
+                                    <p:set>
+                                      <p:cBhvr>
+                                        <p:cTn id="10" dur="1" fill="hold">
+                                          <p:stCondLst>
+                                            <p:cond delay="0"/>
+                                          </p:stCondLst>
+                                        </p:cTn>
+                                        <p:tgtEl>
+                                          <p:spTgt spid="3">
+                                            <p:txEl>
+                                              <p:pRg st="2" end="2"/>
+                                            </p:txEl>
+                                          </p:spTgt>
+                                        </p:tgtEl>
+                                        <p:attrNameLst>
+                                          <p:attrName>style.visibility</p:attrName>
+                                        </p:attrNameLst>
+                                      </p:cBhvr>
+                                      <p:to>
+                                        <p:strVal val="visible"/>
+                                      </p:to>
+                                    </p:set>
+                                  </p:childTnLst>
+                                </p:cTn>
+                              </p:par>
+                              <p:par>
+                                <p:cTn id="11" presetID="1" presetClass="entr" presetSubtype="0" fill="hold" nodeType="withEffect">
+                                  <p:stCondLst>
+                                    <p:cond delay="0"/>
+                                  </p:stCondLst>
+                                  <p:childTnLst>
+                                    <p:set>
+                                      <p:cBhvr>
+                                        <p:cTn id="12" dur="1" fill="hold">
+                                          <p:stCondLst>
+                                            <p:cond delay="0"/>
+                                          </p:stCondLst>
+                                        </p:cTn>
+                                        <p:tgtEl>
+                                          <p:spTgt spid="3">
+                                            <p:txEl>
+                                              <p:pRg st="3" end="3"/>
+                                            </p:txEl>
+                                          </p:spTgt>
+                                        </p:tgtEl>
+                                        <p:attrNameLst>
+                                          <p:attrName>style.visibility</p:attrName>
+                                        </p:attrNameLst>
+                                      </p:cBhvr>
+                                      <p:to>
+                                        <p:strVal val="visible"/>
+                                      </p:to>
+                                    </p:set>
+                                  </p:childTnLst>
+                                </p:cTn>
+                              </p:par>
+                              <p:par>
+                                <p:cTn id="13" presetID="1" presetClass="entr" presetSubtype="0" fill="hold" nodeType="withEffect">
+                                  <p:stCondLst>
+                                    <p:cond delay="0"/>
+                                  </p:stCondLst>
+                                  <p:childTnLst>
+                                    <p:set>
+                                      <p:cBhvr>
+                                        <p:cTn id="14" dur="1" fill="hold">
+                                          <p:stCondLst>
+                                            <p:cond delay="0"/>
+                                          </p:stCondLst>
+                                        </p:cTn>
+                                        <p:tgtEl>
+                                          <p:spTgt spid="3">
+                                            <p:txEl>
+                                              <p:pRg st="4" end="4"/>
+                                            </p:txEl>
+                                          </p:spTgt>
+                                        </p:tgtEl>
+                                        <p:attrNameLst>
+                                          <p:attrName>style.visibility</p:attrName>
+                                        </p:attrNameLst>
+                                      </p:cBhvr>
+                                      <p:to>
+                                        <p:strVal val="visible"/>
+                                      </p:to>
+                                    </p:set>
+                                  </p:childTnLst>
+                                </p:cTn>
+                              </p:par>
+                            </p:childTnLst>
+                          </p:cTn>
+                        </p:par>
+                      </p:childTnLst>
+                    </p:cTn>
+                  </p:par>
+                  <p:par>
+                    <p:cTn id="15" fill="hold">
+                      <p:stCondLst>
+                        <p:cond delay="indefinite"/>
+                      </p:stCondLst>
+                      <p:childTnLst>
+                        <p:par>
+                          <p:cTn id="16" fill="hold">
+                            <p:stCondLst>
+                              <p:cond delay="0"/>
+                            </p:stCondLst>
+                            <p:childTnLst>
+                              <p:par>
+                                <p:cTn id="17" presetID="1" presetClass="entr" presetSubtype="0" fill="hold" nodeType="clickEffect">
+                                  <p:stCondLst>
+                                    <p:cond delay="0"/>
+                                  </p:stCondLst>
+                                  <p:childTnLst>
+                                    <p:set>
+                                      <p:cBhvr>
+                                        <p:cTn id="18" dur="1" fill="hold">
                                           <p:stCondLst>
                                             <p:cond delay="0"/>
                                           </p:stCondLst>
@@ -14801,30 +15076,9 @@
             </a:r>
           </a:p>
           <a:p>
-            <a:endParaRPr lang="en-GB" dirty="0" smtClean="0"/>
-          </a:p>
-          <a:p>
-            <a:r>
-              <a:rPr lang="en-GB" dirty="0" smtClean="0"/>
-              <a:t>Different CAP trade-offs</a:t>
-            </a:r>
-          </a:p>
-          <a:p>
-            <a:pPr lvl="1"/>
-            <a:r>
-              <a:rPr lang="en-GB" dirty="0" smtClean="0"/>
-              <a:t>e.g. </a:t>
-            </a:r>
-            <a:r>
-              <a:rPr lang="en-GB" dirty="0" err="1" smtClean="0"/>
-              <a:t>CouchDB</a:t>
-            </a:r>
-            <a:r>
-              <a:rPr lang="en-GB" dirty="0" smtClean="0"/>
-              <a:t> (AP), MongoDB (CP)</a:t>
-            </a:r>
-          </a:p>
-          <a:p>
+            <a:pPr marL="0" indent="0">
+              <a:buNone/>
+            </a:pPr>
             <a:endParaRPr lang="en-GB" dirty="0"/>
           </a:p>
           <a:p>
@@ -14859,8 +15113,44 @@
             <a:pPr lvl="1"/>
             <a:r>
               <a:rPr lang="en-GB" dirty="0" smtClean="0"/>
-              <a:t>Summary queries</a:t>
-            </a:r>
+              <a:t>Summary </a:t>
+            </a:r>
+            <a:r>
+              <a:rPr lang="en-GB" dirty="0" smtClean="0"/>
+              <a:t>queries</a:t>
+            </a:r>
+          </a:p>
+          <a:p>
+            <a:endParaRPr lang="en-GB" dirty="0" smtClean="0"/>
+          </a:p>
+          <a:p>
+            <a:r>
+              <a:rPr lang="en-GB" dirty="0" smtClean="0"/>
+              <a:t>Different </a:t>
+            </a:r>
+            <a:r>
+              <a:rPr lang="en-GB" dirty="0"/>
+              <a:t>CAP trade-offs</a:t>
+            </a:r>
+          </a:p>
+          <a:p>
+            <a:pPr lvl="1"/>
+            <a:r>
+              <a:rPr lang="en-GB" dirty="0"/>
+              <a:t>e.g. </a:t>
+            </a:r>
+            <a:r>
+              <a:rPr lang="en-GB" dirty="0" err="1"/>
+              <a:t>CouchDB</a:t>
+            </a:r>
+            <a:r>
+              <a:rPr lang="en-GB" dirty="0"/>
+              <a:t> (AP), MongoDB (CP)</a:t>
+            </a:r>
+          </a:p>
+          <a:p>
+            <a:pPr lvl="1"/>
+            <a:endParaRPr lang="en-GB" dirty="0" smtClean="0"/>
           </a:p>
           <a:p>
             <a:endParaRPr lang="en-GB" dirty="0"/>
@@ -16932,7 +17222,7 @@
         </p:blipFill>
         <p:spPr>
           <a:xfrm>
-            <a:off x="6516216" y="476672"/>
+            <a:off x="467544" y="476672"/>
             <a:ext cx="2016224" cy="636033"/>
           </a:xfrm>
           <a:prstGeom prst="rect">
@@ -17104,14 +17394,19 @@
             <p:ph type="title"/>
           </p:nvPr>
         </p:nvSpPr>
-        <p:spPr/>
+        <p:spPr>
+          <a:xfrm>
+            <a:off x="457200" y="274638"/>
+            <a:ext cx="6419056" cy="1143000"/>
+          </a:xfrm>
+        </p:spPr>
         <p:txBody>
           <a:bodyPr/>
           <a:lstStyle/>
           <a:p>
             <a:r>
               <a:rPr lang="en-GB" dirty="0" smtClean="0"/>
-              <a:t>Cassandra</a:t>
+              <a:t>Apache Cassandra</a:t>
             </a:r>
             <a:endParaRPr lang="en-GB" dirty="0"/>
           </a:p>
@@ -18692,459 +18987,6 @@
           <a:lstStyle/>
           <a:p>
             <a:r>
-              <a:rPr lang="en-GB" dirty="0" err="1" smtClean="0"/>
-              <a:t>MapReduce</a:t>
-            </a:r>
-            <a:endParaRPr lang="en-GB" dirty="0"/>
-          </a:p>
-        </p:txBody>
-      </p:sp>
-      <p:sp>
-        <p:nvSpPr>
-          <p:cNvPr id="3" name="Content Placeholder 2"/>
-          <p:cNvSpPr>
-            <a:spLocks noGrp="1"/>
-          </p:cNvSpPr>
-          <p:nvPr>
-            <p:ph idx="1"/>
-          </p:nvPr>
-        </p:nvSpPr>
-        <p:spPr/>
-        <p:txBody>
-          <a:bodyPr/>
-          <a:lstStyle/>
-          <a:p>
-            <a:r>
-              <a:rPr lang="en-GB" dirty="0" smtClean="0"/>
-              <a:t>Method of aggregating data from multiple nodes</a:t>
-            </a:r>
-          </a:p>
-          <a:p>
-            <a:endParaRPr lang="en-GB" dirty="0"/>
-          </a:p>
-          <a:p>
-            <a:r>
-              <a:rPr lang="en-GB" dirty="0" smtClean="0"/>
-              <a:t>“Send the work to the data”</a:t>
-            </a:r>
-          </a:p>
-          <a:p>
-            <a:endParaRPr lang="en-GB" dirty="0"/>
-          </a:p>
-          <a:p>
-            <a:r>
-              <a:rPr lang="en-GB" dirty="0" smtClean="0"/>
-              <a:t>Implemented in </a:t>
-            </a:r>
-            <a:r>
-              <a:rPr lang="en-GB" dirty="0" err="1" smtClean="0"/>
-              <a:t>Riak</a:t>
-            </a:r>
-            <a:r>
-              <a:rPr lang="en-GB" dirty="0" smtClean="0"/>
-              <a:t>, </a:t>
-            </a:r>
-            <a:r>
-              <a:rPr lang="en-GB" dirty="0" err="1" smtClean="0"/>
-              <a:t>MongoDB</a:t>
-            </a:r>
-            <a:r>
-              <a:rPr lang="en-GB" dirty="0" smtClean="0"/>
-              <a:t>, Hadoop (etc.)</a:t>
-            </a:r>
-            <a:endParaRPr lang="en-GB" dirty="0"/>
-          </a:p>
-        </p:txBody>
-      </p:sp>
-    </p:spTree>
-    <p:extLst>
-      <p:ext uri="{BB962C8B-B14F-4D97-AF65-F5344CB8AC3E}">
-        <p14:creationId xmlns:p14="http://schemas.microsoft.com/office/powerpoint/2010/main" val="1303029299"/>
-      </p:ext>
-    </p:extLst>
-  </p:cSld>
-  <p:clrMapOvr>
-    <a:masterClrMapping/>
-  </p:clrMapOvr>
-  <p:timing>
-    <p:tnLst>
-      <p:par>
-        <p:cTn id="1" dur="indefinite" restart="never" nodeType="tmRoot"/>
-      </p:par>
-    </p:tnLst>
-  </p:timing>
-</p:sld>
-</file>
-
-<file path=ppt/slides/slide49.xml><?xml version="1.0" encoding="utf-8"?>
-<p:sld xmlns:a="http://schemas.openxmlformats.org/drawingml/2006/main" xmlns:r="http://schemas.openxmlformats.org/officeDocument/2006/relationships" xmlns:p="http://schemas.openxmlformats.org/presentationml/2006/main">
-  <p:cSld>
-    <p:spTree>
-      <p:nvGrpSpPr>
-        <p:cNvPr id="1" name=""/>
-        <p:cNvGrpSpPr/>
-        <p:nvPr/>
-      </p:nvGrpSpPr>
-      <p:grpSpPr>
-        <a:xfrm>
-          <a:off x="0" y="0"/>
-          <a:ext cx="0" cy="0"/>
-          <a:chOff x="0" y="0"/>
-          <a:chExt cx="0" cy="0"/>
-        </a:xfrm>
-      </p:grpSpPr>
-      <p:sp>
-        <p:nvSpPr>
-          <p:cNvPr id="2" name="Title 1"/>
-          <p:cNvSpPr>
-            <a:spLocks noGrp="1"/>
-          </p:cNvSpPr>
-          <p:nvPr>
-            <p:ph type="title"/>
-          </p:nvPr>
-        </p:nvSpPr>
-        <p:spPr/>
-        <p:txBody>
-          <a:bodyPr/>
-          <a:lstStyle/>
-          <a:p>
-            <a:r>
-              <a:rPr lang="en-GB" dirty="0" err="1" smtClean="0"/>
-              <a:t>MapReduce</a:t>
-            </a:r>
-            <a:endParaRPr lang="en-GB" dirty="0"/>
-          </a:p>
-        </p:txBody>
-      </p:sp>
-      <p:sp>
-        <p:nvSpPr>
-          <p:cNvPr id="3" name="Content Placeholder 2"/>
-          <p:cNvSpPr>
-            <a:spLocks noGrp="1"/>
-          </p:cNvSpPr>
-          <p:nvPr>
-            <p:ph idx="1"/>
-          </p:nvPr>
-        </p:nvSpPr>
-        <p:spPr/>
-        <p:txBody>
-          <a:bodyPr/>
-          <a:lstStyle/>
-          <a:p>
-            <a:r>
-              <a:rPr lang="en-GB" dirty="0" smtClean="0"/>
-              <a:t>(PUT DIAGRAM HERE)</a:t>
-            </a:r>
-            <a:endParaRPr lang="en-GB" dirty="0"/>
-          </a:p>
-        </p:txBody>
-      </p:sp>
-    </p:spTree>
-    <p:extLst>
-      <p:ext uri="{BB962C8B-B14F-4D97-AF65-F5344CB8AC3E}">
-        <p14:creationId xmlns:p14="http://schemas.microsoft.com/office/powerpoint/2010/main" val="692788270"/>
-      </p:ext>
-    </p:extLst>
-  </p:cSld>
-  <p:clrMapOvr>
-    <a:masterClrMapping/>
-  </p:clrMapOvr>
-  <p:timing>
-    <p:tnLst>
-      <p:par>
-        <p:cTn id="1" dur="indefinite" restart="never" nodeType="tmRoot"/>
-      </p:par>
-    </p:tnLst>
-  </p:timing>
-</p:sld>
-</file>
-
-<file path=ppt/slides/slide5.xml><?xml version="1.0" encoding="utf-8"?>
-<p:sld xmlns:a="http://schemas.openxmlformats.org/drawingml/2006/main" xmlns:r="http://schemas.openxmlformats.org/officeDocument/2006/relationships" xmlns:p="http://schemas.openxmlformats.org/presentationml/2006/main">
-  <p:cSld>
-    <p:spTree>
-      <p:nvGrpSpPr>
-        <p:cNvPr id="1" name=""/>
-        <p:cNvGrpSpPr/>
-        <p:nvPr/>
-      </p:nvGrpSpPr>
-      <p:grpSpPr>
-        <a:xfrm>
-          <a:off x="0" y="0"/>
-          <a:ext cx="0" cy="0"/>
-          <a:chOff x="0" y="0"/>
-          <a:chExt cx="0" cy="0"/>
-        </a:xfrm>
-      </p:grpSpPr>
-      <p:sp>
-        <p:nvSpPr>
-          <p:cNvPr id="2" name="Title 1"/>
-          <p:cNvSpPr>
-            <a:spLocks noGrp="1"/>
-          </p:cNvSpPr>
-          <p:nvPr>
-            <p:ph type="title"/>
-          </p:nvPr>
-        </p:nvSpPr>
-        <p:spPr/>
-        <p:txBody>
-          <a:bodyPr/>
-          <a:lstStyle/>
-          <a:p>
-            <a:r>
-              <a:rPr lang="en-GB" dirty="0" smtClean="0"/>
-              <a:t>10 Years Ago</a:t>
-            </a:r>
-            <a:endParaRPr lang="en-GB" dirty="0"/>
-          </a:p>
-        </p:txBody>
-      </p:sp>
-      <p:sp>
-        <p:nvSpPr>
-          <p:cNvPr id="7" name="Content Placeholder 6"/>
-          <p:cNvSpPr>
-            <a:spLocks noGrp="1"/>
-          </p:cNvSpPr>
-          <p:nvPr>
-            <p:ph idx="1"/>
-          </p:nvPr>
-        </p:nvSpPr>
-        <p:spPr/>
-        <p:txBody>
-          <a:bodyPr>
-            <a:normAutofit lnSpcReduction="10000"/>
-          </a:bodyPr>
-          <a:lstStyle/>
-          <a:p>
-            <a:pPr marL="0" indent="0">
-              <a:buNone/>
-            </a:pPr>
-            <a:r>
-              <a:rPr lang="en-GB" dirty="0" smtClean="0"/>
-              <a:t>“OLTP”</a:t>
-            </a:r>
-          </a:p>
-          <a:p>
-            <a:r>
-              <a:rPr lang="en-GB" sz="2800" dirty="0"/>
-              <a:t>A</a:t>
-            </a:r>
-            <a:r>
-              <a:rPr lang="en-GB" sz="2800" dirty="0" smtClean="0"/>
-              <a:t>pplication access, lots of small queries, updates</a:t>
-            </a:r>
-          </a:p>
-          <a:p>
-            <a:r>
-              <a:rPr lang="en-GB" sz="2800" dirty="0" smtClean="0"/>
-              <a:t>Lightly Indexed, Normalised</a:t>
-            </a:r>
-          </a:p>
-          <a:p>
-            <a:endParaRPr lang="en-GB" sz="2800" dirty="0" smtClean="0"/>
-          </a:p>
-          <a:p>
-            <a:pPr marL="0" indent="0">
-              <a:buNone/>
-            </a:pPr>
-            <a:r>
-              <a:rPr lang="en-GB" dirty="0" smtClean="0"/>
-              <a:t>Data Warehouse/ “OLAP”</a:t>
-            </a:r>
-          </a:p>
-          <a:p>
-            <a:r>
-              <a:rPr lang="en-GB" sz="2800" dirty="0" smtClean="0"/>
-              <a:t>Large, ad-hoc </a:t>
-            </a:r>
-            <a:r>
-              <a:rPr lang="en-GB" sz="2800" dirty="0"/>
-              <a:t>a</a:t>
-            </a:r>
-            <a:r>
-              <a:rPr lang="en-GB" sz="2800" dirty="0" smtClean="0"/>
-              <a:t>nalytical </a:t>
-            </a:r>
-            <a:r>
-              <a:rPr lang="en-GB" sz="2800" dirty="0"/>
-              <a:t>q</a:t>
-            </a:r>
-            <a:r>
-              <a:rPr lang="en-GB" sz="2800" dirty="0" smtClean="0"/>
-              <a:t>ueries – read-mostly</a:t>
-            </a:r>
-          </a:p>
-          <a:p>
-            <a:r>
-              <a:rPr lang="en-GB" sz="2800" dirty="0" smtClean="0"/>
-              <a:t>Heavily Indexed, </a:t>
-            </a:r>
-            <a:r>
-              <a:rPr lang="en-GB" sz="2800" dirty="0" err="1" smtClean="0"/>
-              <a:t>Denormalised</a:t>
-            </a:r>
-            <a:endParaRPr lang="en-GB" sz="2800" dirty="0" smtClean="0"/>
-          </a:p>
-          <a:p>
-            <a:pPr marL="0" indent="0">
-              <a:buNone/>
-            </a:pPr>
-            <a:endParaRPr lang="en-GB" sz="2800" dirty="0" smtClean="0"/>
-          </a:p>
-          <a:p>
-            <a:pPr marL="0" indent="0">
-              <a:buNone/>
-            </a:pPr>
-            <a:r>
-              <a:rPr lang="en-GB" sz="2800" b="1" i="1" dirty="0" smtClean="0">
-                <a:solidFill>
-                  <a:srgbClr val="FF0000"/>
-                </a:solidFill>
-              </a:rPr>
-              <a:t>BUT – all done in SQL/ Relational</a:t>
-            </a:r>
-            <a:endParaRPr lang="en-GB" sz="2800" b="1" i="1" dirty="0">
-              <a:solidFill>
-                <a:srgbClr val="FF0000"/>
-              </a:solidFill>
-            </a:endParaRPr>
-          </a:p>
-          <a:p>
-            <a:endParaRPr lang="en-GB" sz="2800" dirty="0" smtClean="0"/>
-          </a:p>
-          <a:p>
-            <a:pPr marL="0" indent="0">
-              <a:buNone/>
-            </a:pPr>
-            <a:endParaRPr lang="en-GB" dirty="0"/>
-          </a:p>
-        </p:txBody>
-      </p:sp>
-    </p:spTree>
-    <p:extLst>
-      <p:ext uri="{BB962C8B-B14F-4D97-AF65-F5344CB8AC3E}">
-        <p14:creationId xmlns:p14="http://schemas.microsoft.com/office/powerpoint/2010/main" val="3268761550"/>
-      </p:ext>
-    </p:extLst>
-  </p:cSld>
-  <p:clrMapOvr>
-    <a:masterClrMapping/>
-  </p:clrMapOvr>
-  <p:timing>
-    <p:tnLst>
-      <p:par>
-        <p:cTn id="1" dur="indefinite" restart="never" nodeType="tmRoot">
-          <p:childTnLst>
-            <p:seq concurrent="1" nextAc="seek">
-              <p:cTn id="2" dur="indefinite" nodeType="mainSeq">
-                <p:childTnLst>
-                  <p:par>
-                    <p:cTn id="3" fill="hold">
-                      <p:stCondLst>
-                        <p:cond delay="indefinite"/>
-                      </p:stCondLst>
-                      <p:childTnLst>
-                        <p:par>
-                          <p:cTn id="4" fill="hold">
-                            <p:stCondLst>
-                              <p:cond delay="0"/>
-                            </p:stCondLst>
-                            <p:childTnLst>
-                              <p:par>
-                                <p:cTn id="5" presetID="1" presetClass="entr" presetSubtype="0" fill="hold" nodeType="clickEffect">
-                                  <p:stCondLst>
-                                    <p:cond delay="0"/>
-                                  </p:stCondLst>
-                                  <p:childTnLst>
-                                    <p:set>
-                                      <p:cBhvr>
-                                        <p:cTn id="6" dur="1" fill="hold">
-                                          <p:stCondLst>
-                                            <p:cond delay="0"/>
-                                          </p:stCondLst>
-                                        </p:cTn>
-                                        <p:tgtEl>
-                                          <p:spTgt spid="7">
-                                            <p:txEl>
-                                              <p:pRg st="8" end="8"/>
-                                            </p:txEl>
-                                          </p:spTgt>
-                                        </p:tgtEl>
-                                        <p:attrNameLst>
-                                          <p:attrName>style.visibility</p:attrName>
-                                        </p:attrNameLst>
-                                      </p:cBhvr>
-                                      <p:to>
-                                        <p:strVal val="visible"/>
-                                      </p:to>
-                                    </p:set>
-                                  </p:childTnLst>
-                                </p:cTn>
-                              </p:par>
-                            </p:childTnLst>
-                          </p:cTn>
-                        </p:par>
-                      </p:childTnLst>
-                    </p:cTn>
-                  </p:par>
-                </p:childTnLst>
-              </p:cTn>
-              <p:prevCondLst>
-                <p:cond evt="onPrev" delay="0">
-                  <p:tgtEl>
-                    <p:sldTgt/>
-                  </p:tgtEl>
-                </p:cond>
-              </p:prevCondLst>
-              <p:nextCondLst>
-                <p:cond evt="onNext" delay="0">
-                  <p:tgtEl>
-                    <p:sldTgt/>
-                  </p:tgtEl>
-                </p:cond>
-              </p:nextCondLst>
-            </p:seq>
-          </p:childTnLst>
-        </p:cTn>
-      </p:par>
-    </p:tnLst>
-  </p:timing>
-</p:sld>
-</file>
-
-<file path=ppt/slides/slide50.xml><?xml version="1.0" encoding="utf-8"?>
-<p:sld xmlns:a="http://schemas.openxmlformats.org/drawingml/2006/main" xmlns:r="http://schemas.openxmlformats.org/officeDocument/2006/relationships" xmlns:p="http://schemas.openxmlformats.org/presentationml/2006/main">
-  <p:cSld>
-    <p:spTree>
-      <p:nvGrpSpPr>
-        <p:cNvPr id="1" name=""/>
-        <p:cNvGrpSpPr/>
-        <p:nvPr/>
-      </p:nvGrpSpPr>
-      <p:grpSpPr>
-        <a:xfrm>
-          <a:off x="0" y="0"/>
-          <a:ext cx="0" cy="0"/>
-          <a:chOff x="0" y="0"/>
-          <a:chExt cx="0" cy="0"/>
-        </a:xfrm>
-      </p:grpSpPr>
-      <p:sp>
-        <p:nvSpPr>
-          <p:cNvPr id="2" name="Title 1"/>
-          <p:cNvSpPr>
-            <a:spLocks noGrp="1"/>
-          </p:cNvSpPr>
-          <p:nvPr>
-            <p:ph type="title"/>
-          </p:nvPr>
-        </p:nvSpPr>
-        <p:spPr/>
-        <p:txBody>
-          <a:bodyPr/>
-          <a:lstStyle/>
-          <a:p>
-            <a:r>
               <a:rPr lang="en-GB" dirty="0" smtClean="0"/>
               <a:t>Hadoop</a:t>
             </a:r>
@@ -19352,7 +19194,7 @@
 </p:sld>
 </file>
 
-<file path=ppt/slides/slide51.xml><?xml version="1.0" encoding="utf-8"?>
+<file path=ppt/slides/slide49.xml><?xml version="1.0" encoding="utf-8"?>
 <p:sld xmlns:a="http://schemas.openxmlformats.org/drawingml/2006/main" xmlns:r="http://schemas.openxmlformats.org/officeDocument/2006/relationships" xmlns:p="http://schemas.openxmlformats.org/presentationml/2006/main">
   <p:cSld>
     <p:spTree>
@@ -19512,7 +19354,260 @@
 </p:sld>
 </file>
 
-<file path=ppt/slides/slide52.xml><?xml version="1.0" encoding="utf-8"?>
+<file path=ppt/slides/slide5.xml><?xml version="1.0" encoding="utf-8"?>
+<p:sld xmlns:a="http://schemas.openxmlformats.org/drawingml/2006/main" xmlns:r="http://schemas.openxmlformats.org/officeDocument/2006/relationships" xmlns:p="http://schemas.openxmlformats.org/presentationml/2006/main">
+  <p:cSld>
+    <p:spTree>
+      <p:nvGrpSpPr>
+        <p:cNvPr id="1" name=""/>
+        <p:cNvGrpSpPr/>
+        <p:nvPr/>
+      </p:nvGrpSpPr>
+      <p:grpSpPr>
+        <a:xfrm>
+          <a:off x="0" y="0"/>
+          <a:ext cx="0" cy="0"/>
+          <a:chOff x="0" y="0"/>
+          <a:chExt cx="0" cy="0"/>
+        </a:xfrm>
+      </p:grpSpPr>
+      <p:sp>
+        <p:nvSpPr>
+          <p:cNvPr id="2" name="Title 1"/>
+          <p:cNvSpPr>
+            <a:spLocks noGrp="1"/>
+          </p:cNvSpPr>
+          <p:nvPr>
+            <p:ph type="title"/>
+          </p:nvPr>
+        </p:nvSpPr>
+        <p:spPr/>
+        <p:txBody>
+          <a:bodyPr/>
+          <a:lstStyle/>
+          <a:p>
+            <a:r>
+              <a:rPr lang="en-GB" dirty="0" smtClean="0"/>
+              <a:t>10 Years Ago</a:t>
+            </a:r>
+            <a:endParaRPr lang="en-GB" dirty="0"/>
+          </a:p>
+        </p:txBody>
+      </p:sp>
+      <p:sp>
+        <p:nvSpPr>
+          <p:cNvPr id="7" name="Content Placeholder 6"/>
+          <p:cNvSpPr>
+            <a:spLocks noGrp="1"/>
+          </p:cNvSpPr>
+          <p:nvPr>
+            <p:ph idx="1"/>
+          </p:nvPr>
+        </p:nvSpPr>
+        <p:spPr/>
+        <p:txBody>
+          <a:bodyPr>
+            <a:normAutofit lnSpcReduction="10000"/>
+          </a:bodyPr>
+          <a:lstStyle/>
+          <a:p>
+            <a:pPr marL="0" indent="0">
+              <a:buNone/>
+            </a:pPr>
+            <a:r>
+              <a:rPr lang="en-GB" dirty="0" smtClean="0"/>
+              <a:t>“OLTP”</a:t>
+            </a:r>
+          </a:p>
+          <a:p>
+            <a:r>
+              <a:rPr lang="en-GB" sz="2800" dirty="0"/>
+              <a:t>A</a:t>
+            </a:r>
+            <a:r>
+              <a:rPr lang="en-GB" sz="2800" dirty="0" smtClean="0"/>
+              <a:t>pplication access, lots of small queries, updates</a:t>
+            </a:r>
+          </a:p>
+          <a:p>
+            <a:r>
+              <a:rPr lang="en-GB" sz="2800" dirty="0" smtClean="0"/>
+              <a:t>Lightly Indexed, Normalised</a:t>
+            </a:r>
+          </a:p>
+          <a:p>
+            <a:endParaRPr lang="en-GB" sz="2800" dirty="0" smtClean="0"/>
+          </a:p>
+          <a:p>
+            <a:pPr marL="0" indent="0">
+              <a:buNone/>
+            </a:pPr>
+            <a:r>
+              <a:rPr lang="en-GB" dirty="0" smtClean="0"/>
+              <a:t>Data Warehouse/ “OLAP”</a:t>
+            </a:r>
+          </a:p>
+          <a:p>
+            <a:r>
+              <a:rPr lang="en-GB" sz="2800" dirty="0" smtClean="0"/>
+              <a:t>Large, ad-hoc </a:t>
+            </a:r>
+            <a:r>
+              <a:rPr lang="en-GB" sz="2800" dirty="0"/>
+              <a:t>a</a:t>
+            </a:r>
+            <a:r>
+              <a:rPr lang="en-GB" sz="2800" dirty="0" smtClean="0"/>
+              <a:t>nalytical </a:t>
+            </a:r>
+            <a:r>
+              <a:rPr lang="en-GB" sz="2800" dirty="0"/>
+              <a:t>q</a:t>
+            </a:r>
+            <a:r>
+              <a:rPr lang="en-GB" sz="2800" dirty="0" smtClean="0"/>
+              <a:t>ueries – read-mostly</a:t>
+            </a:r>
+          </a:p>
+          <a:p>
+            <a:r>
+              <a:rPr lang="en-GB" sz="2800" dirty="0" smtClean="0"/>
+              <a:t>Heavily Indexed, </a:t>
+            </a:r>
+            <a:r>
+              <a:rPr lang="en-GB" sz="2800" dirty="0" err="1" smtClean="0"/>
+              <a:t>Denormalised</a:t>
+            </a:r>
+            <a:endParaRPr lang="en-GB" sz="2800" dirty="0" smtClean="0"/>
+          </a:p>
+          <a:p>
+            <a:pPr marL="0" indent="0">
+              <a:buNone/>
+            </a:pPr>
+            <a:endParaRPr lang="en-GB" sz="2800" dirty="0" smtClean="0"/>
+          </a:p>
+          <a:p>
+            <a:pPr marL="0" indent="0">
+              <a:buNone/>
+            </a:pPr>
+            <a:r>
+              <a:rPr lang="en-GB" sz="2800" b="1" i="1" dirty="0" smtClean="0">
+                <a:solidFill>
+                  <a:srgbClr val="FF0000"/>
+                </a:solidFill>
+              </a:rPr>
+              <a:t>BUT – all done in SQL/ Relational</a:t>
+            </a:r>
+            <a:endParaRPr lang="en-GB" sz="2800" b="1" i="1" dirty="0">
+              <a:solidFill>
+                <a:srgbClr val="FF0000"/>
+              </a:solidFill>
+            </a:endParaRPr>
+          </a:p>
+          <a:p>
+            <a:endParaRPr lang="en-GB" sz="2800" dirty="0" smtClean="0"/>
+          </a:p>
+          <a:p>
+            <a:pPr marL="0" indent="0">
+              <a:buNone/>
+            </a:pPr>
+            <a:endParaRPr lang="en-GB" dirty="0"/>
+          </a:p>
+        </p:txBody>
+      </p:sp>
+    </p:spTree>
+    <p:extLst>
+      <p:ext uri="{BB962C8B-B14F-4D97-AF65-F5344CB8AC3E}">
+        <p14:creationId xmlns:p14="http://schemas.microsoft.com/office/powerpoint/2010/main" val="3268761550"/>
+      </p:ext>
+    </p:extLst>
+  </p:cSld>
+  <p:clrMapOvr>
+    <a:masterClrMapping/>
+  </p:clrMapOvr>
+  <p:timing>
+    <p:tnLst>
+      <p:par>
+        <p:cTn id="1" dur="indefinite" restart="never" nodeType="tmRoot">
+          <p:childTnLst>
+            <p:seq concurrent="1" nextAc="seek">
+              <p:cTn id="2" dur="indefinite" nodeType="mainSeq">
+                <p:childTnLst>
+                  <p:par>
+                    <p:cTn id="3" fill="hold">
+                      <p:stCondLst>
+                        <p:cond delay="indefinite"/>
+                      </p:stCondLst>
+                      <p:childTnLst>
+                        <p:par>
+                          <p:cTn id="4" fill="hold">
+                            <p:stCondLst>
+                              <p:cond delay="0"/>
+                            </p:stCondLst>
+                            <p:childTnLst>
+                              <p:par>
+                                <p:cTn id="5" presetID="1" presetClass="entr" presetSubtype="0" fill="hold" nodeType="clickEffect">
+                                  <p:stCondLst>
+                                    <p:cond delay="0"/>
+                                  </p:stCondLst>
+                                  <p:childTnLst>
+                                    <p:set>
+                                      <p:cBhvr>
+                                        <p:cTn id="6" dur="1" fill="hold">
+                                          <p:stCondLst>
+                                            <p:cond delay="0"/>
+                                          </p:stCondLst>
+                                        </p:cTn>
+                                        <p:tgtEl>
+                                          <p:spTgt spid="7">
+                                            <p:txEl>
+                                              <p:pRg st="8" end="8"/>
+                                            </p:txEl>
+                                          </p:spTgt>
+                                        </p:tgtEl>
+                                        <p:attrNameLst>
+                                          <p:attrName>style.visibility</p:attrName>
+                                        </p:attrNameLst>
+                                      </p:cBhvr>
+                                      <p:to>
+                                        <p:strVal val="visible"/>
+                                      </p:to>
+                                    </p:set>
+                                  </p:childTnLst>
+                                </p:cTn>
+                              </p:par>
+                            </p:childTnLst>
+                          </p:cTn>
+                        </p:par>
+                      </p:childTnLst>
+                    </p:cTn>
+                  </p:par>
+                </p:childTnLst>
+              </p:cTn>
+              <p:prevCondLst>
+                <p:cond evt="onPrev" delay="0">
+                  <p:tgtEl>
+                    <p:sldTgt/>
+                  </p:tgtEl>
+                </p:cond>
+              </p:prevCondLst>
+              <p:nextCondLst>
+                <p:cond evt="onNext" delay="0">
+                  <p:tgtEl>
+                    <p:sldTgt/>
+                  </p:tgtEl>
+                </p:cond>
+              </p:nextCondLst>
+            </p:seq>
+          </p:childTnLst>
+        </p:cTn>
+      </p:par>
+    </p:tnLst>
+  </p:timing>
+</p:sld>
+</file>
+
+<file path=ppt/slides/slide50.xml><?xml version="1.0" encoding="utf-8"?>
 <p:sld xmlns:a="http://schemas.openxmlformats.org/drawingml/2006/main" xmlns:r="http://schemas.openxmlformats.org/officeDocument/2006/relationships" xmlns:p="http://schemas.openxmlformats.org/presentationml/2006/main">
   <p:cSld>
     <p:spTree>
@@ -20539,7 +20634,140 @@
 </p:sld>
 </file>
 
-<file path=ppt/slides/slide53.xml><?xml version="1.0" encoding="utf-8"?>
+<file path=ppt/slides/slide51.xml><?xml version="1.0" encoding="utf-8"?>
+<p:sld xmlns:a="http://schemas.openxmlformats.org/drawingml/2006/main" xmlns:r="http://schemas.openxmlformats.org/officeDocument/2006/relationships" xmlns:p="http://schemas.openxmlformats.org/presentationml/2006/main">
+  <p:cSld>
+    <p:spTree>
+      <p:nvGrpSpPr>
+        <p:cNvPr id="1" name=""/>
+        <p:cNvGrpSpPr/>
+        <p:nvPr/>
+      </p:nvGrpSpPr>
+      <p:grpSpPr>
+        <a:xfrm>
+          <a:off x="0" y="0"/>
+          <a:ext cx="0" cy="0"/>
+          <a:chOff x="0" y="0"/>
+          <a:chExt cx="0" cy="0"/>
+        </a:xfrm>
+      </p:grpSpPr>
+      <p:sp>
+        <p:nvSpPr>
+          <p:cNvPr id="2" name="Title 1"/>
+          <p:cNvSpPr>
+            <a:spLocks noGrp="1"/>
+          </p:cNvSpPr>
+          <p:nvPr>
+            <p:ph type="title"/>
+          </p:nvPr>
+        </p:nvSpPr>
+        <p:spPr/>
+        <p:txBody>
+          <a:bodyPr/>
+          <a:lstStyle/>
+          <a:p>
+            <a:r>
+              <a:rPr lang="en-GB" dirty="0" err="1" smtClean="0"/>
+              <a:t>MapReduce</a:t>
+            </a:r>
+            <a:endParaRPr lang="en-GB" dirty="0"/>
+          </a:p>
+        </p:txBody>
+      </p:sp>
+      <p:sp>
+        <p:nvSpPr>
+          <p:cNvPr id="3" name="Content Placeholder 2"/>
+          <p:cNvSpPr>
+            <a:spLocks noGrp="1"/>
+          </p:cNvSpPr>
+          <p:nvPr>
+            <p:ph idx="1"/>
+          </p:nvPr>
+        </p:nvSpPr>
+        <p:spPr/>
+        <p:txBody>
+          <a:bodyPr/>
+          <a:lstStyle/>
+          <a:p>
+            <a:r>
+              <a:rPr lang="en-GB" dirty="0" smtClean="0"/>
+              <a:t>Method of aggregating data from multiple nodes</a:t>
+            </a:r>
+          </a:p>
+          <a:p>
+            <a:endParaRPr lang="en-GB" dirty="0"/>
+          </a:p>
+          <a:p>
+            <a:r>
+              <a:rPr lang="en-GB" dirty="0" smtClean="0"/>
+              <a:t>“Send the work to the data”</a:t>
+            </a:r>
+          </a:p>
+          <a:p>
+            <a:endParaRPr lang="en-GB" dirty="0"/>
+          </a:p>
+          <a:p>
+            <a:r>
+              <a:rPr lang="en-GB" dirty="0" smtClean="0"/>
+              <a:t>Also i</a:t>
+            </a:r>
+            <a:r>
+              <a:rPr lang="en-GB" dirty="0" smtClean="0"/>
+              <a:t>mplemented </a:t>
+            </a:r>
+            <a:r>
+              <a:rPr lang="en-GB" dirty="0" smtClean="0"/>
+              <a:t>in </a:t>
+            </a:r>
+            <a:r>
+              <a:rPr lang="en-GB" dirty="0" err="1" smtClean="0"/>
+              <a:t>Riak</a:t>
+            </a:r>
+            <a:r>
+              <a:rPr lang="en-GB" dirty="0" smtClean="0"/>
+              <a:t>, </a:t>
+            </a:r>
+            <a:r>
+              <a:rPr lang="en-GB" dirty="0" smtClean="0"/>
+              <a:t>MongoDB</a:t>
+            </a:r>
+            <a:r>
+              <a:rPr lang="en-GB" dirty="0"/>
+              <a:t> </a:t>
+            </a:r>
+            <a:r>
+              <a:rPr lang="en-GB" dirty="0" smtClean="0"/>
+              <a:t>(etc</a:t>
+            </a:r>
+            <a:r>
+              <a:rPr lang="en-GB" dirty="0" smtClean="0"/>
+              <a:t>.)</a:t>
+            </a:r>
+            <a:endParaRPr lang="en-GB" dirty="0"/>
+          </a:p>
+        </p:txBody>
+      </p:sp>
+    </p:spTree>
+    <p:extLst>
+      <p:ext uri="{BB962C8B-B14F-4D97-AF65-F5344CB8AC3E}">
+        <p14:creationId xmlns:p14="http://schemas.microsoft.com/office/powerpoint/2010/main" val="1303029299"/>
+      </p:ext>
+    </p:extLst>
+  </p:cSld>
+  <p:clrMapOvr>
+    <a:masterClrMapping/>
+  </p:clrMapOvr>
+  <p:timing>
+    <p:tnLst>
+      <p:par>
+        <p:cTn id="1" dur="indefinite" restart="never" nodeType="tmRoot"/>
+      </p:par>
+    </p:tnLst>
+  </p:timing>
+</p:sld>
+</file>
+
+<file path=ppt/slides/slide52.xml><?xml version="1.0" encoding="utf-8"?>
 <p:sld xmlns:a="http://schemas.openxmlformats.org/drawingml/2006/main" xmlns:r="http://schemas.openxmlformats.org/officeDocument/2006/relationships" xmlns:p="http://schemas.openxmlformats.org/presentationml/2006/main">
   <p:cSld>
     <p:spTree>
@@ -20626,7 +20854,7 @@
 </p:sld>
 </file>
 
-<file path=ppt/slides/slide54.xml><?xml version="1.0" encoding="utf-8"?>
+<file path=ppt/slides/slide53.xml><?xml version="1.0" encoding="utf-8"?>
 <p:sld xmlns:a="http://schemas.openxmlformats.org/drawingml/2006/main" xmlns:r="http://schemas.openxmlformats.org/officeDocument/2006/relationships" xmlns:p="http://schemas.openxmlformats.org/presentationml/2006/main">
   <p:cSld>
     <p:spTree>
@@ -20683,7 +20911,7 @@
         <p:spPr/>
         <p:txBody>
           <a:bodyPr>
-            <a:normAutofit fontScale="92500" lnSpcReduction="20000"/>
+            <a:normAutofit fontScale="85000" lnSpcReduction="20000"/>
           </a:bodyPr>
           <a:lstStyle/>
           <a:p>
@@ -20735,6 +20963,12 @@
               <a:t>Related tools:</a:t>
             </a:r>
             <a:endParaRPr lang="en-GB" dirty="0"/>
+          </a:p>
+          <a:p>
+            <a:pPr marL="457200" lvl="1" indent="0">
+              <a:buNone/>
+            </a:pPr>
+            <a:endParaRPr lang="en-GB" sz="2400" i="1" dirty="0" smtClean="0"/>
           </a:p>
           <a:p>
             <a:pPr marL="457200" lvl="1" indent="0">
@@ -20941,7 +21175,7 @@
         </p:blipFill>
         <p:spPr>
           <a:xfrm>
-            <a:off x="6804248" y="4572127"/>
+            <a:off x="6732240" y="4509120"/>
             <a:ext cx="1584176" cy="297033"/>
           </a:xfrm>
           <a:prstGeom prst="rect">
@@ -20969,7 +21203,7 @@
 </p:sld>
 </file>
 
-<file path=ppt/slides/slide55.xml><?xml version="1.0" encoding="utf-8"?>
+<file path=ppt/slides/slide54.xml><?xml version="1.0" encoding="utf-8"?>
 <p:sld xmlns:a="http://schemas.openxmlformats.org/drawingml/2006/main" xmlns:r="http://schemas.openxmlformats.org/officeDocument/2006/relationships" xmlns:p="http://schemas.openxmlformats.org/presentationml/2006/main">
   <p:cSld>
     <p:spTree>
@@ -21075,7 +21309,7 @@
 </p:sld>
 </file>
 
-<file path=ppt/slides/slide56.xml><?xml version="1.0" encoding="utf-8"?>
+<file path=ppt/slides/slide55.xml><?xml version="1.0" encoding="utf-8"?>
 <p:sld xmlns:a="http://schemas.openxmlformats.org/drawingml/2006/main" xmlns:r="http://schemas.openxmlformats.org/officeDocument/2006/relationships" xmlns:p="http://schemas.openxmlformats.org/presentationml/2006/main">
   <p:cSld>
     <p:spTree>
@@ -21193,7 +21427,7 @@
 </p:sld>
 </file>
 
-<file path=ppt/slides/slide57.xml><?xml version="1.0" encoding="utf-8"?>
+<file path=ppt/slides/slide56.xml><?xml version="1.0" encoding="utf-8"?>
 <p:sld xmlns:a="http://schemas.openxmlformats.org/drawingml/2006/main" xmlns:r="http://schemas.openxmlformats.org/officeDocument/2006/relationships" xmlns:p="http://schemas.openxmlformats.org/presentationml/2006/main">
   <p:cSld>
     <p:spTree>
@@ -21311,7 +21545,7 @@
 </p:sld>
 </file>
 
-<file path=ppt/slides/slide58.xml><?xml version="1.0" encoding="utf-8"?>
+<file path=ppt/slides/slide57.xml><?xml version="1.0" encoding="utf-8"?>
 <p:sld xmlns:a="http://schemas.openxmlformats.org/drawingml/2006/main" xmlns:r="http://schemas.openxmlformats.org/officeDocument/2006/relationships" xmlns:p="http://schemas.openxmlformats.org/presentationml/2006/main">
   <p:cSld>
     <p:spTree>
@@ -21674,7 +21908,7 @@
 </p:sld>
 </file>
 
-<file path=ppt/slides/slide59.xml><?xml version="1.0" encoding="utf-8"?>
+<file path=ppt/slides/slide58.xml><?xml version="1.0" encoding="utf-8"?>
 <p:sld xmlns:a="http://schemas.openxmlformats.org/drawingml/2006/main" xmlns:r="http://schemas.openxmlformats.org/officeDocument/2006/relationships" xmlns:p="http://schemas.openxmlformats.org/presentationml/2006/main">
   <p:cSld>
     <p:spTree>
@@ -22192,6 +22426,130 @@
 </p:sld>
 </file>
 
+<file path=ppt/slides/slide59.xml><?xml version="1.0" encoding="utf-8"?>
+<p:sld xmlns:a="http://schemas.openxmlformats.org/drawingml/2006/main" xmlns:r="http://schemas.openxmlformats.org/officeDocument/2006/relationships" xmlns:p="http://schemas.openxmlformats.org/presentationml/2006/main">
+  <p:cSld>
+    <p:spTree>
+      <p:nvGrpSpPr>
+        <p:cNvPr id="1" name=""/>
+        <p:cNvGrpSpPr/>
+        <p:nvPr/>
+      </p:nvGrpSpPr>
+      <p:grpSpPr>
+        <a:xfrm>
+          <a:off x="0" y="0"/>
+          <a:ext cx="0" cy="0"/>
+          <a:chOff x="0" y="0"/>
+          <a:chExt cx="0" cy="0"/>
+        </a:xfrm>
+      </p:grpSpPr>
+      <p:sp>
+        <p:nvSpPr>
+          <p:cNvPr id="2" name="Title 1"/>
+          <p:cNvSpPr>
+            <a:spLocks noGrp="1"/>
+          </p:cNvSpPr>
+          <p:nvPr>
+            <p:ph type="title"/>
+          </p:nvPr>
+        </p:nvSpPr>
+        <p:spPr/>
+        <p:txBody>
+          <a:bodyPr/>
+          <a:lstStyle/>
+          <a:p>
+            <a:r>
+              <a:rPr lang="en-GB" dirty="0" smtClean="0"/>
+              <a:t>Mixed Architectures</a:t>
+            </a:r>
+            <a:endParaRPr lang="en-GB" dirty="0"/>
+          </a:p>
+        </p:txBody>
+      </p:sp>
+      <p:sp>
+        <p:nvSpPr>
+          <p:cNvPr id="3" name="Content Placeholder 2"/>
+          <p:cNvSpPr>
+            <a:spLocks noGrp="1"/>
+          </p:cNvSpPr>
+          <p:nvPr>
+            <p:ph idx="1"/>
+          </p:nvPr>
+        </p:nvSpPr>
+        <p:spPr/>
+        <p:txBody>
+          <a:bodyPr>
+            <a:normAutofit/>
+          </a:bodyPr>
+          <a:lstStyle/>
+          <a:p>
+            <a:r>
+              <a:rPr lang="en-GB" dirty="0" smtClean="0"/>
+              <a:t>“Polyglot Persistence” (Fowler)</a:t>
+            </a:r>
+          </a:p>
+          <a:p>
+            <a:endParaRPr lang="en-GB" dirty="0" smtClean="0"/>
+          </a:p>
+          <a:p>
+            <a:r>
+              <a:rPr lang="en-GB" dirty="0" smtClean="0"/>
+              <a:t>Business Process Requirements</a:t>
+            </a:r>
+          </a:p>
+          <a:p>
+            <a:endParaRPr lang="en-GB" dirty="0" smtClean="0"/>
+          </a:p>
+          <a:p>
+            <a:r>
+              <a:rPr lang="en-GB" dirty="0" smtClean="0"/>
+              <a:t>Read-Write Split:</a:t>
+            </a:r>
+          </a:p>
+          <a:p>
+            <a:pPr lvl="1"/>
+            <a:r>
+              <a:rPr lang="en-GB" dirty="0" smtClean="0"/>
+              <a:t>Reporting Database</a:t>
+            </a:r>
+          </a:p>
+          <a:p>
+            <a:pPr lvl="1"/>
+            <a:r>
+              <a:rPr lang="en-GB" dirty="0" smtClean="0"/>
+              <a:t>Data Warehousing</a:t>
+            </a:r>
+          </a:p>
+          <a:p>
+            <a:pPr lvl="1"/>
+            <a:r>
+              <a:rPr lang="en-GB" dirty="0" smtClean="0"/>
+              <a:t>CQRS</a:t>
+            </a:r>
+            <a:endParaRPr lang="en-GB" dirty="0"/>
+          </a:p>
+        </p:txBody>
+      </p:sp>
+    </p:spTree>
+    <p:extLst>
+      <p:ext uri="{BB962C8B-B14F-4D97-AF65-F5344CB8AC3E}">
+        <p14:creationId xmlns:p14="http://schemas.microsoft.com/office/powerpoint/2010/main" val="1132971709"/>
+      </p:ext>
+    </p:extLst>
+  </p:cSld>
+  <p:clrMapOvr>
+    <a:masterClrMapping/>
+  </p:clrMapOvr>
+  <p:timing>
+    <p:tnLst>
+      <p:par>
+        <p:cTn id="1" dur="indefinite" restart="never" nodeType="tmRoot"/>
+      </p:par>
+    </p:tnLst>
+  </p:timing>
+</p:sld>
+</file>
+
 <file path=ppt/slides/slide6.xml><?xml version="1.0" encoding="utf-8"?>
 <p:sld xmlns:a="http://schemas.openxmlformats.org/drawingml/2006/main" xmlns:r="http://schemas.openxmlformats.org/officeDocument/2006/relationships" xmlns:p="http://schemas.openxmlformats.org/presentationml/2006/main">
   <p:cSld>
@@ -22337,7 +22695,7 @@
           <a:p>
             <a:r>
               <a:rPr lang="en-GB" dirty="0" smtClean="0"/>
-              <a:t>Mixed Architectures</a:t>
+              <a:t>Business Processes (Amazon)</a:t>
             </a:r>
             <a:endParaRPr lang="en-GB" dirty="0"/>
           </a:p>
@@ -22356,53 +22714,83 @@
         <p:spPr/>
         <p:txBody>
           <a:bodyPr>
-            <a:normAutofit/>
+            <a:normAutofit fontScale="85000" lnSpcReduction="20000"/>
           </a:bodyPr>
           <a:lstStyle/>
           <a:p>
             <a:r>
-              <a:rPr lang="en-GB" dirty="0" smtClean="0"/>
-              <a:t>“Polyglot Persistence” (Fowler)</a:t>
-            </a:r>
-          </a:p>
-          <a:p>
+              <a:rPr lang="en-GB" dirty="0"/>
+              <a:t>“For the checkout process you always want to </a:t>
+            </a:r>
+            <a:r>
+              <a:rPr lang="en-GB" dirty="0" err="1"/>
+              <a:t>honor</a:t>
+            </a:r>
+            <a:r>
+              <a:rPr lang="en-GB" dirty="0"/>
+              <a:t> requests to add items to a shopping cart because it's revenue producing. </a:t>
+            </a:r>
+            <a:r>
+              <a:rPr lang="en-GB" b="1" dirty="0"/>
+              <a:t>In this case you choose high availability.</a:t>
+            </a:r>
+            <a:r>
+              <a:rPr lang="en-GB" dirty="0"/>
+              <a:t> Errors are hidden from the customer and sorted out later.” </a:t>
+            </a:r>
             <a:endParaRPr lang="en-GB" dirty="0" smtClean="0"/>
           </a:p>
           <a:p>
-            <a:r>
-              <a:rPr lang="en-GB" dirty="0" smtClean="0"/>
-              <a:t>Business Process Requirements</a:t>
-            </a:r>
-          </a:p>
-          <a:p>
+            <a:endParaRPr lang="en-GB" dirty="0"/>
+          </a:p>
+          <a:p>
+            <a:r>
+              <a:rPr lang="en-GB" dirty="0" smtClean="0"/>
+              <a:t>“</a:t>
+            </a:r>
+            <a:r>
+              <a:rPr lang="en-GB" b="1" dirty="0"/>
+              <a:t>When a customer submits an order you </a:t>
+            </a:r>
+            <a:r>
+              <a:rPr lang="en-GB" b="1" dirty="0" err="1"/>
+              <a:t>favor</a:t>
+            </a:r>
+            <a:r>
+              <a:rPr lang="en-GB" b="1" dirty="0"/>
+              <a:t> consistency </a:t>
+            </a:r>
+            <a:r>
+              <a:rPr lang="en-GB" dirty="0"/>
+              <a:t>because several services--credit card processing, shipping and handling, reporting--are simultaneously accessing the data</a:t>
+            </a:r>
+            <a:r>
+              <a:rPr lang="en-GB" dirty="0" smtClean="0"/>
+              <a:t>.”</a:t>
+            </a:r>
+          </a:p>
+          <a:p>
+            <a:endParaRPr lang="en-GB" dirty="0"/>
+          </a:p>
+          <a:p>
+            <a:pPr marL="457200" lvl="1" indent="0" algn="ctr">
+              <a:buNone/>
+            </a:pPr>
+            <a:r>
+              <a:rPr lang="en-GB" dirty="0" smtClean="0">
+                <a:hlinkClick r:id="rId3"/>
+              </a:rPr>
+              <a:t>highscalability.com/amazon-architecture</a:t>
+            </a:r>
             <a:endParaRPr lang="en-GB" dirty="0" smtClean="0"/>
           </a:p>
           <a:p>
-            <a:r>
-              <a:rPr lang="en-GB" dirty="0" smtClean="0"/>
-              <a:t>Read-Write Split:</a:t>
-            </a:r>
-          </a:p>
-          <a:p>
-            <a:pPr lvl="1"/>
-            <a:r>
-              <a:rPr lang="en-GB" dirty="0" smtClean="0"/>
-              <a:t>Reporting Database</a:t>
-            </a:r>
-          </a:p>
-          <a:p>
-            <a:pPr lvl="1"/>
-            <a:r>
-              <a:rPr lang="en-GB" dirty="0" smtClean="0"/>
-              <a:t>Data Warehousing</a:t>
-            </a:r>
-          </a:p>
-          <a:p>
-            <a:pPr lvl="1"/>
-            <a:r>
-              <a:rPr lang="en-GB" dirty="0" smtClean="0"/>
-              <a:t>CQRS</a:t>
-            </a:r>
+            <a:pPr marL="457200" lvl="1" indent="0">
+              <a:buNone/>
+            </a:pPr>
+            <a:endParaRPr lang="en-GB" dirty="0"/>
+          </a:p>
+          <a:p>
             <a:endParaRPr lang="en-GB" dirty="0"/>
           </a:p>
         </p:txBody>
@@ -22410,7 +22798,7 @@
     </p:spTree>
     <p:extLst>
       <p:ext uri="{BB962C8B-B14F-4D97-AF65-F5344CB8AC3E}">
-        <p14:creationId xmlns:p14="http://schemas.microsoft.com/office/powerpoint/2010/main" val="1132971709"/>
+        <p14:creationId xmlns:p14="http://schemas.microsoft.com/office/powerpoint/2010/main" val="2839110553"/>
       </p:ext>
     </p:extLst>
   </p:cSld>
@@ -22461,7 +22849,7 @@
           <a:p>
             <a:r>
               <a:rPr lang="en-GB" dirty="0" smtClean="0"/>
-              <a:t>Business Processes (Amazon)</a:t>
+              <a:t>Reporting Systems</a:t>
             </a:r>
             <a:endParaRPr lang="en-GB" dirty="0"/>
           </a:p>
@@ -22479,84 +22867,47 @@
         </p:nvSpPr>
         <p:spPr/>
         <p:txBody>
-          <a:bodyPr>
-            <a:normAutofit fontScale="85000" lnSpcReduction="20000"/>
-          </a:bodyPr>
-          <a:lstStyle/>
-          <a:p>
+          <a:bodyPr/>
+          <a:lstStyle/>
+          <a:p>
+            <a:r>
+              <a:rPr lang="en-GB" dirty="0" smtClean="0"/>
+              <a:t>Traditional application/ BI division</a:t>
+            </a:r>
+          </a:p>
+          <a:p>
+            <a:pPr lvl="1"/>
+            <a:r>
+              <a:rPr lang="en-GB" dirty="0" smtClean="0"/>
+              <a:t>“Operational Data Store”</a:t>
+            </a:r>
+          </a:p>
+          <a:p>
+            <a:pPr lvl="1"/>
+            <a:r>
+              <a:rPr lang="en-GB" dirty="0" smtClean="0"/>
+              <a:t>Data Warehouse/ Marts</a:t>
+            </a:r>
+          </a:p>
+          <a:p>
+            <a:pPr lvl="1"/>
             <a:r>
               <a:rPr lang="en-GB" dirty="0"/>
-              <a:t>“For the checkout process you always want to </a:t>
-            </a:r>
-            <a:r>
-              <a:rPr lang="en-GB" dirty="0" err="1"/>
-              <a:t>honor</a:t>
-            </a:r>
-            <a:r>
-              <a:rPr lang="en-GB" dirty="0"/>
-              <a:t> requests to add items to a shopping cart because it's revenue producing. </a:t>
-            </a:r>
-            <a:r>
-              <a:rPr lang="en-GB" b="1" dirty="0"/>
-              <a:t>In this case you choose high availability.</a:t>
-            </a:r>
-            <a:r>
-              <a:rPr lang="en-GB" dirty="0"/>
-              <a:t> Errors are hidden from the customer and sorted out later.” </a:t>
+              <a:t>OLTP/ OLAP</a:t>
             </a:r>
             <a:endParaRPr lang="en-GB" dirty="0" smtClean="0"/>
           </a:p>
           <a:p>
-            <a:endParaRPr lang="en-GB" dirty="0"/>
-          </a:p>
-          <a:p>
-            <a:r>
-              <a:rPr lang="en-GB" dirty="0" smtClean="0"/>
-              <a:t>“</a:t>
-            </a:r>
-            <a:r>
-              <a:rPr lang="en-GB" b="1" dirty="0"/>
-              <a:t>When a customer submits an order you </a:t>
-            </a:r>
-            <a:r>
-              <a:rPr lang="en-GB" b="1" dirty="0" err="1"/>
-              <a:t>favor</a:t>
-            </a:r>
-            <a:r>
-              <a:rPr lang="en-GB" b="1" dirty="0"/>
-              <a:t> consistency </a:t>
-            </a:r>
-            <a:r>
-              <a:rPr lang="en-GB" dirty="0"/>
-              <a:t>because several services--credit card processing, shipping and handling, reporting--are simultaneously accessing the data</a:t>
-            </a:r>
-            <a:r>
-              <a:rPr lang="en-GB" dirty="0" smtClean="0"/>
-              <a:t>.”</a:t>
-            </a:r>
-          </a:p>
-          <a:p>
-            <a:endParaRPr lang="en-GB" dirty="0"/>
-          </a:p>
-          <a:p>
-            <a:pPr marL="457200" lvl="1" indent="0" algn="ctr">
+            <a:pPr marL="0" indent="0">
               <a:buNone/>
             </a:pPr>
-            <a:r>
-              <a:rPr lang="en-GB" dirty="0" smtClean="0">
-                <a:hlinkClick r:id="rId3"/>
-              </a:rPr>
-              <a:t>highscalability.com/amazon-architecture</a:t>
-            </a:r>
             <a:endParaRPr lang="en-GB" dirty="0" smtClean="0"/>
           </a:p>
           <a:p>
-            <a:pPr marL="457200" lvl="1" indent="0">
-              <a:buNone/>
-            </a:pPr>
-            <a:endParaRPr lang="en-GB" dirty="0"/>
-          </a:p>
-          <a:p>
+            <a:r>
+              <a:rPr lang="en-GB" dirty="0" smtClean="0"/>
+              <a:t>Newer solutions (e.g., Cassandra &amp; Hadoop)</a:t>
+            </a:r>
             <a:endParaRPr lang="en-GB" dirty="0"/>
           </a:p>
         </p:txBody>
@@ -22564,7 +22915,7 @@
     </p:spTree>
     <p:extLst>
       <p:ext uri="{BB962C8B-B14F-4D97-AF65-F5344CB8AC3E}">
-        <p14:creationId xmlns:p14="http://schemas.microsoft.com/office/powerpoint/2010/main" val="2839110553"/>
+        <p14:creationId xmlns:p14="http://schemas.microsoft.com/office/powerpoint/2010/main" val="2578952539"/>
       </p:ext>
     </p:extLst>
   </p:cSld>
@@ -22610,123 +22961,6 @@
         </p:nvSpPr>
         <p:spPr/>
         <p:txBody>
-          <a:bodyPr/>
-          <a:lstStyle/>
-          <a:p>
-            <a:r>
-              <a:rPr lang="en-GB" dirty="0" smtClean="0"/>
-              <a:t>Reporting Systems</a:t>
-            </a:r>
-            <a:endParaRPr lang="en-GB" dirty="0"/>
-          </a:p>
-        </p:txBody>
-      </p:sp>
-      <p:sp>
-        <p:nvSpPr>
-          <p:cNvPr id="3" name="Content Placeholder 2"/>
-          <p:cNvSpPr>
-            <a:spLocks noGrp="1"/>
-          </p:cNvSpPr>
-          <p:nvPr>
-            <p:ph idx="1"/>
-          </p:nvPr>
-        </p:nvSpPr>
-        <p:spPr/>
-        <p:txBody>
-          <a:bodyPr/>
-          <a:lstStyle/>
-          <a:p>
-            <a:r>
-              <a:rPr lang="en-GB" dirty="0" smtClean="0"/>
-              <a:t>Traditional application/ BI division</a:t>
-            </a:r>
-          </a:p>
-          <a:p>
-            <a:pPr lvl="1"/>
-            <a:r>
-              <a:rPr lang="en-GB" dirty="0" smtClean="0"/>
-              <a:t>“Operational Data Store”</a:t>
-            </a:r>
-          </a:p>
-          <a:p>
-            <a:pPr lvl="1"/>
-            <a:r>
-              <a:rPr lang="en-GB" dirty="0" smtClean="0"/>
-              <a:t>Data Warehouse/ Marts</a:t>
-            </a:r>
-          </a:p>
-          <a:p>
-            <a:pPr lvl="1"/>
-            <a:r>
-              <a:rPr lang="en-GB" dirty="0"/>
-              <a:t>OLTP/ OLAP</a:t>
-            </a:r>
-            <a:endParaRPr lang="en-GB" dirty="0" smtClean="0"/>
-          </a:p>
-          <a:p>
-            <a:pPr marL="0" indent="0">
-              <a:buNone/>
-            </a:pPr>
-            <a:endParaRPr lang="en-GB" dirty="0" smtClean="0"/>
-          </a:p>
-          <a:p>
-            <a:r>
-              <a:rPr lang="en-GB" dirty="0" smtClean="0"/>
-              <a:t>Newer solutions (e.g., Cassandra &amp; Hadoop)</a:t>
-            </a:r>
-            <a:endParaRPr lang="en-GB" dirty="0"/>
-          </a:p>
-        </p:txBody>
-      </p:sp>
-    </p:spTree>
-    <p:extLst>
-      <p:ext uri="{BB962C8B-B14F-4D97-AF65-F5344CB8AC3E}">
-        <p14:creationId xmlns:p14="http://schemas.microsoft.com/office/powerpoint/2010/main" val="2578952539"/>
-      </p:ext>
-    </p:extLst>
-  </p:cSld>
-  <p:clrMapOvr>
-    <a:masterClrMapping/>
-  </p:clrMapOvr>
-  <p:timing>
-    <p:tnLst>
-      <p:par>
-        <p:cTn id="1" dur="indefinite" restart="never" nodeType="tmRoot"/>
-      </p:par>
-    </p:tnLst>
-  </p:timing>
-</p:sld>
-</file>
-
-<file path=ppt/slides/slide63.xml><?xml version="1.0" encoding="utf-8"?>
-<p:sld xmlns:a="http://schemas.openxmlformats.org/drawingml/2006/main" xmlns:r="http://schemas.openxmlformats.org/officeDocument/2006/relationships" xmlns:p="http://schemas.openxmlformats.org/presentationml/2006/main">
-  <p:cSld>
-    <p:spTree>
-      <p:nvGrpSpPr>
-        <p:cNvPr id="1" name=""/>
-        <p:cNvGrpSpPr/>
-        <p:nvPr/>
-      </p:nvGrpSpPr>
-      <p:grpSpPr>
-        <a:xfrm>
-          <a:off x="0" y="0"/>
-          <a:ext cx="0" cy="0"/>
-          <a:chOff x="0" y="0"/>
-          <a:chExt cx="0" cy="0"/>
-        </a:xfrm>
-      </p:grpSpPr>
-      <p:sp>
-        <p:nvSpPr>
-          <p:cNvPr id="2" name="Title 1"/>
-          <p:cNvSpPr>
-            <a:spLocks noGrp="1"/>
-          </p:cNvSpPr>
-          <p:nvPr>
-            <p:ph type="title"/>
-          </p:nvPr>
-        </p:nvSpPr>
-        <p:spPr/>
-        <p:txBody>
           <a:bodyPr>
             <a:normAutofit/>
           </a:bodyPr>
@@ -22818,7 +23052,7 @@
 </p:sld>
 </file>
 
-<file path=ppt/slides/slide64.xml><?xml version="1.0" encoding="utf-8"?>
+<file path=ppt/slides/slide63.xml><?xml version="1.0" encoding="utf-8"?>
 <p:sld xmlns:a="http://schemas.openxmlformats.org/drawingml/2006/main" xmlns:r="http://schemas.openxmlformats.org/officeDocument/2006/relationships" xmlns:p="http://schemas.openxmlformats.org/presentationml/2006/main">
   <p:cSld>
     <p:spTree>
@@ -23068,10 +23302,34 @@
           <a:p>
             <a:r>
               <a:rPr lang="en-GB" dirty="0" smtClean="0"/>
-              <a:t>Object-Relational Impedance Mismatch</a:t>
-            </a:r>
-          </a:p>
-          <a:p>
+              <a:t>Programming Model:</a:t>
+            </a:r>
+          </a:p>
+          <a:p>
+            <a:pPr lvl="1"/>
+            <a:r>
+              <a:rPr lang="en-GB" dirty="0" smtClean="0"/>
+              <a:t>Object-Relational </a:t>
+            </a:r>
+            <a:r>
+              <a:rPr lang="en-GB" dirty="0" smtClean="0"/>
+              <a:t>Impedance </a:t>
+            </a:r>
+            <a:r>
+              <a:rPr lang="en-GB" dirty="0" smtClean="0"/>
+              <a:t>Mismatch</a:t>
+            </a:r>
+          </a:p>
+          <a:p>
+            <a:pPr lvl="1"/>
+            <a:r>
+              <a:rPr lang="en-GB" dirty="0" smtClean="0"/>
+              <a:t>Schema Changes</a:t>
+            </a:r>
+            <a:endParaRPr lang="en-GB" dirty="0"/>
+          </a:p>
+          <a:p>
+            <a:pPr lvl="1"/>
             <a:endParaRPr lang="en-GB" dirty="0"/>
           </a:p>
           <a:p>
@@ -23169,7 +23427,7 @@
                                         <p:tgtEl>
                                           <p:spTgt spid="3">
                                             <p:txEl>
-                                              <p:pRg st="2" end="2"/>
+                                              <p:pRg st="1" end="1"/>
                                             </p:txEl>
                                           </p:spTgt>
                                         </p:tgtEl>
@@ -23200,7 +23458,69 @@
                                         <p:tgtEl>
                                           <p:spTgt spid="3">
                                             <p:txEl>
+                                              <p:pRg st="2" end="2"/>
+                                            </p:txEl>
+                                          </p:spTgt>
+                                        </p:tgtEl>
+                                        <p:attrNameLst>
+                                          <p:attrName>style.visibility</p:attrName>
+                                        </p:attrNameLst>
+                                      </p:cBhvr>
+                                      <p:to>
+                                        <p:strVal val="visible"/>
+                                      </p:to>
+                                    </p:set>
+                                  </p:childTnLst>
+                                </p:cTn>
+                              </p:par>
+                              <p:par>
+                                <p:cTn id="11" presetID="1" presetClass="entr" presetSubtype="0" fill="hold" grpId="0" nodeType="withEffect">
+                                  <p:stCondLst>
+                                    <p:cond delay="0"/>
+                                  </p:stCondLst>
+                                  <p:childTnLst>
+                                    <p:set>
+                                      <p:cBhvr>
+                                        <p:cTn id="12" dur="1" fill="hold">
+                                          <p:stCondLst>
+                                            <p:cond delay="0"/>
+                                          </p:stCondLst>
+                                        </p:cTn>
+                                        <p:tgtEl>
+                                          <p:spTgt spid="3">
+                                            <p:txEl>
                                               <p:pRg st="4" end="4"/>
+                                            </p:txEl>
+                                          </p:spTgt>
+                                        </p:tgtEl>
+                                        <p:attrNameLst>
+                                          <p:attrName>style.visibility</p:attrName>
+                                        </p:attrNameLst>
+                                      </p:cBhvr>
+                                      <p:to>
+                                        <p:strVal val="visible"/>
+                                      </p:to>
+                                    </p:set>
+                                  </p:childTnLst>
+                                </p:cTn>
+                              </p:par>
+                              <p:par>
+                                <p:cTn id="13" presetID="1" presetClass="entr" presetSubtype="0" fill="hold" grpId="0" nodeType="withEffect">
+                                  <p:stCondLst>
+                                    <p:cond delay="0"/>
+                                  </p:stCondLst>
+                                  <p:childTnLst>
+                                    <p:set>
+                                      <p:cBhvr>
+                                        <p:cTn id="14" dur="1" fill="hold">
+                                          <p:stCondLst>
+                                            <p:cond delay="0"/>
+                                          </p:stCondLst>
+                                        </p:cTn>
+                                        <p:tgtEl>
+                                          <p:spTgt spid="3">
+                                            <p:txEl>
+                                              <p:pRg st="6" end="6"/>
                                             </p:txEl>
                                           </p:spTgt>
                                         </p:tgtEl>

</xml_diff>

<commit_message>
Update slides (including adding architecture Visio), add Cypher BI script
</commit_message>
<xml_diff>
--- a/Slides/Not Only SQL - Picking A Database for DotNET.pptx
+++ b/Slides/Not Only SQL - Picking A Database for DotNET.pptx
@@ -69,7 +69,7 @@
     <p:sldId id="306" r:id="rId60"/>
     <p:sldId id="307" r:id="rId61"/>
     <p:sldId id="308" r:id="rId62"/>
-    <p:sldId id="313" r:id="rId63"/>
+    <p:sldId id="344" r:id="rId63"/>
   </p:sldIdLst>
   <p:sldSz cx="9144000" cy="6858000" type="screen4x3"/>
   <p:notesSz cx="6858000" cy="9144000"/>
@@ -282,7 +282,7 @@
             <p14:sldId id="306"/>
             <p14:sldId id="307"/>
             <p14:sldId id="308"/>
-            <p14:sldId id="313"/>
+            <p14:sldId id="344"/>
           </p14:sldIdLst>
         </p14:section>
       </p14:sectionLst>
@@ -3183,44 +3183,6 @@
           <a:bodyPr/>
           <a:lstStyle/>
           <a:p>
-            <a:r>
-              <a:rPr lang="en-GB" dirty="0" smtClean="0"/>
-              <a:t>Similar to relational databases, graph</a:t>
-            </a:r>
-            <a:r>
-              <a:rPr lang="en-GB" baseline="0" dirty="0" smtClean="0"/>
-              <a:t> databases are implemented based on mathematical theory.  In this case – graph theory, dating back as far as the work of Leonhard Euler in the 18</a:t>
-            </a:r>
-            <a:r>
-              <a:rPr lang="en-GB" baseline="30000" dirty="0" smtClean="0"/>
-              <a:t>th</a:t>
-            </a:r>
-            <a:r>
-              <a:rPr lang="en-GB" baseline="0" dirty="0" smtClean="0"/>
-              <a:t> century.</a:t>
-            </a:r>
-          </a:p>
-          <a:p>
-            <a:r>
-              <a:rPr lang="en-GB" baseline="0" dirty="0" smtClean="0"/>
-              <a:t>They also have some other similarities with relational which mean that although they are often categorised as “NoSQL”, in some ways they are more similar to SQL Server than systems such as </a:t>
-            </a:r>
-            <a:r>
-              <a:rPr lang="en-GB" baseline="0" dirty="0" err="1" smtClean="0"/>
-              <a:t>Riak</a:t>
-            </a:r>
-            <a:r>
-              <a:rPr lang="en-GB" baseline="0" dirty="0" smtClean="0"/>
-              <a:t>, Cassandra or even </a:t>
-            </a:r>
-            <a:r>
-              <a:rPr lang="en-GB" baseline="0" dirty="0" err="1" smtClean="0"/>
-              <a:t>MongoDB</a:t>
-            </a:r>
-            <a:r>
-              <a:rPr lang="en-GB" baseline="0" dirty="0" smtClean="0"/>
-              <a:t>.</a:t>
-            </a:r>
             <a:endParaRPr lang="en-GB" dirty="0"/>
           </a:p>
         </p:txBody>
@@ -21176,13 +21138,27 @@
         </p:nvSpPr>
         <p:spPr/>
         <p:txBody>
-          <a:bodyPr/>
+          <a:bodyPr>
+            <a:normAutofit lnSpcReduction="10000"/>
+          </a:bodyPr>
           <a:lstStyle/>
           <a:p>
             <a:r>
               <a:rPr lang="en-GB" dirty="0" smtClean="0"/>
               <a:t>Based on Graph Theory (Euler et al.)</a:t>
             </a:r>
+          </a:p>
+          <a:p>
+            <a:pPr marL="0" indent="0">
+              <a:buNone/>
+            </a:pPr>
+            <a:endParaRPr lang="en-GB" dirty="0" smtClean="0"/>
+          </a:p>
+          <a:p>
+            <a:pPr marL="0" indent="0">
+              <a:buNone/>
+            </a:pPr>
+            <a:endParaRPr lang="en-GB" dirty="0" smtClean="0"/>
           </a:p>
           <a:p>
             <a:pPr marL="0" indent="0">
@@ -21191,25 +21167,95 @@
             <a:endParaRPr lang="en-GB" dirty="0"/>
           </a:p>
           <a:p>
-            <a:r>
-              <a:rPr lang="en-GB" dirty="0" smtClean="0"/>
-              <a:t>“NoSQL” in that not relational – but not “standard” NoSQL</a:t>
-            </a:r>
-          </a:p>
-          <a:p>
+            <a:pPr marL="0" indent="0">
+              <a:buNone/>
+            </a:pPr>
             <a:endParaRPr lang="en-GB" dirty="0"/>
           </a:p>
           <a:p>
-            <a:r>
-              <a:rPr lang="en-GB" dirty="0"/>
-              <a:t>Neo4j is a popular  open-source implementation</a:t>
-            </a:r>
-          </a:p>
-          <a:p>
+            <a:pPr marL="0" indent="0">
+              <a:buNone/>
+            </a:pPr>
             <a:endParaRPr lang="en-GB" dirty="0"/>
           </a:p>
-        </p:txBody>
-      </p:sp>
+          <a:p>
+            <a:endParaRPr lang="en-GB" dirty="0" smtClean="0"/>
+          </a:p>
+          <a:p>
+            <a:r>
+              <a:rPr lang="en-GB" dirty="0" smtClean="0"/>
+              <a:t>Not </a:t>
+            </a:r>
+            <a:r>
+              <a:rPr lang="en-GB" dirty="0" smtClean="0"/>
+              <a:t>relational – but not “standard” NoSQL</a:t>
+            </a:r>
+          </a:p>
+          <a:p>
+            <a:endParaRPr lang="en-GB" dirty="0"/>
+          </a:p>
+        </p:txBody>
+      </p:sp>
+      <p:pic>
+        <p:nvPicPr>
+          <p:cNvPr id="4" name="Picture 3"/>
+          <p:cNvPicPr>
+            <a:picLocks noChangeAspect="1"/>
+          </p:cNvPicPr>
+          <p:nvPr/>
+        </p:nvPicPr>
+        <p:blipFill>
+          <a:blip r:embed="rId3" cstate="print">
+            <a:extLst>
+              <a:ext uri="{28A0092B-C50C-407E-A947-70E740481C1C}">
+                <a14:useLocalDpi xmlns:a14="http://schemas.microsoft.com/office/drawing/2010/main" val="0"/>
+              </a:ext>
+            </a:extLst>
+          </a:blip>
+          <a:stretch>
+            <a:fillRect/>
+          </a:stretch>
+        </p:blipFill>
+        <p:spPr>
+          <a:xfrm>
+            <a:off x="899592" y="2420888"/>
+            <a:ext cx="1944216" cy="2428686"/>
+          </a:xfrm>
+          <a:prstGeom prst="rect">
+            <a:avLst/>
+          </a:prstGeom>
+        </p:spPr>
+      </p:pic>
+      <p:pic>
+        <p:nvPicPr>
+          <p:cNvPr id="5" name="Picture 4"/>
+          <p:cNvPicPr>
+            <a:picLocks noChangeAspect="1"/>
+          </p:cNvPicPr>
+          <p:nvPr/>
+        </p:nvPicPr>
+        <p:blipFill>
+          <a:blip r:embed="rId4">
+            <a:extLst>
+              <a:ext uri="{28A0092B-C50C-407E-A947-70E740481C1C}">
+                <a14:useLocalDpi xmlns:a14="http://schemas.microsoft.com/office/drawing/2010/main" val="0"/>
+              </a:ext>
+            </a:extLst>
+          </a:blip>
+          <a:stretch>
+            <a:fillRect/>
+          </a:stretch>
+        </p:blipFill>
+        <p:spPr>
+          <a:xfrm>
+            <a:off x="3995936" y="2466257"/>
+            <a:ext cx="3816424" cy="2383317"/>
+          </a:xfrm>
+          <a:prstGeom prst="rect">
+            <a:avLst/>
+          </a:prstGeom>
+        </p:spPr>
+      </p:pic>
     </p:spTree>
     <p:extLst>
       <p:ext uri="{BB962C8B-B14F-4D97-AF65-F5344CB8AC3E}">
@@ -22576,7 +22622,12 @@
             <p:ph idx="1"/>
           </p:nvPr>
         </p:nvSpPr>
-        <p:spPr/>
+        <p:spPr>
+          <a:xfrm>
+            <a:off x="457200" y="1340768"/>
+            <a:ext cx="8229600" cy="4785395"/>
+          </a:xfrm>
+        </p:spPr>
         <p:txBody>
           <a:bodyPr/>
           <a:lstStyle/>
@@ -22595,23 +22646,47 @@
             </a:r>
           </a:p>
           <a:p>
+            <a:pPr lvl="1"/>
+            <a:endParaRPr lang="en-GB" i="1" dirty="0" smtClean="0"/>
+          </a:p>
+          <a:p>
+            <a:pPr marL="457200" lvl="1" indent="0">
+              <a:buNone/>
+            </a:pPr>
+            <a:r>
+              <a:rPr lang="en-GB" sz="2400" i="1" u="sng" dirty="0" smtClean="0"/>
+              <a:t>Asking a question is not the same as making a change</a:t>
+            </a:r>
+            <a:endParaRPr lang="en-GB" sz="2400" i="1" u="sng" dirty="0" smtClean="0"/>
+          </a:p>
+          <a:p>
+            <a:pPr marL="0" indent="0">
+              <a:buNone/>
+            </a:pPr>
             <a:endParaRPr lang="en-GB" dirty="0"/>
           </a:p>
           <a:p>
             <a:r>
               <a:rPr lang="en-GB" dirty="0" smtClean="0"/>
-              <a:t>~ Stronger version of “Reporting Database”</a:t>
-            </a:r>
-          </a:p>
-          <a:p>
-            <a:endParaRPr lang="en-GB" dirty="0"/>
-          </a:p>
-          <a:p>
-            <a:r>
-              <a:rPr lang="en-GB" dirty="0" smtClean="0"/>
-              <a:t>Can pair with “Event Sourcing” – commutative operations</a:t>
-            </a:r>
-            <a:endParaRPr lang="en-GB" dirty="0"/>
+              <a:t>NOT a specific architecture pattern</a:t>
+            </a:r>
+          </a:p>
+          <a:p>
+            <a:endParaRPr lang="en-GB" dirty="0" smtClean="0"/>
+          </a:p>
+          <a:p>
+            <a:r>
+              <a:rPr lang="en-GB" dirty="0" smtClean="0"/>
+              <a:t>Can </a:t>
+            </a:r>
+            <a:r>
+              <a:rPr lang="en-GB" dirty="0" smtClean="0"/>
+              <a:t>pair with “Event Sourcing” – commutative </a:t>
+            </a:r>
+            <a:r>
+              <a:rPr lang="en-GB" dirty="0" smtClean="0"/>
+              <a:t>operations</a:t>
+            </a:r>
           </a:p>
         </p:txBody>
       </p:sp>
@@ -22638,14 +22713,6 @@
 <file path=ppt/slides/slide62.xml><?xml version="1.0" encoding="utf-8"?>
 <p:sld xmlns:a="http://schemas.openxmlformats.org/drawingml/2006/main" xmlns:r="http://schemas.openxmlformats.org/officeDocument/2006/relationships" xmlns:p="http://schemas.openxmlformats.org/presentationml/2006/main">
   <p:cSld>
-    <p:bg>
-      <p:bgPr>
-        <a:solidFill>
-          <a:schemeClr val="bg1"/>
-        </a:solidFill>
-        <a:effectLst/>
-      </p:bgPr>
-    </p:bg>
     <p:spTree>
       <p:nvGrpSpPr>
         <p:cNvPr id="1" name=""/>
@@ -22660,56 +22727,40 @@
           <a:chExt cx="0" cy="0"/>
         </a:xfrm>
       </p:grpSpPr>
-      <p:sp>
-        <p:nvSpPr>
-          <p:cNvPr id="2" name="Title 1"/>
-          <p:cNvSpPr>
-            <a:spLocks noGrp="1"/>
-          </p:cNvSpPr>
-          <p:nvPr>
-            <p:ph type="title"/>
-          </p:nvPr>
-        </p:nvSpPr>
-        <p:spPr/>
-        <p:txBody>
-          <a:bodyPr/>
-          <a:lstStyle/>
-          <a:p>
-            <a:r>
-              <a:rPr lang="en-GB" dirty="0" smtClean="0"/>
-              <a:t>CQRS</a:t>
-            </a:r>
-            <a:endParaRPr lang="en-GB" dirty="0"/>
-          </a:p>
-        </p:txBody>
-      </p:sp>
-      <p:sp>
-        <p:nvSpPr>
-          <p:cNvPr id="3" name="Content Placeholder 2"/>
-          <p:cNvSpPr>
-            <a:spLocks noGrp="1"/>
-          </p:cNvSpPr>
-          <p:nvPr>
-            <p:ph idx="1"/>
-          </p:nvPr>
-        </p:nvSpPr>
-        <p:spPr/>
-        <p:txBody>
-          <a:bodyPr/>
-          <a:lstStyle/>
-          <a:p>
-            <a:r>
-              <a:rPr lang="en-GB" dirty="0" smtClean="0"/>
-              <a:t>(PUT DIAGRAM HERE)</a:t>
-            </a:r>
-            <a:endParaRPr lang="en-GB" dirty="0"/>
-          </a:p>
-        </p:txBody>
-      </p:sp>
+      <p:pic>
+        <p:nvPicPr>
+          <p:cNvPr id="2" name="Picture 1"/>
+          <p:cNvPicPr>
+            <a:picLocks noChangeAspect="1"/>
+          </p:cNvPicPr>
+          <p:nvPr/>
+        </p:nvPicPr>
+        <p:blipFill>
+          <a:blip r:embed="rId2">
+            <a:extLst>
+              <a:ext uri="{28A0092B-C50C-407E-A947-70E740481C1C}">
+                <a14:useLocalDpi xmlns:a14="http://schemas.microsoft.com/office/drawing/2010/main" val="0"/>
+              </a:ext>
+            </a:extLst>
+          </a:blip>
+          <a:stretch>
+            <a:fillRect/>
+          </a:stretch>
+        </p:blipFill>
+        <p:spPr>
+          <a:xfrm>
+            <a:off x="410300" y="620687"/>
+            <a:ext cx="8338164" cy="5616625"/>
+          </a:xfrm>
+          <a:prstGeom prst="rect">
+            <a:avLst/>
+          </a:prstGeom>
+        </p:spPr>
+      </p:pic>
     </p:spTree>
     <p:extLst>
       <p:ext uri="{BB962C8B-B14F-4D97-AF65-F5344CB8AC3E}">
-        <p14:creationId xmlns:p14="http://schemas.microsoft.com/office/powerpoint/2010/main" val="3631744002"/>
+        <p14:creationId xmlns:p14="http://schemas.microsoft.com/office/powerpoint/2010/main" val="2275762274"/>
       </p:ext>
     </p:extLst>
   </p:cSld>

</xml_diff>

<commit_message>
Check in current version of slides
</commit_message>
<xml_diff>
--- a/Slides/Not Only SQL - Picking A Database for DotNET.pptx
+++ b/Slides/Not Only SQL - Picking A Database for DotNET.pptx
@@ -771,14 +771,6 @@
           <a:bodyPr/>
           <a:lstStyle/>
           <a:p>
-            <a:r>
-              <a:rPr lang="en-GB" dirty="0" smtClean="0"/>
-              <a:t>Let’s take</a:t>
-            </a:r>
-            <a:r>
-              <a:rPr lang="en-GB" baseline="0" dirty="0" smtClean="0"/>
-              <a:t> a quick look at how some of these features work.</a:t>
-            </a:r>
             <a:endParaRPr lang="en-GB" dirty="0"/>
           </a:p>
         </p:txBody>
@@ -2476,10 +2468,7 @@
           <a:bodyPr/>
           <a:lstStyle/>
           <a:p>
-            <a:r>
-              <a:rPr lang="en-GB" baseline="0" dirty="0" smtClean="0"/>
-              <a:t>http://docs.basho.com/riak/1.1.0/references/appendices/comparisons/Riak-Compared-to-Cassandra/</a:t>
-            </a:r>
+            <a:endParaRPr lang="en-GB" baseline="0" dirty="0" smtClean="0"/>
           </a:p>
         </p:txBody>
       </p:sp>
@@ -8276,7 +8265,9 @@
         </p:nvSpPr>
         <p:spPr/>
         <p:txBody>
-          <a:bodyPr/>
+          <a:bodyPr>
+            <a:normAutofit/>
+          </a:bodyPr>
           <a:lstStyle/>
           <a:p>
             <a:r>
@@ -8289,6 +8280,28 @@
           </a:p>
           <a:p>
             <a:r>
+              <a:rPr lang="en-GB" dirty="0"/>
+              <a:t>Runs </a:t>
+            </a:r>
+            <a:r>
+              <a:rPr lang="en-GB" dirty="0" smtClean="0"/>
+              <a:t>on </a:t>
+            </a:r>
+            <a:r>
+              <a:rPr lang="en-GB" dirty="0"/>
+              <a:t>Windows </a:t>
+            </a:r>
+            <a:r>
+              <a:rPr lang="en-GB" dirty="0" smtClean="0"/>
+              <a:t>(as well as Linux/ MAC OS)</a:t>
+            </a:r>
+            <a:endParaRPr lang="en-GB" dirty="0" smtClean="0"/>
+          </a:p>
+          <a:p>
+            <a:endParaRPr lang="en-GB" dirty="0" smtClean="0"/>
+          </a:p>
+          <a:p>
+            <a:r>
               <a:rPr lang="en-GB" dirty="0" smtClean="0"/>
               <a:t>“Object-Relational”</a:t>
             </a:r>
@@ -8303,13 +8316,6 @@
             </a:r>
           </a:p>
           <a:p>
-            <a:endParaRPr lang="en-GB" dirty="0"/>
-          </a:p>
-          <a:p>
-            <a:r>
-              <a:rPr lang="en-GB" dirty="0" smtClean="0"/>
-              <a:t>Runs okay on Windows or Linux</a:t>
-            </a:r>
             <a:endParaRPr lang="en-GB" dirty="0"/>
           </a:p>
         </p:txBody>
@@ -15517,8 +15523,20 @@
           <a:p>
             <a:r>
               <a:rPr lang="en-GB" dirty="0" smtClean="0"/>
-              <a:t>Highly optimised for availability</a:t>
-            </a:r>
+              <a:t>Highly optimised for </a:t>
+            </a:r>
+            <a:r>
+              <a:rPr lang="en-GB" dirty="0" smtClean="0"/>
+              <a:t>availability</a:t>
+            </a:r>
+          </a:p>
+          <a:p>
+            <a:pPr lvl="1"/>
+            <a:r>
+              <a:rPr lang="en-GB" dirty="0" smtClean="0"/>
+              <a:t>Based on Amazon “Dynamo” paper</a:t>
+            </a:r>
+            <a:endParaRPr lang="en-GB" dirty="0" smtClean="0"/>
           </a:p>
           <a:p>
             <a:endParaRPr lang="en-GB" dirty="0"/>
@@ -18736,6 +18754,66 @@
           </a:p>
         </p:txBody>
       </p:sp>
+      <p:pic>
+        <p:nvPicPr>
+          <p:cNvPr id="4" name="Picture 3"/>
+          <p:cNvPicPr>
+            <a:picLocks noChangeAspect="1"/>
+          </p:cNvPicPr>
+          <p:nvPr/>
+        </p:nvPicPr>
+        <p:blipFill>
+          <a:blip r:embed="rId2">
+            <a:extLst>
+              <a:ext uri="{28A0092B-C50C-407E-A947-70E740481C1C}">
+                <a14:useLocalDpi xmlns:a14="http://schemas.microsoft.com/office/drawing/2010/main" val="0"/>
+              </a:ext>
+            </a:extLst>
+          </a:blip>
+          <a:stretch>
+            <a:fillRect/>
+          </a:stretch>
+        </p:blipFill>
+        <p:spPr>
+          <a:xfrm>
+            <a:off x="6948264" y="1700808"/>
+            <a:ext cx="1525712" cy="1015292"/>
+          </a:xfrm>
+          <a:prstGeom prst="rect">
+            <a:avLst/>
+          </a:prstGeom>
+        </p:spPr>
+      </p:pic>
+      <p:pic>
+        <p:nvPicPr>
+          <p:cNvPr id="6" name="Picture 5"/>
+          <p:cNvPicPr>
+            <a:picLocks noChangeAspect="1"/>
+          </p:cNvPicPr>
+          <p:nvPr/>
+        </p:nvPicPr>
+        <p:blipFill>
+          <a:blip r:embed="rId3">
+            <a:extLst>
+              <a:ext uri="{28A0092B-C50C-407E-A947-70E740481C1C}">
+                <a14:useLocalDpi xmlns:a14="http://schemas.microsoft.com/office/drawing/2010/main" val="0"/>
+              </a:ext>
+            </a:extLst>
+          </a:blip>
+          <a:stretch>
+            <a:fillRect/>
+          </a:stretch>
+        </p:blipFill>
+        <p:spPr>
+          <a:xfrm>
+            <a:off x="7020272" y="4365104"/>
+            <a:ext cx="1449685" cy="935281"/>
+          </a:xfrm>
+          <a:prstGeom prst="rect">
+            <a:avLst/>
+          </a:prstGeom>
+        </p:spPr>
+      </p:pic>
     </p:spTree>
     <p:extLst>
       <p:ext uri="{BB962C8B-B14F-4D97-AF65-F5344CB8AC3E}">
@@ -18791,50 +18869,71 @@
             <p:ph type="title"/>
           </p:nvPr>
         </p:nvSpPr>
+        <p:spPr>
+          <a:xfrm>
+            <a:off x="457200" y="274638"/>
+            <a:ext cx="6707088" cy="1143000"/>
+          </a:xfrm>
+        </p:spPr>
+        <p:txBody>
+          <a:bodyPr/>
+          <a:lstStyle/>
+          <a:p>
+            <a:r>
+              <a:rPr lang="en-GB" dirty="0" smtClean="0"/>
+              <a:t>Cloud </a:t>
+            </a:r>
+            <a:r>
+              <a:rPr lang="en-GB" dirty="0"/>
+              <a:t>Hosting </a:t>
+            </a:r>
+            <a:r>
+              <a:rPr lang="en-GB" dirty="0" smtClean="0"/>
+              <a:t>– MS Azure</a:t>
+            </a:r>
+            <a:endParaRPr lang="en-GB" dirty="0"/>
+          </a:p>
+        </p:txBody>
+      </p:sp>
+      <p:sp>
+        <p:nvSpPr>
+          <p:cNvPr id="3" name="Content Placeholder 2"/>
+          <p:cNvSpPr>
+            <a:spLocks noGrp="1"/>
+          </p:cNvSpPr>
+          <p:nvPr>
+            <p:ph idx="1"/>
+          </p:nvPr>
+        </p:nvSpPr>
         <p:spPr/>
         <p:txBody>
-          <a:bodyPr/>
-          <a:lstStyle/>
-          <a:p>
-            <a:r>
-              <a:rPr lang="en-GB" dirty="0" smtClean="0"/>
-              <a:t>Cloud Hosting</a:t>
-            </a:r>
-            <a:endParaRPr lang="en-GB" dirty="0"/>
-          </a:p>
-        </p:txBody>
-      </p:sp>
-      <p:sp>
-        <p:nvSpPr>
-          <p:cNvPr id="3" name="Content Placeholder 2"/>
-          <p:cNvSpPr>
-            <a:spLocks noGrp="1"/>
-          </p:cNvSpPr>
-          <p:nvPr>
-            <p:ph idx="1"/>
-          </p:nvPr>
-        </p:nvSpPr>
-        <p:spPr/>
-        <p:txBody>
           <a:bodyPr>
-            <a:normAutofit/>
+            <a:normAutofit lnSpcReduction="10000"/>
           </a:bodyPr>
           <a:lstStyle/>
           <a:p>
-            <a:r>
-              <a:rPr lang="en-GB" dirty="0" smtClean="0"/>
-              <a:t>Microsoft Azure</a:t>
-            </a:r>
-          </a:p>
-          <a:p>
-            <a:pPr lvl="1"/>
+            <a:pPr lvl="1">
+              <a:buFont typeface="Arial" panose="020B0604020202020204" pitchFamily="34" charset="0"/>
+              <a:buChar char="•"/>
+            </a:pPr>
             <a:r>
               <a:rPr lang="en-GB" dirty="0" smtClean="0"/>
               <a:t>Relational</a:t>
             </a:r>
-          </a:p>
-          <a:p>
-            <a:pPr lvl="1"/>
+            <a:endParaRPr lang="en-GB" dirty="0" smtClean="0"/>
+          </a:p>
+          <a:p>
+            <a:pPr lvl="1">
+              <a:buFont typeface="Arial" panose="020B0604020202020204" pitchFamily="34" charset="0"/>
+              <a:buChar char="•"/>
+            </a:pPr>
+            <a:endParaRPr lang="en-GB" dirty="0" smtClean="0"/>
+          </a:p>
+          <a:p>
+            <a:pPr lvl="1">
+              <a:buFont typeface="Arial" panose="020B0604020202020204" pitchFamily="34" charset="0"/>
+              <a:buChar char="•"/>
+            </a:pPr>
             <a:r>
               <a:rPr lang="en-GB" dirty="0" smtClean="0"/>
               <a:t>NoSQL</a:t>
@@ -18879,11 +18978,22 @@
             <a:endParaRPr lang="en-GB" sz="2000" dirty="0"/>
           </a:p>
           <a:p>
-            <a:pPr lvl="1"/>
+            <a:pPr lvl="1">
+              <a:buFont typeface="Arial" panose="020B0604020202020204" pitchFamily="34" charset="0"/>
+              <a:buChar char="•"/>
+            </a:pPr>
+            <a:endParaRPr lang="en-GB" dirty="0" smtClean="0"/>
+          </a:p>
+          <a:p>
+            <a:pPr lvl="1">
+              <a:buFont typeface="Arial" panose="020B0604020202020204" pitchFamily="34" charset="0"/>
+              <a:buChar char="•"/>
+            </a:pPr>
             <a:r>
               <a:rPr lang="en-GB" dirty="0" smtClean="0"/>
               <a:t>Analytics</a:t>
             </a:r>
+            <a:endParaRPr lang="en-GB" dirty="0" smtClean="0"/>
           </a:p>
           <a:p>
             <a:pPr lvl="2"/>
@@ -18910,6 +19020,36 @@
           </a:p>
         </p:txBody>
       </p:sp>
+      <p:pic>
+        <p:nvPicPr>
+          <p:cNvPr id="4" name="Picture 3"/>
+          <p:cNvPicPr>
+            <a:picLocks noChangeAspect="1"/>
+          </p:cNvPicPr>
+          <p:nvPr/>
+        </p:nvPicPr>
+        <p:blipFill>
+          <a:blip r:embed="rId2">
+            <a:extLst>
+              <a:ext uri="{28A0092B-C50C-407E-A947-70E740481C1C}">
+                <a14:useLocalDpi xmlns:a14="http://schemas.microsoft.com/office/drawing/2010/main" val="0"/>
+              </a:ext>
+            </a:extLst>
+          </a:blip>
+          <a:stretch>
+            <a:fillRect/>
+          </a:stretch>
+        </p:blipFill>
+        <p:spPr>
+          <a:xfrm>
+            <a:off x="7405439" y="332656"/>
+            <a:ext cx="1343025" cy="1343025"/>
+          </a:xfrm>
+          <a:prstGeom prst="rect">
+            <a:avLst/>
+          </a:prstGeom>
+        </p:spPr>
+      </p:pic>
     </p:spTree>
     <p:extLst>
       <p:ext uri="{BB962C8B-B14F-4D97-AF65-F5344CB8AC3E}">
@@ -18965,7 +19105,12 @@
             <p:ph type="title"/>
           </p:nvPr>
         </p:nvSpPr>
-        <p:spPr/>
+        <p:spPr>
+          <a:xfrm>
+            <a:off x="457200" y="274638"/>
+            <a:ext cx="6635080" cy="1143000"/>
+          </a:xfrm>
+        </p:spPr>
         <p:txBody>
           <a:bodyPr/>
           <a:lstStyle/>
@@ -18995,33 +19140,48 @@
         <p:spPr/>
         <p:txBody>
           <a:bodyPr>
-            <a:normAutofit lnSpcReduction="10000"/>
+            <a:normAutofit/>
           </a:bodyPr>
           <a:lstStyle/>
           <a:p>
             <a:r>
               <a:rPr lang="en-GB" dirty="0" smtClean="0"/>
-              <a:t>Proprietary Microsoft NoSQL offering</a:t>
-            </a:r>
-          </a:p>
-          <a:p>
-            <a:endParaRPr lang="en-GB" dirty="0" smtClean="0"/>
-          </a:p>
-          <a:p>
-            <a:r>
-              <a:rPr lang="en-GB" dirty="0" smtClean="0"/>
-              <a:t>JSON document format</a:t>
+              <a:t>Proprietary Microsoft NoSQL </a:t>
+            </a:r>
+            <a:r>
+              <a:rPr lang="en-GB" dirty="0" smtClean="0"/>
+              <a:t>DB</a:t>
+            </a:r>
+          </a:p>
+          <a:p>
+            <a:pPr lvl="1"/>
+            <a:r>
+              <a:rPr lang="en-GB" dirty="0" smtClean="0"/>
+              <a:t>JSON </a:t>
+            </a:r>
+            <a:r>
+              <a:rPr lang="en-GB" dirty="0" smtClean="0"/>
+              <a:t>document </a:t>
+            </a:r>
+            <a:r>
+              <a:rPr lang="en-GB" dirty="0" smtClean="0"/>
+              <a:t>format</a:t>
             </a:r>
             <a:endParaRPr lang="en-GB" dirty="0"/>
           </a:p>
           <a:p>
+            <a:pPr lvl="1"/>
             <a:r>
               <a:rPr lang="en-GB" dirty="0" err="1" smtClean="0"/>
               <a:t>Tunable</a:t>
             </a:r>
             <a:r>
               <a:rPr lang="en-GB" dirty="0" smtClean="0"/>
-              <a:t> Consistency</a:t>
+              <a:t> </a:t>
+            </a:r>
+            <a:r>
+              <a:rPr lang="en-GB" dirty="0" smtClean="0"/>
+              <a:t>Consistency</a:t>
             </a:r>
           </a:p>
           <a:p>
@@ -19030,8 +19190,13 @@
           <a:p>
             <a:r>
               <a:rPr lang="en-GB" dirty="0" smtClean="0"/>
-              <a:t>Caveats:</a:t>
-            </a:r>
+              <a:t>Caveats</a:t>
+            </a:r>
+            <a:r>
+              <a:rPr lang="en-GB" dirty="0" smtClean="0"/>
+              <a:t>:</a:t>
+            </a:r>
+            <a:endParaRPr lang="en-GB" dirty="0" smtClean="0"/>
           </a:p>
           <a:p>
             <a:pPr lvl="1"/>
@@ -19051,6 +19216,36 @@
           </a:p>
         </p:txBody>
       </p:sp>
+      <p:pic>
+        <p:nvPicPr>
+          <p:cNvPr id="4" name="Picture 3"/>
+          <p:cNvPicPr>
+            <a:picLocks noChangeAspect="1"/>
+          </p:cNvPicPr>
+          <p:nvPr/>
+        </p:nvPicPr>
+        <p:blipFill>
+          <a:blip r:embed="rId2">
+            <a:extLst>
+              <a:ext uri="{28A0092B-C50C-407E-A947-70E740481C1C}">
+                <a14:useLocalDpi xmlns:a14="http://schemas.microsoft.com/office/drawing/2010/main" val="0"/>
+              </a:ext>
+            </a:extLst>
+          </a:blip>
+          <a:stretch>
+            <a:fillRect/>
+          </a:stretch>
+        </p:blipFill>
+        <p:spPr>
+          <a:xfrm>
+            <a:off x="7405439" y="332656"/>
+            <a:ext cx="1343025" cy="1343025"/>
+          </a:xfrm>
+          <a:prstGeom prst="rect">
+            <a:avLst/>
+          </a:prstGeom>
+        </p:spPr>
+      </p:pic>
     </p:spTree>
     <p:extLst>
       <p:ext uri="{BB962C8B-B14F-4D97-AF65-F5344CB8AC3E}">

</xml_diff>

<commit_message>
Final (?) version of slides
</commit_message>
<xml_diff>
--- a/Slides/Not Only SQL - Picking A Database for DotNET.pptx
+++ b/Slides/Not Only SQL - Picking A Database for DotNET.pptx
@@ -5,7 +5,7 @@
     <p:sldMasterId id="2147483648" r:id="rId1"/>
   </p:sldMasterIdLst>
   <p:notesMasterIdLst>
-    <p:notesMasterId r:id="rId50"/>
+    <p:notesMasterId r:id="rId51"/>
   </p:notesMasterIdLst>
   <p:sldIdLst>
     <p:sldId id="256" r:id="rId2"/>
@@ -28,34 +28,35 @@
     <p:sldId id="284" r:id="rId19"/>
     <p:sldId id="285" r:id="rId20"/>
     <p:sldId id="289" r:id="rId21"/>
-    <p:sldId id="295" r:id="rId22"/>
-    <p:sldId id="296" r:id="rId23"/>
-    <p:sldId id="333" r:id="rId24"/>
-    <p:sldId id="328" r:id="rId25"/>
-    <p:sldId id="331" r:id="rId26"/>
-    <p:sldId id="330" r:id="rId27"/>
-    <p:sldId id="337" r:id="rId28"/>
-    <p:sldId id="338" r:id="rId29"/>
-    <p:sldId id="339" r:id="rId30"/>
-    <p:sldId id="335" r:id="rId31"/>
-    <p:sldId id="336" r:id="rId32"/>
-    <p:sldId id="326" r:id="rId33"/>
-    <p:sldId id="329" r:id="rId34"/>
-    <p:sldId id="305" r:id="rId35"/>
-    <p:sldId id="306" r:id="rId36"/>
-    <p:sldId id="307" r:id="rId37"/>
-    <p:sldId id="344" r:id="rId38"/>
-    <p:sldId id="341" r:id="rId39"/>
-    <p:sldId id="340" r:id="rId40"/>
-    <p:sldId id="309" r:id="rId41"/>
-    <p:sldId id="302" r:id="rId42"/>
-    <p:sldId id="346" r:id="rId43"/>
-    <p:sldId id="332" r:id="rId44"/>
-    <p:sldId id="311" r:id="rId45"/>
-    <p:sldId id="267" r:id="rId46"/>
-    <p:sldId id="343" r:id="rId47"/>
-    <p:sldId id="268" r:id="rId48"/>
-    <p:sldId id="272" r:id="rId49"/>
+    <p:sldId id="348" r:id="rId22"/>
+    <p:sldId id="295" r:id="rId23"/>
+    <p:sldId id="296" r:id="rId24"/>
+    <p:sldId id="333" r:id="rId25"/>
+    <p:sldId id="328" r:id="rId26"/>
+    <p:sldId id="331" r:id="rId27"/>
+    <p:sldId id="330" r:id="rId28"/>
+    <p:sldId id="337" r:id="rId29"/>
+    <p:sldId id="338" r:id="rId30"/>
+    <p:sldId id="339" r:id="rId31"/>
+    <p:sldId id="335" r:id="rId32"/>
+    <p:sldId id="336" r:id="rId33"/>
+    <p:sldId id="326" r:id="rId34"/>
+    <p:sldId id="329" r:id="rId35"/>
+    <p:sldId id="305" r:id="rId36"/>
+    <p:sldId id="306" r:id="rId37"/>
+    <p:sldId id="307" r:id="rId38"/>
+    <p:sldId id="344" r:id="rId39"/>
+    <p:sldId id="341" r:id="rId40"/>
+    <p:sldId id="340" r:id="rId41"/>
+    <p:sldId id="309" r:id="rId42"/>
+    <p:sldId id="302" r:id="rId43"/>
+    <p:sldId id="346" r:id="rId44"/>
+    <p:sldId id="332" r:id="rId45"/>
+    <p:sldId id="311" r:id="rId46"/>
+    <p:sldId id="267" r:id="rId47"/>
+    <p:sldId id="343" r:id="rId48"/>
+    <p:sldId id="268" r:id="rId49"/>
+    <p:sldId id="272" r:id="rId50"/>
   </p:sldIdLst>
   <p:sldSz cx="9144000" cy="6858000" type="screen4x3"/>
   <p:notesSz cx="6858000" cy="9144000"/>
@@ -201,8 +202,9 @@
             <p14:sldId id="289"/>
           </p14:sldIdLst>
         </p14:section>
-        <p14:section name="AP - Riak &amp; Cassandra" id="{BD5FAAEB-85ED-43B1-9F71-45F33E59E497}">
+        <p14:section name="CP &amp; AP Systems" id="{BD5FAAEB-85ED-43B1-9F71-45F33E59E497}">
           <p14:sldIdLst>
+            <p14:sldId id="348"/>
             <p14:sldId id="295"/>
             <p14:sldId id="296"/>
           </p14:sldIdLst>
@@ -345,7 +347,7 @@
           <a:p>
             <a:fld id="{4B8F0AD9-C137-4A52-8600-32592EF064CA}" type="datetimeFigureOut">
               <a:rPr lang="en-GB" smtClean="0"/>
-              <a:t>27/04/2015</a:t>
+              <a:t>29/04/2015</a:t>
             </a:fld>
             <a:endParaRPr lang="en-GB"/>
           </a:p>
@@ -1367,7 +1369,7 @@
           <a:p>
             <a:fld id="{B88E1A96-A68C-4ED7-8535-7FE27C72D2F0}" type="slidenum">
               <a:rPr lang="en-GB" smtClean="0"/>
-              <a:t>21</a:t>
+              <a:t>22</a:t>
             </a:fld>
             <a:endParaRPr lang="en-GB"/>
           </a:p>
@@ -1475,7 +1477,7 @@
           <a:p>
             <a:fld id="{B88E1A96-A68C-4ED7-8535-7FE27C72D2F0}" type="slidenum">
               <a:rPr lang="en-GB" smtClean="0"/>
-              <a:t>22</a:t>
+              <a:t>23</a:t>
             </a:fld>
             <a:endParaRPr lang="en-GB"/>
           </a:p>
@@ -1559,7 +1561,7 @@
           <a:p>
             <a:fld id="{B88E1A96-A68C-4ED7-8535-7FE27C72D2F0}" type="slidenum">
               <a:rPr lang="en-GB" smtClean="0"/>
-              <a:t>25</a:t>
+              <a:t>26</a:t>
             </a:fld>
             <a:endParaRPr lang="en-GB"/>
           </a:p>
@@ -1643,7 +1645,7 @@
           <a:p>
             <a:fld id="{B88E1A96-A68C-4ED7-8535-7FE27C72D2F0}" type="slidenum">
               <a:rPr lang="en-GB" smtClean="0"/>
-              <a:t>35</a:t>
+              <a:t>36</a:t>
             </a:fld>
             <a:endParaRPr lang="en-GB"/>
           </a:p>
@@ -1811,7 +1813,7 @@
           <a:p>
             <a:fld id="{B88E1A96-A68C-4ED7-8535-7FE27C72D2F0}" type="slidenum">
               <a:rPr lang="en-GB" smtClean="0"/>
-              <a:t>39</a:t>
+              <a:t>40</a:t>
             </a:fld>
             <a:endParaRPr lang="en-GB"/>
           </a:p>
@@ -1895,7 +1897,7 @@
           <a:p>
             <a:fld id="{B88E1A96-A68C-4ED7-8535-7FE27C72D2F0}" type="slidenum">
               <a:rPr lang="en-GB" smtClean="0"/>
-              <a:t>40</a:t>
+              <a:t>41</a:t>
             </a:fld>
             <a:endParaRPr lang="en-GB"/>
           </a:p>
@@ -1979,7 +1981,7 @@
           <a:p>
             <a:fld id="{B88E1A96-A68C-4ED7-8535-7FE27C72D2F0}" type="slidenum">
               <a:rPr lang="en-GB" smtClean="0"/>
-              <a:t>41</a:t>
+              <a:t>42</a:t>
             </a:fld>
             <a:endParaRPr lang="en-GB"/>
           </a:p>
@@ -2063,7 +2065,7 @@
           <a:p>
             <a:fld id="{B88E1A96-A68C-4ED7-8535-7FE27C72D2F0}" type="slidenum">
               <a:rPr lang="en-GB" smtClean="0"/>
-              <a:t>45</a:t>
+              <a:t>46</a:t>
             </a:fld>
             <a:endParaRPr lang="en-GB"/>
           </a:p>
@@ -2147,7 +2149,7 @@
           <a:p>
             <a:fld id="{B88E1A96-A68C-4ED7-8535-7FE27C72D2F0}" type="slidenum">
               <a:rPr lang="en-GB" smtClean="0"/>
-              <a:t>47</a:t>
+              <a:t>48</a:t>
             </a:fld>
             <a:endParaRPr lang="en-GB"/>
           </a:p>
@@ -2231,7 +2233,7 @@
           <a:p>
             <a:fld id="{B88E1A96-A68C-4ED7-8535-7FE27C72D2F0}" type="slidenum">
               <a:rPr lang="en-GB" smtClean="0"/>
-              <a:t>48</a:t>
+              <a:t>49</a:t>
             </a:fld>
             <a:endParaRPr lang="en-GB"/>
           </a:p>
@@ -3023,7 +3025,7 @@
           <a:p>
             <a:fld id="{02F45FB7-11FC-4A5D-8578-8A11B0F11936}" type="datetimeFigureOut">
               <a:rPr lang="en-GB" smtClean="0"/>
-              <a:t>27/04/2015</a:t>
+              <a:t>29/04/2015</a:t>
             </a:fld>
             <a:endParaRPr lang="en-GB"/>
           </a:p>
@@ -3193,7 +3195,7 @@
           <a:p>
             <a:fld id="{02F45FB7-11FC-4A5D-8578-8A11B0F11936}" type="datetimeFigureOut">
               <a:rPr lang="en-GB" smtClean="0"/>
-              <a:t>27/04/2015</a:t>
+              <a:t>29/04/2015</a:t>
             </a:fld>
             <a:endParaRPr lang="en-GB"/>
           </a:p>
@@ -3373,7 +3375,7 @@
           <a:p>
             <a:fld id="{02F45FB7-11FC-4A5D-8578-8A11B0F11936}" type="datetimeFigureOut">
               <a:rPr lang="en-GB" smtClean="0"/>
-              <a:t>27/04/2015</a:t>
+              <a:t>29/04/2015</a:t>
             </a:fld>
             <a:endParaRPr lang="en-GB"/>
           </a:p>
@@ -3543,7 +3545,7 @@
           <a:p>
             <a:fld id="{02F45FB7-11FC-4A5D-8578-8A11B0F11936}" type="datetimeFigureOut">
               <a:rPr lang="en-GB" smtClean="0"/>
-              <a:t>27/04/2015</a:t>
+              <a:t>29/04/2015</a:t>
             </a:fld>
             <a:endParaRPr lang="en-GB"/>
           </a:p>
@@ -3789,7 +3791,7 @@
           <a:p>
             <a:fld id="{02F45FB7-11FC-4A5D-8578-8A11B0F11936}" type="datetimeFigureOut">
               <a:rPr lang="en-GB" smtClean="0"/>
-              <a:t>27/04/2015</a:t>
+              <a:t>29/04/2015</a:t>
             </a:fld>
             <a:endParaRPr lang="en-GB"/>
           </a:p>
@@ -4077,7 +4079,7 @@
           <a:p>
             <a:fld id="{02F45FB7-11FC-4A5D-8578-8A11B0F11936}" type="datetimeFigureOut">
               <a:rPr lang="en-GB" smtClean="0"/>
-              <a:t>27/04/2015</a:t>
+              <a:t>29/04/2015</a:t>
             </a:fld>
             <a:endParaRPr lang="en-GB"/>
           </a:p>
@@ -4499,7 +4501,7 @@
           <a:p>
             <a:fld id="{02F45FB7-11FC-4A5D-8578-8A11B0F11936}" type="datetimeFigureOut">
               <a:rPr lang="en-GB" smtClean="0"/>
-              <a:t>27/04/2015</a:t>
+              <a:t>29/04/2015</a:t>
             </a:fld>
             <a:endParaRPr lang="en-GB"/>
           </a:p>
@@ -4617,7 +4619,7 @@
           <a:p>
             <a:fld id="{02F45FB7-11FC-4A5D-8578-8A11B0F11936}" type="datetimeFigureOut">
               <a:rPr lang="en-GB" smtClean="0"/>
-              <a:t>27/04/2015</a:t>
+              <a:t>29/04/2015</a:t>
             </a:fld>
             <a:endParaRPr lang="en-GB"/>
           </a:p>
@@ -4712,7 +4714,7 @@
           <a:p>
             <a:fld id="{02F45FB7-11FC-4A5D-8578-8A11B0F11936}" type="datetimeFigureOut">
               <a:rPr lang="en-GB" smtClean="0"/>
-              <a:t>27/04/2015</a:t>
+              <a:t>29/04/2015</a:t>
             </a:fld>
             <a:endParaRPr lang="en-GB"/>
           </a:p>
@@ -4989,7 +4991,7 @@
           <a:p>
             <a:fld id="{02F45FB7-11FC-4A5D-8578-8A11B0F11936}" type="datetimeFigureOut">
               <a:rPr lang="en-GB" smtClean="0"/>
-              <a:t>27/04/2015</a:t>
+              <a:t>29/04/2015</a:t>
             </a:fld>
             <a:endParaRPr lang="en-GB"/>
           </a:p>
@@ -5242,7 +5244,7 @@
           <a:p>
             <a:fld id="{02F45FB7-11FC-4A5D-8578-8A11B0F11936}" type="datetimeFigureOut">
               <a:rPr lang="en-GB" smtClean="0"/>
-              <a:t>27/04/2015</a:t>
+              <a:t>29/04/2015</a:t>
             </a:fld>
             <a:endParaRPr lang="en-GB"/>
           </a:p>
@@ -5455,7 +5457,7 @@
           <a:p>
             <a:fld id="{02F45FB7-11FC-4A5D-8578-8A11B0F11936}" type="datetimeFigureOut">
               <a:rPr lang="en-GB" smtClean="0"/>
-              <a:t>27/04/2015</a:t>
+              <a:t>29/04/2015</a:t>
             </a:fld>
             <a:endParaRPr lang="en-GB"/>
           </a:p>
@@ -11413,14 +11415,6 @@
 <file path=ppt/slides/slide21.xml><?xml version="1.0" encoding="utf-8"?>
 <p:sld xmlns:a="http://schemas.openxmlformats.org/drawingml/2006/main" xmlns:r="http://schemas.openxmlformats.org/officeDocument/2006/relationships" xmlns:p="http://schemas.openxmlformats.org/presentationml/2006/main">
   <p:cSld>
-    <p:bg>
-      <p:bgPr>
-        <a:solidFill>
-          <a:schemeClr val="bg1"/>
-        </a:solidFill>
-        <a:effectLst/>
-      </p:bgPr>
-    </p:bg>
     <p:spTree>
       <p:nvGrpSpPr>
         <p:cNvPr id="1" name=""/>
@@ -11452,77 +11446,81 @@
           <a:p>
             <a:r>
               <a:rPr lang="en-GB" dirty="0" smtClean="0"/>
-              <a:t>“AP” Systems – </a:t>
-            </a:r>
-            <a:r>
-              <a:rPr lang="en-GB" dirty="0" err="1" smtClean="0"/>
-              <a:t>Riak</a:t>
-            </a:r>
+              <a:t>“CP” Systems</a:t>
+            </a:r>
+            <a:endParaRPr lang="en-GB" dirty="0"/>
+          </a:p>
+        </p:txBody>
+      </p:sp>
+      <p:sp>
+        <p:nvSpPr>
+          <p:cNvPr id="3" name="Content Placeholder 2"/>
+          <p:cNvSpPr>
+            <a:spLocks noGrp="1"/>
+          </p:cNvSpPr>
+          <p:nvPr>
+            <p:ph idx="1"/>
+          </p:nvPr>
+        </p:nvSpPr>
+        <p:spPr/>
+        <p:txBody>
+          <a:bodyPr>
+            <a:normAutofit/>
+          </a:bodyPr>
+          <a:lstStyle/>
+          <a:p>
             <a:r>
               <a:rPr lang="en-GB" dirty="0" smtClean="0"/>
-              <a:t> &amp; Cassandra</a:t>
-            </a:r>
+              <a:t>Relational Databases</a:t>
+            </a:r>
+          </a:p>
+          <a:p>
             <a:endParaRPr lang="en-GB" dirty="0"/>
           </a:p>
-        </p:txBody>
-      </p:sp>
-      <p:sp>
-        <p:nvSpPr>
-          <p:cNvPr id="3" name="Content Placeholder 2"/>
-          <p:cNvSpPr>
-            <a:spLocks noGrp="1"/>
-          </p:cNvSpPr>
-          <p:nvPr>
-            <p:ph idx="1"/>
-          </p:nvPr>
-        </p:nvSpPr>
-        <p:spPr/>
-        <p:txBody>
-          <a:bodyPr/>
-          <a:lstStyle/>
           <a:p>
             <a:r>
               <a:rPr lang="en-GB" dirty="0" smtClean="0"/>
-              <a:t>Highly </a:t>
-            </a:r>
-            <a:r>
-              <a:rPr lang="en-GB" dirty="0" smtClean="0"/>
-              <a:t>optimised for availability</a:t>
+              <a:t>MongoDB</a:t>
             </a:r>
           </a:p>
           <a:p>
             <a:pPr lvl="1"/>
             <a:r>
-              <a:rPr lang="en-GB" dirty="0" smtClean="0"/>
-              <a:t>Based on Amazon “Dynamo” </a:t>
-            </a:r>
-            <a:r>
-              <a:rPr lang="en-GB" dirty="0" smtClean="0"/>
-              <a:t>paper</a:t>
-            </a:r>
-          </a:p>
-          <a:p>
-            <a:pPr lvl="1"/>
-            <a:r>
-              <a:rPr lang="en-GB" dirty="0" smtClean="0"/>
-              <a:t>“Ring Model” for data distribution</a:t>
-            </a:r>
-          </a:p>
-          <a:p>
-            <a:pPr lvl="1"/>
-            <a:r>
-              <a:rPr lang="en-GB" dirty="0" smtClean="0"/>
-              <a:t>“</a:t>
-            </a:r>
-            <a:r>
-              <a:rPr lang="en-GB" dirty="0" err="1" smtClean="0"/>
-              <a:t>Tunable</a:t>
-            </a:r>
-            <a:r>
-              <a:rPr lang="en-GB" dirty="0" smtClean="0"/>
-              <a:t> Consistency”</a:t>
-            </a:r>
-            <a:endParaRPr lang="en-GB" dirty="0" smtClean="0"/>
+              <a:rPr lang="en-GB" sz="2400" dirty="0" smtClean="0"/>
+              <a:t>Although:</a:t>
+            </a:r>
+          </a:p>
+          <a:p>
+            <a:pPr lvl="2"/>
+            <a:r>
+              <a:rPr lang="en-GB" sz="2000" dirty="0">
+                <a:hlinkClick r:id="rId2"/>
+              </a:rPr>
+              <a:t>https://</a:t>
+            </a:r>
+            <a:r>
+              <a:rPr lang="en-GB" sz="2000" dirty="0" smtClean="0">
+                <a:hlinkClick r:id="rId2"/>
+              </a:rPr>
+              <a:t>aphyr.com/posts/284-call-me-maybe-mongodb</a:t>
+            </a:r>
+            <a:endParaRPr lang="en-GB" sz="2000" dirty="0" smtClean="0"/>
+          </a:p>
+          <a:p>
+            <a:pPr lvl="2"/>
+            <a:r>
+              <a:rPr lang="en-GB" sz="2000" dirty="0">
+                <a:hlinkClick r:id="rId3"/>
+              </a:rPr>
+              <a:t>https://</a:t>
+            </a:r>
+            <a:r>
+              <a:rPr lang="en-GB" sz="2000" dirty="0" smtClean="0">
+                <a:hlinkClick r:id="rId3"/>
+              </a:rPr>
+              <a:t>aphyr.com/posts/322-call-me-maybe-mongodb-stale-reads</a:t>
+            </a:r>
+            <a:endParaRPr lang="en-GB" sz="2000" dirty="0" smtClean="0"/>
           </a:p>
           <a:p>
             <a:pPr marL="0" indent="0">
@@ -11531,26 +11529,24 @@
             <a:endParaRPr lang="en-GB" dirty="0"/>
           </a:p>
           <a:p>
+            <a:pPr marL="0" indent="0">
+              <a:buNone/>
+            </a:pPr>
             <a:r>
               <a:rPr lang="en-GB" dirty="0" smtClean="0"/>
-              <a:t>Key-based “Aggregate</a:t>
-            </a:r>
-            <a:r>
-              <a:rPr lang="en-GB" dirty="0"/>
-              <a:t>” data models (as per document DBs) – </a:t>
-            </a:r>
-            <a:r>
-              <a:rPr lang="en-GB" dirty="0" smtClean="0"/>
-              <a:t>no joins!</a:t>
-            </a:r>
-            <a:endParaRPr lang="en-GB" dirty="0" smtClean="0"/>
+              <a:t>etc. …</a:t>
+            </a:r>
+          </a:p>
+          <a:p>
+            <a:pPr lvl="2"/>
+            <a:endParaRPr lang="en-GB" dirty="0"/>
           </a:p>
         </p:txBody>
       </p:sp>
     </p:spTree>
     <p:extLst>
       <p:ext uri="{BB962C8B-B14F-4D97-AF65-F5344CB8AC3E}">
-        <p14:creationId xmlns:p14="http://schemas.microsoft.com/office/powerpoint/2010/main" val="2924640553"/>
+        <p14:creationId xmlns:p14="http://schemas.microsoft.com/office/powerpoint/2010/main" val="1983139557"/>
       </p:ext>
     </p:extLst>
   </p:cSld>
@@ -11609,6 +11605,154 @@
           <a:p>
             <a:r>
               <a:rPr lang="en-GB" dirty="0" smtClean="0"/>
+              <a:t>“AP” Systems – </a:t>
+            </a:r>
+            <a:r>
+              <a:rPr lang="en-GB" dirty="0" err="1" smtClean="0"/>
+              <a:t>Riak</a:t>
+            </a:r>
+            <a:r>
+              <a:rPr lang="en-GB" dirty="0" smtClean="0"/>
+              <a:t> &amp; Cassandra</a:t>
+            </a:r>
+            <a:endParaRPr lang="en-GB" dirty="0"/>
+          </a:p>
+        </p:txBody>
+      </p:sp>
+      <p:sp>
+        <p:nvSpPr>
+          <p:cNvPr id="3" name="Content Placeholder 2"/>
+          <p:cNvSpPr>
+            <a:spLocks noGrp="1"/>
+          </p:cNvSpPr>
+          <p:nvPr>
+            <p:ph idx="1"/>
+          </p:nvPr>
+        </p:nvSpPr>
+        <p:spPr/>
+        <p:txBody>
+          <a:bodyPr/>
+          <a:lstStyle/>
+          <a:p>
+            <a:r>
+              <a:rPr lang="en-GB" dirty="0" smtClean="0"/>
+              <a:t>Highly optimised for availability</a:t>
+            </a:r>
+          </a:p>
+          <a:p>
+            <a:pPr lvl="1"/>
+            <a:r>
+              <a:rPr lang="en-GB" dirty="0" smtClean="0"/>
+              <a:t>Based on Amazon “Dynamo” paper</a:t>
+            </a:r>
+          </a:p>
+          <a:p>
+            <a:pPr lvl="1"/>
+            <a:r>
+              <a:rPr lang="en-GB" dirty="0" smtClean="0"/>
+              <a:t>“Ring Model” for data distribution</a:t>
+            </a:r>
+          </a:p>
+          <a:p>
+            <a:pPr lvl="1"/>
+            <a:r>
+              <a:rPr lang="en-GB" dirty="0" smtClean="0"/>
+              <a:t>“Eventual” Consistency, </a:t>
+            </a:r>
+            <a:r>
+              <a:rPr lang="en-GB" dirty="0" err="1" smtClean="0"/>
+              <a:t>Tunable</a:t>
+            </a:r>
+            <a:r>
+              <a:rPr lang="en-GB" dirty="0" smtClean="0"/>
+              <a:t> Consistency</a:t>
+            </a:r>
+            <a:endParaRPr lang="en-GB" dirty="0" smtClean="0"/>
+          </a:p>
+          <a:p>
+            <a:pPr marL="0" indent="0">
+              <a:buNone/>
+            </a:pPr>
+            <a:endParaRPr lang="en-GB" dirty="0"/>
+          </a:p>
+          <a:p>
+            <a:r>
+              <a:rPr lang="en-GB" dirty="0" smtClean="0"/>
+              <a:t>Key-based “Aggregate</a:t>
+            </a:r>
+            <a:r>
+              <a:rPr lang="en-GB" dirty="0"/>
+              <a:t>” data models (as per document DBs) – </a:t>
+            </a:r>
+            <a:r>
+              <a:rPr lang="en-GB" dirty="0" smtClean="0"/>
+              <a:t>no joins!</a:t>
+            </a:r>
+          </a:p>
+        </p:txBody>
+      </p:sp>
+    </p:spTree>
+    <p:extLst>
+      <p:ext uri="{BB962C8B-B14F-4D97-AF65-F5344CB8AC3E}">
+        <p14:creationId xmlns:p14="http://schemas.microsoft.com/office/powerpoint/2010/main" val="2924640553"/>
+      </p:ext>
+    </p:extLst>
+  </p:cSld>
+  <p:clrMapOvr>
+    <a:masterClrMapping/>
+  </p:clrMapOvr>
+  <p:timing>
+    <p:tnLst>
+      <p:par>
+        <p:cTn id="1" dur="indefinite" restart="never" nodeType="tmRoot"/>
+      </p:par>
+    </p:tnLst>
+  </p:timing>
+</p:sld>
+</file>
+
+<file path=ppt/slides/slide23.xml><?xml version="1.0" encoding="utf-8"?>
+<p:sld xmlns:a="http://schemas.openxmlformats.org/drawingml/2006/main" xmlns:r="http://schemas.openxmlformats.org/officeDocument/2006/relationships" xmlns:p="http://schemas.openxmlformats.org/presentationml/2006/main">
+  <p:cSld>
+    <p:bg>
+      <p:bgPr>
+        <a:solidFill>
+          <a:schemeClr val="bg1"/>
+        </a:solidFill>
+        <a:effectLst/>
+      </p:bgPr>
+    </p:bg>
+    <p:spTree>
+      <p:nvGrpSpPr>
+        <p:cNvPr id="1" name=""/>
+        <p:cNvGrpSpPr/>
+        <p:nvPr/>
+      </p:nvGrpSpPr>
+      <p:grpSpPr>
+        <a:xfrm>
+          <a:off x="0" y="0"/>
+          <a:ext cx="0" cy="0"/>
+          <a:chOff x="0" y="0"/>
+          <a:chExt cx="0" cy="0"/>
+        </a:xfrm>
+      </p:grpSpPr>
+      <p:sp>
+        <p:nvSpPr>
+          <p:cNvPr id="2" name="Title 1"/>
+          <p:cNvSpPr>
+            <a:spLocks noGrp="1"/>
+          </p:cNvSpPr>
+          <p:nvPr>
+            <p:ph type="title"/>
+          </p:nvPr>
+        </p:nvSpPr>
+        <p:spPr/>
+        <p:txBody>
+          <a:bodyPr/>
+          <a:lstStyle/>
+          <a:p>
+            <a:r>
+              <a:rPr lang="en-GB" dirty="0" smtClean="0"/>
               <a:t>The Ring Model</a:t>
             </a:r>
             <a:endParaRPr lang="en-GB" dirty="0"/>
@@ -11705,7 +11849,7 @@
 </p:sld>
 </file>
 
-<file path=ppt/slides/slide23.xml><?xml version="1.0" encoding="utf-8"?>
+<file path=ppt/slides/slide24.xml><?xml version="1.0" encoding="utf-8"?>
 <p:sld xmlns:a="http://schemas.openxmlformats.org/drawingml/2006/main" xmlns:r="http://schemas.openxmlformats.org/officeDocument/2006/relationships" xmlns:p="http://schemas.openxmlformats.org/presentationml/2006/main">
   <p:cSld>
     <p:bg>
@@ -11908,7 +12052,7 @@
 </p:sld>
 </file>
 
-<file path=ppt/slides/slide24.xml><?xml version="1.0" encoding="utf-8"?>
+<file path=ppt/slides/slide25.xml><?xml version="1.0" encoding="utf-8"?>
 <p:sld xmlns:a="http://schemas.openxmlformats.org/drawingml/2006/main" xmlns:r="http://schemas.openxmlformats.org/officeDocument/2006/relationships" xmlns:p="http://schemas.openxmlformats.org/presentationml/2006/main">
   <p:cSld>
     <p:bg>
@@ -12003,7 +12147,7 @@
 </p:sld>
 </file>
 
-<file path=ppt/slides/slide25.xml><?xml version="1.0" encoding="utf-8"?>
+<file path=ppt/slides/slide26.xml><?xml version="1.0" encoding="utf-8"?>
 <p:sld xmlns:a="http://schemas.openxmlformats.org/drawingml/2006/main" xmlns:r="http://schemas.openxmlformats.org/officeDocument/2006/relationships" xmlns:p="http://schemas.openxmlformats.org/presentationml/2006/main">
   <p:cSld>
     <p:bg>
@@ -12240,93 +12384,6 @@
 </p:sld>
 </file>
 
-<file path=ppt/slides/slide26.xml><?xml version="1.0" encoding="utf-8"?>
-<p:sld xmlns:a="http://schemas.openxmlformats.org/drawingml/2006/main" xmlns:r="http://schemas.openxmlformats.org/officeDocument/2006/relationships" xmlns:p="http://schemas.openxmlformats.org/presentationml/2006/main">
-  <p:cSld>
-    <p:bg>
-      <p:bgPr>
-        <a:solidFill>
-          <a:schemeClr val="bg1"/>
-        </a:solidFill>
-        <a:effectLst/>
-      </p:bgPr>
-    </p:bg>
-    <p:spTree>
-      <p:nvGrpSpPr>
-        <p:cNvPr id="1" name=""/>
-        <p:cNvGrpSpPr/>
-        <p:nvPr/>
-      </p:nvGrpSpPr>
-      <p:grpSpPr>
-        <a:xfrm>
-          <a:off x="0" y="0"/>
-          <a:ext cx="0" cy="0"/>
-          <a:chOff x="0" y="0"/>
-          <a:chExt cx="0" cy="0"/>
-        </a:xfrm>
-      </p:grpSpPr>
-      <p:sp>
-        <p:nvSpPr>
-          <p:cNvPr id="2" name="Title 1"/>
-          <p:cNvSpPr>
-            <a:spLocks noGrp="1"/>
-          </p:cNvSpPr>
-          <p:nvPr>
-            <p:ph type="ctrTitle"/>
-          </p:nvPr>
-        </p:nvSpPr>
-        <p:spPr/>
-        <p:txBody>
-          <a:bodyPr/>
-          <a:lstStyle/>
-          <a:p>
-            <a:r>
-              <a:rPr lang="en-GB" dirty="0" smtClean="0"/>
-              <a:t>(Cassandra Demo)</a:t>
-            </a:r>
-            <a:endParaRPr lang="en-GB" dirty="0"/>
-          </a:p>
-        </p:txBody>
-      </p:sp>
-      <p:sp>
-        <p:nvSpPr>
-          <p:cNvPr id="3" name="Subtitle 2"/>
-          <p:cNvSpPr>
-            <a:spLocks noGrp="1"/>
-          </p:cNvSpPr>
-          <p:nvPr>
-            <p:ph type="subTitle" idx="1"/>
-          </p:nvPr>
-        </p:nvSpPr>
-        <p:spPr/>
-        <p:txBody>
-          <a:bodyPr/>
-          <a:lstStyle/>
-          <a:p>
-            <a:endParaRPr lang="en-GB"/>
-          </a:p>
-        </p:txBody>
-      </p:sp>
-    </p:spTree>
-    <p:extLst>
-      <p:ext uri="{BB962C8B-B14F-4D97-AF65-F5344CB8AC3E}">
-        <p14:creationId xmlns:p14="http://schemas.microsoft.com/office/powerpoint/2010/main" val="3763083771"/>
-      </p:ext>
-    </p:extLst>
-  </p:cSld>
-  <p:clrMapOvr>
-    <a:masterClrMapping/>
-  </p:clrMapOvr>
-  <p:timing>
-    <p:tnLst>
-      <p:par>
-        <p:cTn id="1" dur="indefinite" restart="never" nodeType="tmRoot"/>
-      </p:par>
-    </p:tnLst>
-  </p:timing>
-</p:sld>
-</file>
-
 <file path=ppt/slides/slide27.xml><?xml version="1.0" encoding="utf-8"?>
 <p:sld xmlns:a="http://schemas.openxmlformats.org/drawingml/2006/main" xmlns:r="http://schemas.openxmlformats.org/officeDocument/2006/relationships" xmlns:p="http://schemas.openxmlformats.org/presentationml/2006/main">
   <p:cSld>
@@ -12359,6 +12416,93 @@
             <a:spLocks noGrp="1"/>
           </p:cNvSpPr>
           <p:nvPr>
+            <p:ph type="ctrTitle"/>
+          </p:nvPr>
+        </p:nvSpPr>
+        <p:spPr/>
+        <p:txBody>
+          <a:bodyPr/>
+          <a:lstStyle/>
+          <a:p>
+            <a:r>
+              <a:rPr lang="en-GB" dirty="0" smtClean="0"/>
+              <a:t>(Cassandra Demo)</a:t>
+            </a:r>
+            <a:endParaRPr lang="en-GB" dirty="0"/>
+          </a:p>
+        </p:txBody>
+      </p:sp>
+      <p:sp>
+        <p:nvSpPr>
+          <p:cNvPr id="3" name="Subtitle 2"/>
+          <p:cNvSpPr>
+            <a:spLocks noGrp="1"/>
+          </p:cNvSpPr>
+          <p:nvPr>
+            <p:ph type="subTitle" idx="1"/>
+          </p:nvPr>
+        </p:nvSpPr>
+        <p:spPr/>
+        <p:txBody>
+          <a:bodyPr/>
+          <a:lstStyle/>
+          <a:p>
+            <a:endParaRPr lang="en-GB"/>
+          </a:p>
+        </p:txBody>
+      </p:sp>
+    </p:spTree>
+    <p:extLst>
+      <p:ext uri="{BB962C8B-B14F-4D97-AF65-F5344CB8AC3E}">
+        <p14:creationId xmlns:p14="http://schemas.microsoft.com/office/powerpoint/2010/main" val="3763083771"/>
+      </p:ext>
+    </p:extLst>
+  </p:cSld>
+  <p:clrMapOvr>
+    <a:masterClrMapping/>
+  </p:clrMapOvr>
+  <p:timing>
+    <p:tnLst>
+      <p:par>
+        <p:cTn id="1" dur="indefinite" restart="never" nodeType="tmRoot"/>
+      </p:par>
+    </p:tnLst>
+  </p:timing>
+</p:sld>
+</file>
+
+<file path=ppt/slides/slide28.xml><?xml version="1.0" encoding="utf-8"?>
+<p:sld xmlns:a="http://schemas.openxmlformats.org/drawingml/2006/main" xmlns:r="http://schemas.openxmlformats.org/officeDocument/2006/relationships" xmlns:p="http://schemas.openxmlformats.org/presentationml/2006/main">
+  <p:cSld>
+    <p:bg>
+      <p:bgPr>
+        <a:solidFill>
+          <a:schemeClr val="bg1"/>
+        </a:solidFill>
+        <a:effectLst/>
+      </p:bgPr>
+    </p:bg>
+    <p:spTree>
+      <p:nvGrpSpPr>
+        <p:cNvPr id="1" name=""/>
+        <p:cNvGrpSpPr/>
+        <p:nvPr/>
+      </p:nvGrpSpPr>
+      <p:grpSpPr>
+        <a:xfrm>
+          <a:off x="0" y="0"/>
+          <a:ext cx="0" cy="0"/>
+          <a:chOff x="0" y="0"/>
+          <a:chExt cx="0" cy="0"/>
+        </a:xfrm>
+      </p:grpSpPr>
+      <p:sp>
+        <p:nvSpPr>
+          <p:cNvPr id="2" name="Title 1"/>
+          <p:cNvSpPr>
+            <a:spLocks noGrp="1"/>
+          </p:cNvSpPr>
+          <p:nvPr>
             <p:ph type="title"/>
           </p:nvPr>
         </p:nvSpPr>
@@ -12452,7 +12596,7 @@
 </p:sld>
 </file>
 
-<file path=ppt/slides/slide28.xml><?xml version="1.0" encoding="utf-8"?>
+<file path=ppt/slides/slide29.xml><?xml version="1.0" encoding="utf-8"?>
 <p:sld xmlns:a="http://schemas.openxmlformats.org/drawingml/2006/main" xmlns:r="http://schemas.openxmlformats.org/officeDocument/2006/relationships" xmlns:p="http://schemas.openxmlformats.org/presentationml/2006/main">
   <p:cSld>
     <p:bg>
@@ -12580,269 +12724,6 @@
 </p:sld>
 </file>
 
-<file path=ppt/slides/slide29.xml><?xml version="1.0" encoding="utf-8"?>
-<p:sld xmlns:a="http://schemas.openxmlformats.org/drawingml/2006/main" xmlns:r="http://schemas.openxmlformats.org/officeDocument/2006/relationships" xmlns:p="http://schemas.openxmlformats.org/presentationml/2006/main">
-  <p:cSld>
-    <p:bg>
-      <p:bgPr>
-        <a:solidFill>
-          <a:schemeClr val="bg1"/>
-        </a:solidFill>
-        <a:effectLst/>
-      </p:bgPr>
-    </p:bg>
-    <p:spTree>
-      <p:nvGrpSpPr>
-        <p:cNvPr id="1" name=""/>
-        <p:cNvGrpSpPr/>
-        <p:nvPr/>
-      </p:nvGrpSpPr>
-      <p:grpSpPr>
-        <a:xfrm>
-          <a:off x="0" y="0"/>
-          <a:ext cx="0" cy="0"/>
-          <a:chOff x="0" y="0"/>
-          <a:chExt cx="0" cy="0"/>
-        </a:xfrm>
-      </p:grpSpPr>
-      <p:sp>
-        <p:nvSpPr>
-          <p:cNvPr id="2" name="Title 1"/>
-          <p:cNvSpPr>
-            <a:spLocks noGrp="1"/>
-          </p:cNvSpPr>
-          <p:nvPr>
-            <p:ph type="title"/>
-          </p:nvPr>
-        </p:nvSpPr>
-        <p:spPr/>
-        <p:txBody>
-          <a:bodyPr/>
-          <a:lstStyle/>
-          <a:p>
-            <a:r>
-              <a:rPr lang="en-GB" dirty="0" smtClean="0"/>
-              <a:t>Cassandra Row Storage</a:t>
-            </a:r>
-            <a:endParaRPr lang="en-GB" dirty="0"/>
-          </a:p>
-        </p:txBody>
-      </p:sp>
-      <p:sp>
-        <p:nvSpPr>
-          <p:cNvPr id="3" name="Content Placeholder 2"/>
-          <p:cNvSpPr>
-            <a:spLocks noGrp="1"/>
-          </p:cNvSpPr>
-          <p:nvPr>
-            <p:ph idx="1"/>
-          </p:nvPr>
-        </p:nvSpPr>
-        <p:spPr/>
-        <p:txBody>
-          <a:bodyPr/>
-          <a:lstStyle/>
-          <a:p>
-            <a:r>
-              <a:rPr lang="en-GB" dirty="0" smtClean="0"/>
-              <a:t>Composite Row (Partition) Key</a:t>
-            </a:r>
-          </a:p>
-          <a:p>
-            <a:pPr marL="0" indent="0">
-              <a:buNone/>
-            </a:pPr>
-            <a:r>
-              <a:rPr lang="en-GB" dirty="0" smtClean="0"/>
-              <a:t>			</a:t>
-            </a:r>
-            <a:r>
-              <a:rPr lang="en-GB" sz="2400" dirty="0" smtClean="0">
-                <a:solidFill>
-                  <a:srgbClr val="0070C0"/>
-                </a:solidFill>
-              </a:rPr>
-              <a:t>PRIMARY </a:t>
-            </a:r>
-            <a:r>
-              <a:rPr lang="en-GB" sz="2400" dirty="0">
-                <a:solidFill>
-                  <a:srgbClr val="0070C0"/>
-                </a:solidFill>
-              </a:rPr>
-              <a:t>KEY </a:t>
-            </a:r>
-            <a:r>
-              <a:rPr lang="en-GB" sz="2400" dirty="0"/>
-              <a:t>(</a:t>
-            </a:r>
-            <a:r>
-              <a:rPr lang="en-GB" sz="2400" b="1" dirty="0">
-                <a:solidFill>
-                  <a:srgbClr val="FF0000"/>
-                </a:solidFill>
-              </a:rPr>
-              <a:t>(</a:t>
-            </a:r>
-            <a:r>
-              <a:rPr lang="en-GB" sz="2400" dirty="0" err="1"/>
-              <a:t>OrderID</a:t>
-            </a:r>
-            <a:r>
-              <a:rPr lang="en-GB" sz="2400" dirty="0"/>
-              <a:t>, </a:t>
-            </a:r>
-            <a:r>
-              <a:rPr lang="en-GB" sz="2400" dirty="0" err="1"/>
-              <a:t>ItemID</a:t>
-            </a:r>
-            <a:r>
-              <a:rPr lang="en-GB" sz="2400" b="1" dirty="0">
-                <a:solidFill>
-                  <a:srgbClr val="FF0000"/>
-                </a:solidFill>
-              </a:rPr>
-              <a:t>)</a:t>
-            </a:r>
-            <a:r>
-              <a:rPr lang="en-GB" sz="2400" dirty="0"/>
-              <a:t>)</a:t>
-            </a:r>
-          </a:p>
-          <a:p>
-            <a:endParaRPr lang="en-GB" dirty="0" smtClean="0"/>
-          </a:p>
-          <a:p>
-            <a:endParaRPr lang="en-GB" dirty="0" smtClean="0"/>
-          </a:p>
-          <a:p>
-            <a:r>
-              <a:rPr lang="en-GB" dirty="0" smtClean="0"/>
-              <a:t>“Wide Rows”	</a:t>
-            </a:r>
-            <a:r>
-              <a:rPr lang="en-GB" sz="2400" dirty="0" smtClean="0">
-                <a:solidFill>
-                  <a:srgbClr val="0070C0"/>
-                </a:solidFill>
-              </a:rPr>
-              <a:t>PRIMARY </a:t>
-            </a:r>
-            <a:r>
-              <a:rPr lang="en-GB" sz="2400" dirty="0">
-                <a:solidFill>
-                  <a:srgbClr val="0070C0"/>
-                </a:solidFill>
-              </a:rPr>
-              <a:t>KEY </a:t>
-            </a:r>
-            <a:r>
-              <a:rPr lang="en-GB" sz="2400" dirty="0" smtClean="0"/>
-              <a:t>(</a:t>
-            </a:r>
-            <a:r>
-              <a:rPr lang="en-GB" sz="2400" dirty="0" err="1" smtClean="0"/>
-              <a:t>OrderID</a:t>
-            </a:r>
-            <a:r>
-              <a:rPr lang="en-GB" sz="2400" dirty="0"/>
-              <a:t>, </a:t>
-            </a:r>
-            <a:r>
-              <a:rPr lang="en-GB" sz="2400" dirty="0" err="1" smtClean="0"/>
-              <a:t>ItemID</a:t>
-            </a:r>
-            <a:r>
-              <a:rPr lang="en-GB" sz="2400" dirty="0" smtClean="0"/>
-              <a:t>)</a:t>
-            </a:r>
-            <a:endParaRPr lang="en-GB" sz="2400" dirty="0"/>
-          </a:p>
-          <a:p>
-            <a:endParaRPr lang="en-GB" dirty="0" smtClean="0"/>
-          </a:p>
-        </p:txBody>
-      </p:sp>
-      <p:pic>
-        <p:nvPicPr>
-          <p:cNvPr id="7" name="Picture 6"/>
-          <p:cNvPicPr>
-            <a:picLocks noChangeAspect="1"/>
-          </p:cNvPicPr>
-          <p:nvPr/>
-        </p:nvPicPr>
-        <p:blipFill>
-          <a:blip r:embed="rId2">
-            <a:extLst>
-              <a:ext uri="{28A0092B-C50C-407E-A947-70E740481C1C}">
-                <a14:useLocalDpi xmlns:a14="http://schemas.microsoft.com/office/drawing/2010/main" val="0"/>
-              </a:ext>
-            </a:extLst>
-          </a:blip>
-          <a:stretch>
-            <a:fillRect/>
-          </a:stretch>
-        </p:blipFill>
-        <p:spPr>
-          <a:xfrm>
-            <a:off x="291405" y="4941168"/>
-            <a:ext cx="8601075" cy="390525"/>
-          </a:xfrm>
-          <a:prstGeom prst="rect">
-            <a:avLst/>
-          </a:prstGeom>
-        </p:spPr>
-      </p:pic>
-      <p:pic>
-        <p:nvPicPr>
-          <p:cNvPr id="8" name="Picture 7"/>
-          <p:cNvPicPr>
-            <a:picLocks noChangeAspect="1"/>
-          </p:cNvPicPr>
-          <p:nvPr/>
-        </p:nvPicPr>
-        <p:blipFill>
-          <a:blip r:embed="rId3">
-            <a:extLst>
-              <a:ext uri="{28A0092B-C50C-407E-A947-70E740481C1C}">
-                <a14:useLocalDpi xmlns:a14="http://schemas.microsoft.com/office/drawing/2010/main" val="0"/>
-              </a:ext>
-            </a:extLst>
-          </a:blip>
-          <a:stretch>
-            <a:fillRect/>
-          </a:stretch>
-        </p:blipFill>
-        <p:spPr>
-          <a:xfrm>
-            <a:off x="360040" y="2996952"/>
-            <a:ext cx="4572000" cy="581025"/>
-          </a:xfrm>
-          <a:prstGeom prst="rect">
-            <a:avLst/>
-          </a:prstGeom>
-        </p:spPr>
-      </p:pic>
-    </p:spTree>
-    <p:extLst>
-      <p:ext uri="{BB962C8B-B14F-4D97-AF65-F5344CB8AC3E}">
-        <p14:creationId xmlns:p14="http://schemas.microsoft.com/office/powerpoint/2010/main" val="2680485887"/>
-      </p:ext>
-    </p:extLst>
-  </p:cSld>
-  <p:clrMapOvr>
-    <a:masterClrMapping/>
-  </p:clrMapOvr>
-  <p:timing>
-    <p:tnLst>
-      <p:par>
-        <p:cTn id="1" dur="indefinite" restart="never" nodeType="tmRoot"/>
-      </p:par>
-    </p:tnLst>
-  </p:timing>
-</p:sld>
-</file>
-
 <file path=ppt/slides/slide3.xml><?xml version="1.0" encoding="utf-8"?>
 <p:sld xmlns:a="http://schemas.openxmlformats.org/drawingml/2006/main" xmlns:r="http://schemas.openxmlformats.org/officeDocument/2006/relationships" xmlns:p="http://schemas.openxmlformats.org/presentationml/2006/main">
   <p:cSld>
@@ -12924,7 +12805,15 @@
           <a:p>
             <a:r>
               <a:rPr lang="en-GB" dirty="0" smtClean="0"/>
-              <a:t>Scalability, “AP” Systems</a:t>
+              <a:t>Scalability, </a:t>
+            </a:r>
+            <a:r>
+              <a:rPr lang="en-GB" dirty="0" smtClean="0"/>
+              <a:t>“CP” &amp; “AP</a:t>
+            </a:r>
+            <a:r>
+              <a:rPr lang="en-GB" dirty="0" smtClean="0"/>
+              <a:t>” Systems</a:t>
             </a:r>
             <a:endParaRPr lang="en-GB" dirty="0"/>
           </a:p>
@@ -13347,6 +13236,269 @@
           <a:p>
             <a:r>
               <a:rPr lang="en-GB" dirty="0" smtClean="0"/>
+              <a:t>Cassandra Row Storage</a:t>
+            </a:r>
+            <a:endParaRPr lang="en-GB" dirty="0"/>
+          </a:p>
+        </p:txBody>
+      </p:sp>
+      <p:sp>
+        <p:nvSpPr>
+          <p:cNvPr id="3" name="Content Placeholder 2"/>
+          <p:cNvSpPr>
+            <a:spLocks noGrp="1"/>
+          </p:cNvSpPr>
+          <p:nvPr>
+            <p:ph idx="1"/>
+          </p:nvPr>
+        </p:nvSpPr>
+        <p:spPr/>
+        <p:txBody>
+          <a:bodyPr/>
+          <a:lstStyle/>
+          <a:p>
+            <a:r>
+              <a:rPr lang="en-GB" dirty="0" smtClean="0"/>
+              <a:t>Composite Row (Partition) Key</a:t>
+            </a:r>
+          </a:p>
+          <a:p>
+            <a:pPr marL="0" indent="0">
+              <a:buNone/>
+            </a:pPr>
+            <a:r>
+              <a:rPr lang="en-GB" dirty="0" smtClean="0"/>
+              <a:t>			</a:t>
+            </a:r>
+            <a:r>
+              <a:rPr lang="en-GB" sz="2400" dirty="0" smtClean="0">
+                <a:solidFill>
+                  <a:srgbClr val="0070C0"/>
+                </a:solidFill>
+              </a:rPr>
+              <a:t>PRIMARY </a:t>
+            </a:r>
+            <a:r>
+              <a:rPr lang="en-GB" sz="2400" dirty="0">
+                <a:solidFill>
+                  <a:srgbClr val="0070C0"/>
+                </a:solidFill>
+              </a:rPr>
+              <a:t>KEY </a:t>
+            </a:r>
+            <a:r>
+              <a:rPr lang="en-GB" sz="2400" dirty="0"/>
+              <a:t>(</a:t>
+            </a:r>
+            <a:r>
+              <a:rPr lang="en-GB" sz="2400" b="1" dirty="0">
+                <a:solidFill>
+                  <a:srgbClr val="FF0000"/>
+                </a:solidFill>
+              </a:rPr>
+              <a:t>(</a:t>
+            </a:r>
+            <a:r>
+              <a:rPr lang="en-GB" sz="2400" dirty="0" err="1"/>
+              <a:t>OrderID</a:t>
+            </a:r>
+            <a:r>
+              <a:rPr lang="en-GB" sz="2400" dirty="0"/>
+              <a:t>, </a:t>
+            </a:r>
+            <a:r>
+              <a:rPr lang="en-GB" sz="2400" dirty="0" err="1"/>
+              <a:t>ItemID</a:t>
+            </a:r>
+            <a:r>
+              <a:rPr lang="en-GB" sz="2400" b="1" dirty="0">
+                <a:solidFill>
+                  <a:srgbClr val="FF0000"/>
+                </a:solidFill>
+              </a:rPr>
+              <a:t>)</a:t>
+            </a:r>
+            <a:r>
+              <a:rPr lang="en-GB" sz="2400" dirty="0"/>
+              <a:t>)</a:t>
+            </a:r>
+          </a:p>
+          <a:p>
+            <a:endParaRPr lang="en-GB" dirty="0" smtClean="0"/>
+          </a:p>
+          <a:p>
+            <a:endParaRPr lang="en-GB" dirty="0" smtClean="0"/>
+          </a:p>
+          <a:p>
+            <a:r>
+              <a:rPr lang="en-GB" dirty="0" smtClean="0"/>
+              <a:t>“Wide Rows”	</a:t>
+            </a:r>
+            <a:r>
+              <a:rPr lang="en-GB" sz="2400" dirty="0" smtClean="0">
+                <a:solidFill>
+                  <a:srgbClr val="0070C0"/>
+                </a:solidFill>
+              </a:rPr>
+              <a:t>PRIMARY </a:t>
+            </a:r>
+            <a:r>
+              <a:rPr lang="en-GB" sz="2400" dirty="0">
+                <a:solidFill>
+                  <a:srgbClr val="0070C0"/>
+                </a:solidFill>
+              </a:rPr>
+              <a:t>KEY </a:t>
+            </a:r>
+            <a:r>
+              <a:rPr lang="en-GB" sz="2400" dirty="0" smtClean="0"/>
+              <a:t>(</a:t>
+            </a:r>
+            <a:r>
+              <a:rPr lang="en-GB" sz="2400" dirty="0" err="1" smtClean="0"/>
+              <a:t>OrderID</a:t>
+            </a:r>
+            <a:r>
+              <a:rPr lang="en-GB" sz="2400" dirty="0"/>
+              <a:t>, </a:t>
+            </a:r>
+            <a:r>
+              <a:rPr lang="en-GB" sz="2400" dirty="0" err="1" smtClean="0"/>
+              <a:t>ItemID</a:t>
+            </a:r>
+            <a:r>
+              <a:rPr lang="en-GB" sz="2400" dirty="0" smtClean="0"/>
+              <a:t>)</a:t>
+            </a:r>
+            <a:endParaRPr lang="en-GB" sz="2400" dirty="0"/>
+          </a:p>
+          <a:p>
+            <a:endParaRPr lang="en-GB" dirty="0" smtClean="0"/>
+          </a:p>
+        </p:txBody>
+      </p:sp>
+      <p:pic>
+        <p:nvPicPr>
+          <p:cNvPr id="7" name="Picture 6"/>
+          <p:cNvPicPr>
+            <a:picLocks noChangeAspect="1"/>
+          </p:cNvPicPr>
+          <p:nvPr/>
+        </p:nvPicPr>
+        <p:blipFill>
+          <a:blip r:embed="rId2">
+            <a:extLst>
+              <a:ext uri="{28A0092B-C50C-407E-A947-70E740481C1C}">
+                <a14:useLocalDpi xmlns:a14="http://schemas.microsoft.com/office/drawing/2010/main" val="0"/>
+              </a:ext>
+            </a:extLst>
+          </a:blip>
+          <a:stretch>
+            <a:fillRect/>
+          </a:stretch>
+        </p:blipFill>
+        <p:spPr>
+          <a:xfrm>
+            <a:off x="291405" y="4941168"/>
+            <a:ext cx="8601075" cy="390525"/>
+          </a:xfrm>
+          <a:prstGeom prst="rect">
+            <a:avLst/>
+          </a:prstGeom>
+        </p:spPr>
+      </p:pic>
+      <p:pic>
+        <p:nvPicPr>
+          <p:cNvPr id="8" name="Picture 7"/>
+          <p:cNvPicPr>
+            <a:picLocks noChangeAspect="1"/>
+          </p:cNvPicPr>
+          <p:nvPr/>
+        </p:nvPicPr>
+        <p:blipFill>
+          <a:blip r:embed="rId3">
+            <a:extLst>
+              <a:ext uri="{28A0092B-C50C-407E-A947-70E740481C1C}">
+                <a14:useLocalDpi xmlns:a14="http://schemas.microsoft.com/office/drawing/2010/main" val="0"/>
+              </a:ext>
+            </a:extLst>
+          </a:blip>
+          <a:stretch>
+            <a:fillRect/>
+          </a:stretch>
+        </p:blipFill>
+        <p:spPr>
+          <a:xfrm>
+            <a:off x="360040" y="2996952"/>
+            <a:ext cx="4572000" cy="581025"/>
+          </a:xfrm>
+          <a:prstGeom prst="rect">
+            <a:avLst/>
+          </a:prstGeom>
+        </p:spPr>
+      </p:pic>
+    </p:spTree>
+    <p:extLst>
+      <p:ext uri="{BB962C8B-B14F-4D97-AF65-F5344CB8AC3E}">
+        <p14:creationId xmlns:p14="http://schemas.microsoft.com/office/powerpoint/2010/main" val="2680485887"/>
+      </p:ext>
+    </p:extLst>
+  </p:cSld>
+  <p:clrMapOvr>
+    <a:masterClrMapping/>
+  </p:clrMapOvr>
+  <p:timing>
+    <p:tnLst>
+      <p:par>
+        <p:cTn id="1" dur="indefinite" restart="never" nodeType="tmRoot"/>
+      </p:par>
+    </p:tnLst>
+  </p:timing>
+</p:sld>
+</file>
+
+<file path=ppt/slides/slide31.xml><?xml version="1.0" encoding="utf-8"?>
+<p:sld xmlns:a="http://schemas.openxmlformats.org/drawingml/2006/main" xmlns:r="http://schemas.openxmlformats.org/officeDocument/2006/relationships" xmlns:p="http://schemas.openxmlformats.org/presentationml/2006/main">
+  <p:cSld>
+    <p:bg>
+      <p:bgPr>
+        <a:solidFill>
+          <a:schemeClr val="bg1"/>
+        </a:solidFill>
+        <a:effectLst/>
+      </p:bgPr>
+    </p:bg>
+    <p:spTree>
+      <p:nvGrpSpPr>
+        <p:cNvPr id="1" name=""/>
+        <p:cNvGrpSpPr/>
+        <p:nvPr/>
+      </p:nvGrpSpPr>
+      <p:grpSpPr>
+        <a:xfrm>
+          <a:off x="0" y="0"/>
+          <a:ext cx="0" cy="0"/>
+          <a:chOff x="0" y="0"/>
+          <a:chExt cx="0" cy="0"/>
+        </a:xfrm>
+      </p:grpSpPr>
+      <p:sp>
+        <p:nvSpPr>
+          <p:cNvPr id="2" name="Title 1"/>
+          <p:cNvSpPr>
+            <a:spLocks noGrp="1"/>
+          </p:cNvSpPr>
+          <p:nvPr>
+            <p:ph type="title"/>
+          </p:nvPr>
+        </p:nvSpPr>
+        <p:spPr/>
+        <p:txBody>
+          <a:bodyPr/>
+          <a:lstStyle/>
+          <a:p>
+            <a:r>
+              <a:rPr lang="en-GB" dirty="0" smtClean="0"/>
               <a:t>Cloud Hosting</a:t>
             </a:r>
             <a:endParaRPr lang="en-GB" dirty="0"/>
@@ -13476,8 +13628,12 @@
               <a:t>DataStore</a:t>
             </a:r>
             <a:r>
+              <a:rPr lang="en-GB" sz="2000" dirty="0"/>
+              <a:t>,</a:t>
+            </a:r>
+            <a:r>
               <a:rPr lang="en-GB" sz="2000" dirty="0" smtClean="0"/>
-              <a:t>. </a:t>
+              <a:t> </a:t>
             </a:r>
             <a:r>
               <a:rPr lang="en-GB" sz="2000" dirty="0" err="1" smtClean="0"/>
@@ -13578,7 +13734,7 @@
 </p:sld>
 </file>
 
-<file path=ppt/slides/slide31.xml><?xml version="1.0" encoding="utf-8"?>
+<file path=ppt/slides/slide32.xml><?xml version="1.0" encoding="utf-8"?>
 <p:sld xmlns:a="http://schemas.openxmlformats.org/drawingml/2006/main" xmlns:r="http://schemas.openxmlformats.org/officeDocument/2006/relationships" xmlns:p="http://schemas.openxmlformats.org/presentationml/2006/main">
   <p:cSld>
     <p:bg>
@@ -13812,7 +13968,7 @@
 </p:sld>
 </file>
 
-<file path=ppt/slides/slide32.xml><?xml version="1.0" encoding="utf-8"?>
+<file path=ppt/slides/slide33.xml><?xml version="1.0" encoding="utf-8"?>
 <p:sld xmlns:a="http://schemas.openxmlformats.org/drawingml/2006/main" xmlns:r="http://schemas.openxmlformats.org/officeDocument/2006/relationships" xmlns:p="http://schemas.openxmlformats.org/presentationml/2006/main">
   <p:cSld>
     <p:bg>
@@ -13987,101 +14143,6 @@
 </p:sld>
 </file>
 
-<file path=ppt/slides/slide33.xml><?xml version="1.0" encoding="utf-8"?>
-<p:sld xmlns:a="http://schemas.openxmlformats.org/drawingml/2006/main" xmlns:r="http://schemas.openxmlformats.org/officeDocument/2006/relationships" xmlns:p="http://schemas.openxmlformats.org/presentationml/2006/main">
-  <p:cSld>
-    <p:bg>
-      <p:bgPr>
-        <a:solidFill>
-          <a:schemeClr val="bg1"/>
-        </a:solidFill>
-        <a:effectLst/>
-      </p:bgPr>
-    </p:bg>
-    <p:spTree>
-      <p:nvGrpSpPr>
-        <p:cNvPr id="1" name=""/>
-        <p:cNvGrpSpPr/>
-        <p:nvPr/>
-      </p:nvGrpSpPr>
-      <p:grpSpPr>
-        <a:xfrm>
-          <a:off x="0" y="0"/>
-          <a:ext cx="0" cy="0"/>
-          <a:chOff x="0" y="0"/>
-          <a:chExt cx="0" cy="0"/>
-        </a:xfrm>
-      </p:grpSpPr>
-      <p:sp>
-        <p:nvSpPr>
-          <p:cNvPr id="2" name="Title 1"/>
-          <p:cNvSpPr>
-            <a:spLocks noGrp="1"/>
-          </p:cNvSpPr>
-          <p:nvPr>
-            <p:ph type="ctrTitle"/>
-          </p:nvPr>
-        </p:nvSpPr>
-        <p:spPr/>
-        <p:txBody>
-          <a:bodyPr/>
-          <a:lstStyle/>
-          <a:p>
-            <a:r>
-              <a:rPr lang="en-GB" dirty="0" smtClean="0"/>
-              <a:t>(</a:t>
-            </a:r>
-            <a:r>
-              <a:rPr lang="en-GB" dirty="0" err="1" smtClean="0"/>
-              <a:t>DocumentDB</a:t>
-            </a:r>
-            <a:r>
-              <a:rPr lang="en-GB" dirty="0" smtClean="0"/>
-              <a:t> Demo)</a:t>
-            </a:r>
-            <a:endParaRPr lang="en-GB" dirty="0"/>
-          </a:p>
-        </p:txBody>
-      </p:sp>
-      <p:sp>
-        <p:nvSpPr>
-          <p:cNvPr id="3" name="Subtitle 2"/>
-          <p:cNvSpPr>
-            <a:spLocks noGrp="1"/>
-          </p:cNvSpPr>
-          <p:nvPr>
-            <p:ph type="subTitle" idx="1"/>
-          </p:nvPr>
-        </p:nvSpPr>
-        <p:spPr/>
-        <p:txBody>
-          <a:bodyPr/>
-          <a:lstStyle/>
-          <a:p>
-            <a:endParaRPr lang="en-GB"/>
-          </a:p>
-        </p:txBody>
-      </p:sp>
-    </p:spTree>
-    <p:extLst>
-      <p:ext uri="{BB962C8B-B14F-4D97-AF65-F5344CB8AC3E}">
-        <p14:creationId xmlns:p14="http://schemas.microsoft.com/office/powerpoint/2010/main" val="1956378066"/>
-      </p:ext>
-    </p:extLst>
-  </p:cSld>
-  <p:clrMapOvr>
-    <a:masterClrMapping/>
-  </p:clrMapOvr>
-  <p:timing>
-    <p:tnLst>
-      <p:par>
-        <p:cTn id="1" dur="indefinite" restart="never" nodeType="tmRoot"/>
-      </p:par>
-    </p:tnLst>
-  </p:timing>
-</p:sld>
-</file>
-
 <file path=ppt/slides/slide34.xml><?xml version="1.0" encoding="utf-8"?>
 <p:sld xmlns:a="http://schemas.openxmlformats.org/drawingml/2006/main" xmlns:r="http://schemas.openxmlformats.org/officeDocument/2006/relationships" xmlns:p="http://schemas.openxmlformats.org/presentationml/2006/main">
   <p:cSld>
@@ -14114,7 +14175,7 @@
             <a:spLocks noGrp="1"/>
           </p:cNvSpPr>
           <p:nvPr>
-            <p:ph type="title"/>
+            <p:ph type="ctrTitle"/>
           </p:nvPr>
         </p:nvSpPr>
         <p:spPr/>
@@ -14124,7 +14185,15 @@
           <a:p>
             <a:r>
               <a:rPr lang="en-GB" dirty="0" smtClean="0"/>
-              <a:t>Mixed Architectures</a:t>
+              <a:t>(</a:t>
+            </a:r>
+            <a:r>
+              <a:rPr lang="en-GB" dirty="0" err="1" smtClean="0"/>
+              <a:t>DocumentDB</a:t>
+            </a:r>
+            <a:r>
+              <a:rPr lang="en-GB" dirty="0" smtClean="0"/>
+              <a:t> Demo)</a:t>
             </a:r>
             <a:endParaRPr lang="en-GB" dirty="0"/>
           </a:p>
@@ -14132,90 +14201,27 @@
       </p:sp>
       <p:sp>
         <p:nvSpPr>
-          <p:cNvPr id="3" name="Content Placeholder 2"/>
-          <p:cNvSpPr>
-            <a:spLocks noGrp="1"/>
-          </p:cNvSpPr>
-          <p:nvPr>
-            <p:ph idx="1"/>
+          <p:cNvPr id="3" name="Subtitle 2"/>
+          <p:cNvSpPr>
+            <a:spLocks noGrp="1"/>
+          </p:cNvSpPr>
+          <p:nvPr>
+            <p:ph type="subTitle" idx="1"/>
           </p:nvPr>
         </p:nvSpPr>
         <p:spPr/>
         <p:txBody>
-          <a:bodyPr>
-            <a:normAutofit/>
-          </a:bodyPr>
-          <a:lstStyle/>
-          <a:p>
-            <a:r>
-              <a:rPr lang="en-GB" dirty="0" smtClean="0"/>
-              <a:t>“Polyglot Persistence”</a:t>
-            </a:r>
-            <a:endParaRPr lang="en-GB" dirty="0"/>
-          </a:p>
-          <a:p>
-            <a:pPr lvl="1"/>
-            <a:r>
-              <a:rPr lang="en-GB" sz="2000" dirty="0" smtClean="0">
-                <a:hlinkClick r:id="rId2"/>
-              </a:rPr>
-              <a:t>martinfowler.com/</a:t>
-            </a:r>
-            <a:r>
-              <a:rPr lang="en-GB" sz="2000" dirty="0" err="1" smtClean="0">
-                <a:hlinkClick r:id="rId2"/>
-              </a:rPr>
-              <a:t>bliki</a:t>
-            </a:r>
-            <a:r>
-              <a:rPr lang="en-GB" sz="2000" dirty="0" smtClean="0">
-                <a:hlinkClick r:id="rId2"/>
-              </a:rPr>
-              <a:t>/PolyglotPersistence.html</a:t>
-            </a:r>
-            <a:endParaRPr lang="en-GB" sz="2000" dirty="0" smtClean="0"/>
-          </a:p>
-          <a:p>
-            <a:pPr marL="0" indent="0">
-              <a:buNone/>
-            </a:pPr>
-            <a:endParaRPr lang="en-GB" sz="2000" dirty="0" smtClean="0"/>
-          </a:p>
-          <a:p>
-            <a:endParaRPr lang="en-GB" dirty="0" smtClean="0"/>
-          </a:p>
-          <a:p>
-            <a:r>
-              <a:rPr lang="en-GB" dirty="0" smtClean="0"/>
-              <a:t>Different Business Processes</a:t>
-            </a:r>
-          </a:p>
-          <a:p>
-            <a:pPr marL="0" indent="0">
-              <a:buNone/>
-            </a:pPr>
-            <a:endParaRPr lang="en-GB" dirty="0" smtClean="0"/>
-          </a:p>
-          <a:p>
-            <a:r>
-              <a:rPr lang="en-GB" dirty="0" smtClean="0"/>
-              <a:t>Read-Write Split</a:t>
-            </a:r>
-            <a:r>
-              <a:rPr lang="en-GB" dirty="0"/>
-              <a:t> </a:t>
-            </a:r>
-            <a:r>
-              <a:rPr lang="en-GB" dirty="0" smtClean="0"/>
-              <a:t>-&gt; Reporting</a:t>
-            </a:r>
+          <a:bodyPr/>
+          <a:lstStyle/>
+          <a:p>
+            <a:endParaRPr lang="en-GB"/>
           </a:p>
         </p:txBody>
       </p:sp>
     </p:spTree>
     <p:extLst>
       <p:ext uri="{BB962C8B-B14F-4D97-AF65-F5344CB8AC3E}">
-        <p14:creationId xmlns:p14="http://schemas.microsoft.com/office/powerpoint/2010/main" val="1132971709"/>
+        <p14:creationId xmlns:p14="http://schemas.microsoft.com/office/powerpoint/2010/main" val="1956378066"/>
       </p:ext>
     </p:extLst>
   </p:cSld>
@@ -14274,7 +14280,7 @@
           <a:p>
             <a:r>
               <a:rPr lang="en-GB" dirty="0" smtClean="0"/>
-              <a:t>Business Processes (Amazon)</a:t>
+              <a:t>Mixed Architectures</a:t>
             </a:r>
             <a:endParaRPr lang="en-GB" dirty="0"/>
           </a:p>
@@ -14293,107 +14299,79 @@
         <p:spPr/>
         <p:txBody>
           <a:bodyPr>
-            <a:normAutofit fontScale="85000" lnSpcReduction="20000"/>
+            <a:normAutofit/>
           </a:bodyPr>
           <a:lstStyle/>
           <a:p>
             <a:r>
-              <a:rPr lang="en-GB" dirty="0"/>
-              <a:t>“For the checkout process you always want to </a:t>
-            </a:r>
-            <a:r>
-              <a:rPr lang="en-GB" dirty="0" err="1"/>
-              <a:t>honor</a:t>
-            </a:r>
-            <a:r>
-              <a:rPr lang="en-GB" dirty="0"/>
-              <a:t> requests to add items to a shopping cart because it's revenue producing. </a:t>
-            </a:r>
-            <a:r>
-              <a:rPr lang="en-GB" b="1" dirty="0">
-                <a:solidFill>
-                  <a:srgbClr val="0070C0"/>
-                </a:solidFill>
+              <a:rPr lang="en-GB" dirty="0" smtClean="0"/>
+              <a:t>“Polyglot Persistence”</a:t>
+            </a:r>
+            <a:endParaRPr lang="en-GB" dirty="0"/>
+          </a:p>
+          <a:p>
+            <a:pPr lvl="1"/>
+            <a:r>
+              <a:rPr lang="en-GB" sz="2000" dirty="0" smtClean="0">
+                <a:hlinkClick r:id="rId2"/>
               </a:rPr>
-              <a:t>In this case you choose high availability.</a:t>
-            </a:r>
-            <a:r>
-              <a:rPr lang="en-GB" dirty="0"/>
-              <a:t> Errors are hidden from the customer and sorted out later.” </a:t>
-            </a:r>
-            <a:endParaRPr lang="en-GB" dirty="0" smtClean="0"/>
-          </a:p>
-          <a:p>
-            <a:endParaRPr lang="en-GB" dirty="0"/>
-          </a:p>
-          <a:p>
-            <a:r>
-              <a:rPr lang="en-GB" dirty="0" smtClean="0"/>
-              <a:t>“</a:t>
-            </a:r>
-            <a:r>
-              <a:rPr lang="en-GB" b="1" dirty="0">
-                <a:solidFill>
-                  <a:srgbClr val="0070C0"/>
-                </a:solidFill>
+              <a:t>martinfowler.com/</a:t>
+            </a:r>
+            <a:r>
+              <a:rPr lang="en-GB" sz="2000" dirty="0" err="1" smtClean="0">
+                <a:hlinkClick r:id="rId2"/>
               </a:rPr>
-              <a:t>When a customer submits an order you </a:t>
-            </a:r>
-            <a:r>
-              <a:rPr lang="en-GB" b="1" dirty="0" err="1">
-                <a:solidFill>
-                  <a:srgbClr val="0070C0"/>
-                </a:solidFill>
+              <a:t>bliki</a:t>
+            </a:r>
+            <a:r>
+              <a:rPr lang="en-GB" sz="2000" dirty="0" smtClean="0">
+                <a:hlinkClick r:id="rId2"/>
               </a:rPr>
-              <a:t>favor</a:t>
-            </a:r>
-            <a:r>
-              <a:rPr lang="en-GB" b="1" dirty="0">
-                <a:solidFill>
-                  <a:srgbClr val="0070C0"/>
-                </a:solidFill>
-              </a:rPr>
-              <a:t> consistency </a:t>
-            </a:r>
-            <a:r>
-              <a:rPr lang="en-GB" dirty="0"/>
-              <a:t>because several services--credit card processing, shipping and handling, reporting--are simultaneously accessing the data</a:t>
-            </a:r>
-            <a:r>
-              <a:rPr lang="en-GB" dirty="0" smtClean="0"/>
-              <a:t>.”</a:t>
-            </a:r>
-          </a:p>
-          <a:p>
-            <a:endParaRPr lang="en-GB" dirty="0"/>
-          </a:p>
-          <a:p>
-            <a:pPr marL="457200" lvl="1" indent="0" algn="ctr">
+              <a:t>/PolyglotPersistence.html</a:t>
+            </a:r>
+            <a:endParaRPr lang="en-GB" sz="2000" dirty="0" smtClean="0"/>
+          </a:p>
+          <a:p>
+            <a:pPr marL="0" indent="0">
               <a:buNone/>
             </a:pPr>
-            <a:r>
-              <a:rPr lang="en-GB" dirty="0" smtClean="0">
-                <a:hlinkClick r:id="rId3"/>
-              </a:rPr>
-              <a:t>highscalability.com/amazon-architecture</a:t>
-            </a:r>
+            <a:endParaRPr lang="en-GB" sz="2000" dirty="0" smtClean="0"/>
+          </a:p>
+          <a:p>
             <a:endParaRPr lang="en-GB" dirty="0" smtClean="0"/>
           </a:p>
           <a:p>
-            <a:pPr marL="457200" lvl="1" indent="0">
+            <a:r>
+              <a:rPr lang="en-GB" dirty="0" smtClean="0"/>
+              <a:t>Different Business Processes</a:t>
+            </a:r>
+          </a:p>
+          <a:p>
+            <a:pPr marL="0" indent="0">
               <a:buNone/>
             </a:pPr>
-            <a:endParaRPr lang="en-GB" dirty="0"/>
-          </a:p>
-          <a:p>
-            <a:endParaRPr lang="en-GB" dirty="0"/>
+            <a:endParaRPr lang="en-GB" dirty="0" smtClean="0"/>
+          </a:p>
+          <a:p>
+            <a:r>
+              <a:rPr lang="en-GB" dirty="0" smtClean="0"/>
+              <a:t>Read-Write Split</a:t>
+            </a:r>
+            <a:r>
+              <a:rPr lang="en-GB" dirty="0"/>
+              <a:t> </a:t>
+            </a:r>
+            <a:r>
+              <a:rPr lang="en-GB" dirty="0" smtClean="0"/>
+              <a:t>-&gt; Reporting</a:t>
+            </a:r>
           </a:p>
         </p:txBody>
       </p:sp>
     </p:spTree>
     <p:extLst>
       <p:ext uri="{BB962C8B-B14F-4D97-AF65-F5344CB8AC3E}">
-        <p14:creationId xmlns:p14="http://schemas.microsoft.com/office/powerpoint/2010/main" val="2839110553"/>
+        <p14:creationId xmlns:p14="http://schemas.microsoft.com/office/powerpoint/2010/main" val="1132971709"/>
       </p:ext>
     </p:extLst>
   </p:cSld>
@@ -14452,6 +14430,184 @@
           <a:p>
             <a:r>
               <a:rPr lang="en-GB" dirty="0" smtClean="0"/>
+              <a:t>Business Processes (Amazon)</a:t>
+            </a:r>
+            <a:endParaRPr lang="en-GB" dirty="0"/>
+          </a:p>
+        </p:txBody>
+      </p:sp>
+      <p:sp>
+        <p:nvSpPr>
+          <p:cNvPr id="3" name="Content Placeholder 2"/>
+          <p:cNvSpPr>
+            <a:spLocks noGrp="1"/>
+          </p:cNvSpPr>
+          <p:nvPr>
+            <p:ph idx="1"/>
+          </p:nvPr>
+        </p:nvSpPr>
+        <p:spPr/>
+        <p:txBody>
+          <a:bodyPr>
+            <a:normAutofit fontScale="85000" lnSpcReduction="20000"/>
+          </a:bodyPr>
+          <a:lstStyle/>
+          <a:p>
+            <a:r>
+              <a:rPr lang="en-GB" dirty="0"/>
+              <a:t>“For the checkout process you always want to </a:t>
+            </a:r>
+            <a:r>
+              <a:rPr lang="en-GB" dirty="0" err="1"/>
+              <a:t>honor</a:t>
+            </a:r>
+            <a:r>
+              <a:rPr lang="en-GB" dirty="0"/>
+              <a:t> requests to add items to a shopping cart because it's revenue producing. </a:t>
+            </a:r>
+            <a:r>
+              <a:rPr lang="en-GB" b="1" dirty="0">
+                <a:solidFill>
+                  <a:srgbClr val="0070C0"/>
+                </a:solidFill>
+              </a:rPr>
+              <a:t>In this case you choose high availability.</a:t>
+            </a:r>
+            <a:r>
+              <a:rPr lang="en-GB" dirty="0"/>
+              <a:t> Errors are hidden from the customer and sorted out later.” </a:t>
+            </a:r>
+            <a:endParaRPr lang="en-GB" dirty="0" smtClean="0"/>
+          </a:p>
+          <a:p>
+            <a:endParaRPr lang="en-GB" dirty="0"/>
+          </a:p>
+          <a:p>
+            <a:r>
+              <a:rPr lang="en-GB" dirty="0" smtClean="0"/>
+              <a:t>“</a:t>
+            </a:r>
+            <a:r>
+              <a:rPr lang="en-GB" b="1" dirty="0">
+                <a:solidFill>
+                  <a:srgbClr val="0070C0"/>
+                </a:solidFill>
+              </a:rPr>
+              <a:t>When a customer submits an order you </a:t>
+            </a:r>
+            <a:r>
+              <a:rPr lang="en-GB" b="1" dirty="0" err="1">
+                <a:solidFill>
+                  <a:srgbClr val="0070C0"/>
+                </a:solidFill>
+              </a:rPr>
+              <a:t>favor</a:t>
+            </a:r>
+            <a:r>
+              <a:rPr lang="en-GB" b="1" dirty="0">
+                <a:solidFill>
+                  <a:srgbClr val="0070C0"/>
+                </a:solidFill>
+              </a:rPr>
+              <a:t> consistency </a:t>
+            </a:r>
+            <a:r>
+              <a:rPr lang="en-GB" dirty="0"/>
+              <a:t>because several services--credit card processing, shipping and handling, reporting--are simultaneously accessing the data</a:t>
+            </a:r>
+            <a:r>
+              <a:rPr lang="en-GB" dirty="0" smtClean="0"/>
+              <a:t>.”</a:t>
+            </a:r>
+          </a:p>
+          <a:p>
+            <a:endParaRPr lang="en-GB" dirty="0"/>
+          </a:p>
+          <a:p>
+            <a:pPr marL="457200" lvl="1" indent="0" algn="ctr">
+              <a:buNone/>
+            </a:pPr>
+            <a:r>
+              <a:rPr lang="en-GB" dirty="0" smtClean="0">
+                <a:hlinkClick r:id="rId3"/>
+              </a:rPr>
+              <a:t>highscalability.com/amazon-architecture</a:t>
+            </a:r>
+            <a:endParaRPr lang="en-GB" dirty="0" smtClean="0"/>
+          </a:p>
+          <a:p>
+            <a:pPr marL="457200" lvl="1" indent="0">
+              <a:buNone/>
+            </a:pPr>
+            <a:endParaRPr lang="en-GB" dirty="0"/>
+          </a:p>
+          <a:p>
+            <a:endParaRPr lang="en-GB" dirty="0"/>
+          </a:p>
+        </p:txBody>
+      </p:sp>
+    </p:spTree>
+    <p:extLst>
+      <p:ext uri="{BB962C8B-B14F-4D97-AF65-F5344CB8AC3E}">
+        <p14:creationId xmlns:p14="http://schemas.microsoft.com/office/powerpoint/2010/main" val="2839110553"/>
+      </p:ext>
+    </p:extLst>
+  </p:cSld>
+  <p:clrMapOvr>
+    <a:masterClrMapping/>
+  </p:clrMapOvr>
+  <p:timing>
+    <p:tnLst>
+      <p:par>
+        <p:cTn id="1" dur="indefinite" restart="never" nodeType="tmRoot"/>
+      </p:par>
+    </p:tnLst>
+  </p:timing>
+</p:sld>
+</file>
+
+<file path=ppt/slides/slide37.xml><?xml version="1.0" encoding="utf-8"?>
+<p:sld xmlns:a="http://schemas.openxmlformats.org/drawingml/2006/main" xmlns:r="http://schemas.openxmlformats.org/officeDocument/2006/relationships" xmlns:p="http://schemas.openxmlformats.org/presentationml/2006/main">
+  <p:cSld>
+    <p:bg>
+      <p:bgPr>
+        <a:solidFill>
+          <a:schemeClr val="bg1"/>
+        </a:solidFill>
+        <a:effectLst/>
+      </p:bgPr>
+    </p:bg>
+    <p:spTree>
+      <p:nvGrpSpPr>
+        <p:cNvPr id="1" name=""/>
+        <p:cNvGrpSpPr/>
+        <p:nvPr/>
+      </p:nvGrpSpPr>
+      <p:grpSpPr>
+        <a:xfrm>
+          <a:off x="0" y="0"/>
+          <a:ext cx="0" cy="0"/>
+          <a:chOff x="0" y="0"/>
+          <a:chExt cx="0" cy="0"/>
+        </a:xfrm>
+      </p:grpSpPr>
+      <p:sp>
+        <p:nvSpPr>
+          <p:cNvPr id="2" name="Title 1"/>
+          <p:cNvSpPr>
+            <a:spLocks noGrp="1"/>
+          </p:cNvSpPr>
+          <p:nvPr>
+            <p:ph type="title"/>
+          </p:nvPr>
+        </p:nvSpPr>
+        <p:spPr/>
+        <p:txBody>
+          <a:bodyPr/>
+          <a:lstStyle/>
+          <a:p>
+            <a:r>
+              <a:rPr lang="en-GB" dirty="0" smtClean="0"/>
               <a:t>Reporting Systems</a:t>
             </a:r>
             <a:endParaRPr lang="en-GB" dirty="0"/>
@@ -14549,7 +14705,7 @@
 </p:sld>
 </file>
 
-<file path=ppt/slides/slide37.xml><?xml version="1.0" encoding="utf-8"?>
+<file path=ppt/slides/slide38.xml><?xml version="1.0" encoding="utf-8"?>
 <p:sld xmlns:a="http://schemas.openxmlformats.org/drawingml/2006/main" xmlns:r="http://schemas.openxmlformats.org/officeDocument/2006/relationships" xmlns:p="http://schemas.openxmlformats.org/presentationml/2006/main">
   <p:cSld>
     <p:spTree>
@@ -14616,7 +14772,7 @@
 </p:sld>
 </file>
 
-<file path=ppt/slides/slide38.xml><?xml version="1.0" encoding="utf-8"?>
+<file path=ppt/slides/slide39.xml><?xml version="1.0" encoding="utf-8"?>
 <p:sld xmlns:a="http://schemas.openxmlformats.org/drawingml/2006/main" xmlns:r="http://schemas.openxmlformats.org/officeDocument/2006/relationships" xmlns:p="http://schemas.openxmlformats.org/presentationml/2006/main">
   <p:cSld>
     <p:bg>
@@ -14864,174 +15020,6 @@
 </p:sld>
 </file>
 
-<file path=ppt/slides/slide39.xml><?xml version="1.0" encoding="utf-8"?>
-<p:sld xmlns:a="http://schemas.openxmlformats.org/drawingml/2006/main" xmlns:r="http://schemas.openxmlformats.org/officeDocument/2006/relationships" xmlns:p="http://schemas.openxmlformats.org/presentationml/2006/main">
-  <p:cSld>
-    <p:bg>
-      <p:bgPr>
-        <a:solidFill>
-          <a:schemeClr val="bg1"/>
-        </a:solidFill>
-        <a:effectLst/>
-      </p:bgPr>
-    </p:bg>
-    <p:spTree>
-      <p:nvGrpSpPr>
-        <p:cNvPr id="1" name=""/>
-        <p:cNvGrpSpPr/>
-        <p:nvPr/>
-      </p:nvGrpSpPr>
-      <p:grpSpPr>
-        <a:xfrm>
-          <a:off x="0" y="0"/>
-          <a:ext cx="0" cy="0"/>
-          <a:chOff x="0" y="0"/>
-          <a:chExt cx="0" cy="0"/>
-        </a:xfrm>
-      </p:grpSpPr>
-      <p:sp>
-        <p:nvSpPr>
-          <p:cNvPr id="2" name="Title 1"/>
-          <p:cNvSpPr>
-            <a:spLocks noGrp="1"/>
-          </p:cNvSpPr>
-          <p:nvPr>
-            <p:ph type="title"/>
-          </p:nvPr>
-        </p:nvSpPr>
-        <p:spPr>
-          <a:xfrm>
-            <a:off x="1763688" y="274638"/>
-            <a:ext cx="6923112" cy="1143000"/>
-          </a:xfrm>
-        </p:spPr>
-        <p:txBody>
-          <a:bodyPr>
-            <a:normAutofit fontScale="90000"/>
-          </a:bodyPr>
-          <a:lstStyle/>
-          <a:p>
-            <a:r>
-              <a:rPr lang="en-GB" dirty="0" smtClean="0"/>
-              <a:t>Distributed File System (HDFS)</a:t>
-            </a:r>
-            <a:endParaRPr lang="en-GB" dirty="0"/>
-          </a:p>
-        </p:txBody>
-      </p:sp>
-      <p:sp>
-        <p:nvSpPr>
-          <p:cNvPr id="3" name="Content Placeholder 2"/>
-          <p:cNvSpPr>
-            <a:spLocks noGrp="1"/>
-          </p:cNvSpPr>
-          <p:nvPr>
-            <p:ph idx="1"/>
-          </p:nvPr>
-        </p:nvSpPr>
-        <p:spPr/>
-        <p:txBody>
-          <a:bodyPr/>
-          <a:lstStyle/>
-          <a:p>
-            <a:r>
-              <a:rPr lang="en-GB" dirty="0" smtClean="0"/>
-              <a:t>Distributed, CP, Append-Only </a:t>
-            </a:r>
-            <a:r>
-              <a:rPr lang="en-GB" dirty="0" err="1" smtClean="0"/>
-              <a:t>FileSystem</a:t>
-            </a:r>
-            <a:endParaRPr lang="en-GB" dirty="0" smtClean="0"/>
-          </a:p>
-          <a:p>
-            <a:endParaRPr lang="en-GB" dirty="0"/>
-          </a:p>
-          <a:p>
-            <a:r>
-              <a:rPr lang="en-GB" dirty="0" smtClean="0"/>
-              <a:t>High-Latency Access/ ETL via Java </a:t>
-            </a:r>
-            <a:r>
-              <a:rPr lang="en-GB" dirty="0" err="1" smtClean="0"/>
-              <a:t>MapReduce</a:t>
-            </a:r>
-            <a:endParaRPr lang="en-GB" dirty="0" smtClean="0"/>
-          </a:p>
-          <a:p>
-            <a:pPr lvl="1"/>
-            <a:r>
-              <a:rPr lang="en-GB" dirty="0" smtClean="0"/>
-              <a:t>vs. -&gt; </a:t>
-            </a:r>
-            <a:r>
-              <a:rPr lang="en-GB" dirty="0" err="1" smtClean="0"/>
-              <a:t>HBase</a:t>
-            </a:r>
-            <a:endParaRPr lang="en-GB" dirty="0" smtClean="0"/>
-          </a:p>
-          <a:p>
-            <a:endParaRPr lang="en-GB" dirty="0"/>
-          </a:p>
-          <a:p>
-            <a:r>
-              <a:rPr lang="en-GB" dirty="0" smtClean="0"/>
-              <a:t>Basis for other analysis/ query tools</a:t>
-            </a:r>
-            <a:endParaRPr lang="en-GB" dirty="0"/>
-          </a:p>
-        </p:txBody>
-      </p:sp>
-      <p:pic>
-        <p:nvPicPr>
-          <p:cNvPr id="4" name="Picture 3"/>
-          <p:cNvPicPr>
-            <a:picLocks noChangeAspect="1"/>
-          </p:cNvPicPr>
-          <p:nvPr/>
-        </p:nvPicPr>
-        <p:blipFill>
-          <a:blip r:embed="rId3">
-            <a:extLst>
-              <a:ext uri="{28A0092B-C50C-407E-A947-70E740481C1C}">
-                <a14:useLocalDpi xmlns:a14="http://schemas.microsoft.com/office/drawing/2010/main" val="0"/>
-              </a:ext>
-            </a:extLst>
-          </a:blip>
-          <a:stretch>
-            <a:fillRect/>
-          </a:stretch>
-        </p:blipFill>
-        <p:spPr>
-          <a:xfrm>
-            <a:off x="395536" y="260648"/>
-            <a:ext cx="1368152" cy="917467"/>
-          </a:xfrm>
-          <a:prstGeom prst="rect">
-            <a:avLst/>
-          </a:prstGeom>
-        </p:spPr>
-      </p:pic>
-    </p:spTree>
-    <p:extLst>
-      <p:ext uri="{BB962C8B-B14F-4D97-AF65-F5344CB8AC3E}">
-        <p14:creationId xmlns:p14="http://schemas.microsoft.com/office/powerpoint/2010/main" val="2855720551"/>
-      </p:ext>
-    </p:extLst>
-  </p:cSld>
-  <p:clrMapOvr>
-    <a:masterClrMapping/>
-  </p:clrMapOvr>
-  <p:timing>
-    <p:tnLst>
-      <p:par>
-        <p:cTn id="1" dur="indefinite" restart="never" nodeType="tmRoot"/>
-      </p:par>
-    </p:tnLst>
-  </p:timing>
-</p:sld>
-</file>
-
 <file path=ppt/slides/slide4.xml><?xml version="1.0" encoding="utf-8"?>
 <p:sld xmlns:a="http://schemas.openxmlformats.org/drawingml/2006/main" xmlns:r="http://schemas.openxmlformats.org/officeDocument/2006/relationships" xmlns:p="http://schemas.openxmlformats.org/presentationml/2006/main">
   <p:cSld>
@@ -15267,6 +15255,174 @@
 </file>
 
 <file path=ppt/slides/slide40.xml><?xml version="1.0" encoding="utf-8"?>
+<p:sld xmlns:a="http://schemas.openxmlformats.org/drawingml/2006/main" xmlns:r="http://schemas.openxmlformats.org/officeDocument/2006/relationships" xmlns:p="http://schemas.openxmlformats.org/presentationml/2006/main">
+  <p:cSld>
+    <p:bg>
+      <p:bgPr>
+        <a:solidFill>
+          <a:schemeClr val="bg1"/>
+        </a:solidFill>
+        <a:effectLst/>
+      </p:bgPr>
+    </p:bg>
+    <p:spTree>
+      <p:nvGrpSpPr>
+        <p:cNvPr id="1" name=""/>
+        <p:cNvGrpSpPr/>
+        <p:nvPr/>
+      </p:nvGrpSpPr>
+      <p:grpSpPr>
+        <a:xfrm>
+          <a:off x="0" y="0"/>
+          <a:ext cx="0" cy="0"/>
+          <a:chOff x="0" y="0"/>
+          <a:chExt cx="0" cy="0"/>
+        </a:xfrm>
+      </p:grpSpPr>
+      <p:sp>
+        <p:nvSpPr>
+          <p:cNvPr id="2" name="Title 1"/>
+          <p:cNvSpPr>
+            <a:spLocks noGrp="1"/>
+          </p:cNvSpPr>
+          <p:nvPr>
+            <p:ph type="title"/>
+          </p:nvPr>
+        </p:nvSpPr>
+        <p:spPr>
+          <a:xfrm>
+            <a:off x="1763688" y="274638"/>
+            <a:ext cx="6923112" cy="1143000"/>
+          </a:xfrm>
+        </p:spPr>
+        <p:txBody>
+          <a:bodyPr>
+            <a:normAutofit fontScale="90000"/>
+          </a:bodyPr>
+          <a:lstStyle/>
+          <a:p>
+            <a:r>
+              <a:rPr lang="en-GB" dirty="0" smtClean="0"/>
+              <a:t>Distributed File System (HDFS)</a:t>
+            </a:r>
+            <a:endParaRPr lang="en-GB" dirty="0"/>
+          </a:p>
+        </p:txBody>
+      </p:sp>
+      <p:sp>
+        <p:nvSpPr>
+          <p:cNvPr id="3" name="Content Placeholder 2"/>
+          <p:cNvSpPr>
+            <a:spLocks noGrp="1"/>
+          </p:cNvSpPr>
+          <p:nvPr>
+            <p:ph idx="1"/>
+          </p:nvPr>
+        </p:nvSpPr>
+        <p:spPr/>
+        <p:txBody>
+          <a:bodyPr/>
+          <a:lstStyle/>
+          <a:p>
+            <a:r>
+              <a:rPr lang="en-GB" dirty="0" smtClean="0"/>
+              <a:t>Distributed, CP, Append-Only </a:t>
+            </a:r>
+            <a:r>
+              <a:rPr lang="en-GB" dirty="0" err="1" smtClean="0"/>
+              <a:t>FileSystem</a:t>
+            </a:r>
+            <a:endParaRPr lang="en-GB" dirty="0" smtClean="0"/>
+          </a:p>
+          <a:p>
+            <a:endParaRPr lang="en-GB" dirty="0"/>
+          </a:p>
+          <a:p>
+            <a:r>
+              <a:rPr lang="en-GB" dirty="0" smtClean="0"/>
+              <a:t>High-Latency Access/ ETL via Java </a:t>
+            </a:r>
+            <a:r>
+              <a:rPr lang="en-GB" dirty="0" err="1" smtClean="0"/>
+              <a:t>MapReduce</a:t>
+            </a:r>
+            <a:endParaRPr lang="en-GB" dirty="0" smtClean="0"/>
+          </a:p>
+          <a:p>
+            <a:pPr lvl="1"/>
+            <a:r>
+              <a:rPr lang="en-GB" dirty="0" smtClean="0"/>
+              <a:t>vs. -&gt; </a:t>
+            </a:r>
+            <a:r>
+              <a:rPr lang="en-GB" dirty="0" err="1" smtClean="0"/>
+              <a:t>HBase</a:t>
+            </a:r>
+            <a:endParaRPr lang="en-GB" dirty="0" smtClean="0"/>
+          </a:p>
+          <a:p>
+            <a:endParaRPr lang="en-GB" dirty="0"/>
+          </a:p>
+          <a:p>
+            <a:r>
+              <a:rPr lang="en-GB" dirty="0" smtClean="0"/>
+              <a:t>Basis for other analysis/ query tools</a:t>
+            </a:r>
+            <a:endParaRPr lang="en-GB" dirty="0"/>
+          </a:p>
+        </p:txBody>
+      </p:sp>
+      <p:pic>
+        <p:nvPicPr>
+          <p:cNvPr id="4" name="Picture 3"/>
+          <p:cNvPicPr>
+            <a:picLocks noChangeAspect="1"/>
+          </p:cNvPicPr>
+          <p:nvPr/>
+        </p:nvPicPr>
+        <p:blipFill>
+          <a:blip r:embed="rId3">
+            <a:extLst>
+              <a:ext uri="{28A0092B-C50C-407E-A947-70E740481C1C}">
+                <a14:useLocalDpi xmlns:a14="http://schemas.microsoft.com/office/drawing/2010/main" val="0"/>
+              </a:ext>
+            </a:extLst>
+          </a:blip>
+          <a:stretch>
+            <a:fillRect/>
+          </a:stretch>
+        </p:blipFill>
+        <p:spPr>
+          <a:xfrm>
+            <a:off x="395536" y="260648"/>
+            <a:ext cx="1368152" cy="917467"/>
+          </a:xfrm>
+          <a:prstGeom prst="rect">
+            <a:avLst/>
+          </a:prstGeom>
+        </p:spPr>
+      </p:pic>
+    </p:spTree>
+    <p:extLst>
+      <p:ext uri="{BB962C8B-B14F-4D97-AF65-F5344CB8AC3E}">
+        <p14:creationId xmlns:p14="http://schemas.microsoft.com/office/powerpoint/2010/main" val="2855720551"/>
+      </p:ext>
+    </p:extLst>
+  </p:cSld>
+  <p:clrMapOvr>
+    <a:masterClrMapping/>
+  </p:clrMapOvr>
+  <p:timing>
+    <p:tnLst>
+      <p:par>
+        <p:cTn id="1" dur="indefinite" restart="never" nodeType="tmRoot"/>
+      </p:par>
+    </p:tnLst>
+  </p:timing>
+</p:sld>
+</file>
+
+<file path=ppt/slides/slide41.xml><?xml version="1.0" encoding="utf-8"?>
 <p:sld xmlns:a="http://schemas.openxmlformats.org/drawingml/2006/main" xmlns:r="http://schemas.openxmlformats.org/officeDocument/2006/relationships" xmlns:p="http://schemas.openxmlformats.org/presentationml/2006/main">
   <p:cSld>
     <p:bg>
@@ -16301,7 +16457,7 @@
 </p:sld>
 </file>
 
-<file path=ppt/slides/slide41.xml><?xml version="1.0" encoding="utf-8"?>
+<file path=ppt/slides/slide42.xml><?xml version="1.0" encoding="utf-8"?>
 <p:sld xmlns:a="http://schemas.openxmlformats.org/drawingml/2006/main" xmlns:r="http://schemas.openxmlformats.org/officeDocument/2006/relationships" xmlns:p="http://schemas.openxmlformats.org/presentationml/2006/main">
   <p:cSld>
     <p:spTree>
@@ -16418,7 +16574,7 @@
 </p:sld>
 </file>
 
-<file path=ppt/slides/slide42.xml><?xml version="1.0" encoding="utf-8"?>
+<file path=ppt/slides/slide43.xml><?xml version="1.0" encoding="utf-8"?>
 <p:sld xmlns:a="http://schemas.openxmlformats.org/drawingml/2006/main" xmlns:r="http://schemas.openxmlformats.org/officeDocument/2006/relationships" xmlns:p="http://schemas.openxmlformats.org/presentationml/2006/main">
   <p:cSld>
     <p:spTree>
@@ -16485,7 +16641,7 @@
 </p:sld>
 </file>
 
-<file path=ppt/slides/slide43.xml><?xml version="1.0" encoding="utf-8"?>
+<file path=ppt/slides/slide44.xml><?xml version="1.0" encoding="utf-8"?>
 <p:sld xmlns:a="http://schemas.openxmlformats.org/drawingml/2006/main" xmlns:r="http://schemas.openxmlformats.org/officeDocument/2006/relationships" xmlns:p="http://schemas.openxmlformats.org/presentationml/2006/main">
   <p:cSld>
     <p:bg>
@@ -16580,7 +16736,7 @@
 </p:sld>
 </file>
 
-<file path=ppt/slides/slide44.xml><?xml version="1.0" encoding="utf-8"?>
+<file path=ppt/slides/slide45.xml><?xml version="1.0" encoding="utf-8"?>
 <p:sld xmlns:a="http://schemas.openxmlformats.org/drawingml/2006/main" xmlns:r="http://schemas.openxmlformats.org/officeDocument/2006/relationships" xmlns:p="http://schemas.openxmlformats.org/presentationml/2006/main">
   <p:cSld>
     <p:bg>
@@ -16918,7 +17074,7 @@
 </p:sld>
 </file>
 
-<file path=ppt/slides/slide45.xml><?xml version="1.0" encoding="utf-8"?>
+<file path=ppt/slides/slide46.xml><?xml version="1.0" encoding="utf-8"?>
 <p:sld xmlns:a="http://schemas.openxmlformats.org/drawingml/2006/main" xmlns:r="http://schemas.openxmlformats.org/officeDocument/2006/relationships" xmlns:p="http://schemas.openxmlformats.org/presentationml/2006/main">
   <p:cSld>
     <p:bg>
@@ -17112,7 +17268,7 @@
 </p:sld>
 </file>
 
-<file path=ppt/slides/slide46.xml><?xml version="1.0" encoding="utf-8"?>
+<file path=ppt/slides/slide47.xml><?xml version="1.0" encoding="utf-8"?>
 <p:sld xmlns:a="http://schemas.openxmlformats.org/drawingml/2006/main" xmlns:r="http://schemas.openxmlformats.org/officeDocument/2006/relationships" xmlns:p="http://schemas.openxmlformats.org/presentationml/2006/main">
   <p:cSld>
     <p:spTree>
@@ -17323,7 +17479,7 @@
 </p:sld>
 </file>
 
-<file path=ppt/slides/slide47.xml><?xml version="1.0" encoding="utf-8"?>
+<file path=ppt/slides/slide48.xml><?xml version="1.0" encoding="utf-8"?>
 <p:sld xmlns:a="http://schemas.openxmlformats.org/drawingml/2006/main" xmlns:r="http://schemas.openxmlformats.org/officeDocument/2006/relationships" xmlns:p="http://schemas.openxmlformats.org/presentationml/2006/main">
   <p:cSld>
     <p:bg>
@@ -17647,7 +17803,7 @@
 </p:sld>
 </file>
 
-<file path=ppt/slides/slide48.xml><?xml version="1.0" encoding="utf-8"?>
+<file path=ppt/slides/slide49.xml><?xml version="1.0" encoding="utf-8"?>
 <p:sld xmlns:a="http://schemas.openxmlformats.org/drawingml/2006/main" xmlns:r="http://schemas.openxmlformats.org/officeDocument/2006/relationships" xmlns:p="http://schemas.openxmlformats.org/presentationml/2006/main">
   <p:cSld>
     <p:bg>
@@ -18831,15 +18987,7 @@
           <a:p>
             <a:r>
               <a:rPr lang="en-GB" dirty="0" smtClean="0"/>
-              <a:t>Dat</a:t>
-            </a:r>
-            <a:r>
-              <a:rPr lang="en-GB" dirty="0" smtClean="0"/>
-              <a:t>a Model - </a:t>
-            </a:r>
-            <a:r>
-              <a:rPr lang="en-GB" dirty="0" smtClean="0"/>
-              <a:t>Serialization</a:t>
+              <a:t>Data Model - Serialization</a:t>
             </a:r>
             <a:endParaRPr lang="en-GB" dirty="0"/>
           </a:p>
@@ -18903,7 +19051,6 @@
               <a:rPr lang="en-GB" dirty="0" smtClean="0"/>
               <a:t>Document Databases</a:t>
             </a:r>
-            <a:endParaRPr lang="en-GB" dirty="0" smtClean="0"/>
           </a:p>
         </p:txBody>
       </p:sp>
@@ -19216,11 +19363,7 @@
             </a:pPr>
             <a:r>
               <a:rPr lang="en-GB" sz="3600" dirty="0" smtClean="0"/>
-              <a:t>(Database Serialization </a:t>
-            </a:r>
-            <a:r>
-              <a:rPr lang="en-GB" sz="3600" dirty="0" smtClean="0"/>
-              <a:t>Demo)</a:t>
+              <a:t>(Database Serialization Demo)</a:t>
             </a:r>
             <a:endParaRPr lang="en-GB" sz="3600" dirty="0"/>
           </a:p>

</xml_diff>